<commit_message>
vault backup: 2023-09-14 16:06:24
</commit_message>
<xml_diff>
--- a/OS/DONS/FES.pptx
+++ b/OS/DONS/FES.pptx
@@ -114,6 +114,11 @@
       </a:defRPr>
     </a:lvl9pPr>
   </p:defaultTextStyle>
+  <p:extLst>
+    <p:ext uri="{EFAFB233-063F-42B5-8137-9DF3F51BA10A}">
+      <p15:sldGuideLst xmlns:p15="http://schemas.microsoft.com/office/powerpoint/2012/main"/>
+    </p:ext>
+  </p:extLst>
 </p:presentation>
 </file>
 
@@ -199,7 +204,7 @@
           <a:p>
             <a:fld id="{DC8DF830-0B68-4DA1-B7F1-3F604F3412E2}" type="datetimeFigureOut">
               <a:rPr lang="zh-CN" altLang="en-US" smtClean="0"/>
-              <a:t>2023/9/13</a:t>
+              <a:t>2023/9/14</a:t>
             </a:fld>
             <a:endParaRPr lang="zh-CN" altLang="en-US"/>
           </a:p>
@@ -1621,7 +1626,7 @@
           <a:p>
             <a:fld id="{5C67483F-86B4-4181-AEB3-1074CE197F11}" type="datetimeFigureOut">
               <a:rPr lang="zh-CN" altLang="en-US" smtClean="0"/>
-              <a:t>2023/9/13</a:t>
+              <a:t>2023/9/14</a:t>
             </a:fld>
             <a:endParaRPr lang="zh-CN" altLang="en-US"/>
           </a:p>
@@ -1819,7 +1824,7 @@
           <a:p>
             <a:fld id="{5C67483F-86B4-4181-AEB3-1074CE197F11}" type="datetimeFigureOut">
               <a:rPr lang="zh-CN" altLang="en-US" smtClean="0"/>
-              <a:t>2023/9/13</a:t>
+              <a:t>2023/9/14</a:t>
             </a:fld>
             <a:endParaRPr lang="zh-CN" altLang="en-US"/>
           </a:p>
@@ -2027,7 +2032,7 @@
           <a:p>
             <a:fld id="{5C67483F-86B4-4181-AEB3-1074CE197F11}" type="datetimeFigureOut">
               <a:rPr lang="zh-CN" altLang="en-US" smtClean="0"/>
-              <a:t>2023/9/13</a:t>
+              <a:t>2023/9/14</a:t>
             </a:fld>
             <a:endParaRPr lang="zh-CN" altLang="en-US"/>
           </a:p>
@@ -2176,7 +2181,7 @@
             <a:fld id="{DB494AA1-4C1D-4C99-92BC-CE5686F06754}" type="datetime1">
               <a:rPr lang="zh-CN" altLang="en-US" smtClean="0"/>
               <a:pPr/>
-              <a:t>2023/9/13</a:t>
+              <a:t>2023/9/14</a:t>
             </a:fld>
             <a:endParaRPr lang="zh-CN" altLang="en-US"/>
           </a:p>
@@ -2518,7 +2523,7 @@
           <a:p>
             <a:fld id="{5C67483F-86B4-4181-AEB3-1074CE197F11}" type="datetimeFigureOut">
               <a:rPr lang="zh-CN" altLang="en-US" smtClean="0"/>
-              <a:t>2023/9/13</a:t>
+              <a:t>2023/9/14</a:t>
             </a:fld>
             <a:endParaRPr lang="zh-CN" altLang="en-US"/>
           </a:p>
@@ -2793,7 +2798,7 @@
           <a:p>
             <a:fld id="{5C67483F-86B4-4181-AEB3-1074CE197F11}" type="datetimeFigureOut">
               <a:rPr lang="zh-CN" altLang="en-US" smtClean="0"/>
-              <a:t>2023/9/13</a:t>
+              <a:t>2023/9/14</a:t>
             </a:fld>
             <a:endParaRPr lang="zh-CN" altLang="en-US"/>
           </a:p>
@@ -3058,7 +3063,7 @@
           <a:p>
             <a:fld id="{5C67483F-86B4-4181-AEB3-1074CE197F11}" type="datetimeFigureOut">
               <a:rPr lang="zh-CN" altLang="en-US" smtClean="0"/>
-              <a:t>2023/9/13</a:t>
+              <a:t>2023/9/14</a:t>
             </a:fld>
             <a:endParaRPr lang="zh-CN" altLang="en-US"/>
           </a:p>
@@ -3470,7 +3475,7 @@
           <a:p>
             <a:fld id="{5C67483F-86B4-4181-AEB3-1074CE197F11}" type="datetimeFigureOut">
               <a:rPr lang="zh-CN" altLang="en-US" smtClean="0"/>
-              <a:t>2023/9/13</a:t>
+              <a:t>2023/9/14</a:t>
             </a:fld>
             <a:endParaRPr lang="zh-CN" altLang="en-US"/>
           </a:p>
@@ -3611,7 +3616,7 @@
           <a:p>
             <a:fld id="{5C67483F-86B4-4181-AEB3-1074CE197F11}" type="datetimeFigureOut">
               <a:rPr lang="zh-CN" altLang="en-US" smtClean="0"/>
-              <a:t>2023/9/13</a:t>
+              <a:t>2023/9/14</a:t>
             </a:fld>
             <a:endParaRPr lang="zh-CN" altLang="en-US"/>
           </a:p>
@@ -3724,7 +3729,7 @@
           <a:p>
             <a:fld id="{5C67483F-86B4-4181-AEB3-1074CE197F11}" type="datetimeFigureOut">
               <a:rPr lang="zh-CN" altLang="en-US" smtClean="0"/>
-              <a:t>2023/9/13</a:t>
+              <a:t>2023/9/14</a:t>
             </a:fld>
             <a:endParaRPr lang="zh-CN" altLang="en-US"/>
           </a:p>
@@ -4035,7 +4040,7 @@
           <a:p>
             <a:fld id="{5C67483F-86B4-4181-AEB3-1074CE197F11}" type="datetimeFigureOut">
               <a:rPr lang="zh-CN" altLang="en-US" smtClean="0"/>
-              <a:t>2023/9/13</a:t>
+              <a:t>2023/9/14</a:t>
             </a:fld>
             <a:endParaRPr lang="zh-CN" altLang="en-US"/>
           </a:p>
@@ -4323,7 +4328,7 @@
           <a:p>
             <a:fld id="{5C67483F-86B4-4181-AEB3-1074CE197F11}" type="datetimeFigureOut">
               <a:rPr lang="zh-CN" altLang="en-US" smtClean="0"/>
-              <a:t>2023/9/13</a:t>
+              <a:t>2023/9/14</a:t>
             </a:fld>
             <a:endParaRPr lang="zh-CN" altLang="en-US"/>
           </a:p>
@@ -4564,7 +4569,7 @@
           <a:p>
             <a:fld id="{5C67483F-86B4-4181-AEB3-1074CE197F11}" type="datetimeFigureOut">
               <a:rPr lang="zh-CN" altLang="en-US" smtClean="0"/>
-              <a:t>2023/9/13</a:t>
+              <a:t>2023/9/14</a:t>
             </a:fld>
             <a:endParaRPr lang="zh-CN" altLang="en-US"/>
           </a:p>
@@ -12626,7 +12631,7 @@
         <p:spPr>
           <a:xfrm>
             <a:off x="1162050" y="1847850"/>
-            <a:ext cx="4133850" cy="646331"/>
+            <a:ext cx="4133850" cy="1537409"/>
           </a:xfrm>
           <a:prstGeom prst="rect">
             <a:avLst/>
@@ -12640,24 +12645,55 @@
           <a:lstStyle/>
           <a:p>
             <a:pPr marL="285750" indent="-285750">
+              <a:lnSpc>
+                <a:spcPct val="120000"/>
+              </a:lnSpc>
               <a:buFont typeface="Arial" panose="020B0604020202020204" pitchFamily="34" charset="0"/>
               <a:buChar char="•"/>
             </a:pPr>
             <a:r>
-              <a:rPr lang="en-US" altLang="zh-CN" dirty="0"/>
+              <a:rPr lang="en-US" altLang="zh-CN" sz="2000" dirty="0">
+                <a:latin typeface="Times New Roman" panose="02020603050405020304" pitchFamily="18" charset="0"/>
+                <a:cs typeface="Times New Roman" panose="02020603050405020304" pitchFamily="18" charset="0"/>
+              </a:rPr>
               <a:t>Efficient memory sharing mechanism</a:t>
             </a:r>
           </a:p>
           <a:p>
             <a:pPr marL="285750" indent="-285750">
+              <a:lnSpc>
+                <a:spcPct val="120000"/>
+              </a:lnSpc>
               <a:buFont typeface="Arial" panose="020B0604020202020204" pitchFamily="34" charset="0"/>
               <a:buChar char="•"/>
             </a:pPr>
             <a:r>
-              <a:rPr lang="en-US" altLang="zh-CN" dirty="0"/>
-              <a:t>Striking acceleration </a:t>
-            </a:r>
-            <a:endParaRPr lang="zh-CN" altLang="en-US" dirty="0"/>
+              <a:rPr lang="en-US" altLang="zh-CN" sz="2000" dirty="0">
+                <a:latin typeface="Times New Roman" panose="02020603050405020304" pitchFamily="18" charset="0"/>
+                <a:cs typeface="Times New Roman" panose="02020603050405020304" pitchFamily="18" charset="0"/>
+              </a:rPr>
+              <a:t>Striking performance improvement</a:t>
+            </a:r>
+          </a:p>
+          <a:p>
+            <a:pPr marL="285750" indent="-285750">
+              <a:lnSpc>
+                <a:spcPct val="120000"/>
+              </a:lnSpc>
+              <a:buFont typeface="Arial" panose="020B0604020202020204" pitchFamily="34" charset="0"/>
+              <a:buChar char="•"/>
+            </a:pPr>
+            <a:r>
+              <a:rPr lang="en-US" altLang="zh-CN" sz="2000" dirty="0">
+                <a:latin typeface="Times New Roman" panose="02020603050405020304" pitchFamily="18" charset="0"/>
+                <a:cs typeface="Times New Roman" panose="02020603050405020304" pitchFamily="18" charset="0"/>
+              </a:rPr>
+              <a:t>Downgrade cache miss ratio</a:t>
+            </a:r>
+            <a:endParaRPr lang="zh-CN" altLang="en-US" sz="2000" dirty="0">
+              <a:latin typeface="Times New Roman" panose="02020603050405020304" pitchFamily="18" charset="0"/>
+              <a:cs typeface="Times New Roman" panose="02020603050405020304" pitchFamily="18" charset="0"/>
+            </a:endParaRPr>
           </a:p>
         </p:txBody>
       </p:sp>

</xml_diff>

<commit_message>
vault backup: 2023-09-14 19:00:04
</commit_message>
<xml_diff>
--- a/OS/DONS/FES.pptx
+++ b/OS/DONS/FES.pptx
@@ -5775,7 +5775,7 @@
                 <a:latin typeface="Times New Roman" panose="02020603050405020304" pitchFamily="18" charset="0"/>
                 <a:cs typeface="Times New Roman" panose="02020603050405020304" pitchFamily="18" charset="0"/>
               </a:rPr>
-              <a:t>What is discrete network simulator(DES)?</a:t>
+              <a:t>What is a discrete network simulator(DES)?</a:t>
             </a:r>
             <a:endParaRPr lang="zh-CN" altLang="en-US" sz="2800" dirty="0">
               <a:latin typeface="Times New Roman" panose="02020603050405020304" pitchFamily="18" charset="0"/>
@@ -12341,7 +12341,7 @@
         <p:spPr>
           <a:xfrm>
             <a:off x="283801" y="86851"/>
-            <a:ext cx="2544286" cy="584775"/>
+            <a:ext cx="1667444" cy="584775"/>
           </a:xfrm>
           <a:prstGeom prst="rect">
             <a:avLst/>
@@ -12363,7 +12363,7 @@
                 <a:cs typeface="Times New Roman" panose="02020603050405020304" pitchFamily="18" charset="0"/>
                 <a:sym typeface="Arial" panose="020B0604020202020204" pitchFamily="34" charset="0"/>
               </a:rPr>
-              <a:t>Related work</a:t>
+              <a:t>Analysis</a:t>
             </a:r>
           </a:p>
         </p:txBody>
@@ -12422,10 +12422,320 @@
       </p:sp>
       <p:sp>
         <p:nvSpPr>
-          <p:cNvPr id="11" name="矩形: 圆角 10">
-            <a:extLst>
-              <a:ext uri="{FF2B5EF4-FFF2-40B4-BE49-F238E27FC236}">
-                <a16:creationId xmlns:a16="http://schemas.microsoft.com/office/drawing/2014/main" id="{97899BD9-1AD5-4295-9476-1BFA41835075}"/>
+          <p:cNvPr id="13" name="文本框 12">
+            <a:extLst>
+              <a:ext uri="{FF2B5EF4-FFF2-40B4-BE49-F238E27FC236}">
+                <a16:creationId xmlns:a16="http://schemas.microsoft.com/office/drawing/2014/main" id="{335C1311-FE7B-4A51-B23F-742F7B8F6BC5}"/>
+              </a:ext>
+            </a:extLst>
+          </p:cNvPr>
+          <p:cNvSpPr txBox="1"/>
+          <p:nvPr/>
+        </p:nvSpPr>
+        <p:spPr>
+          <a:xfrm>
+            <a:off x="283801" y="971035"/>
+            <a:ext cx="1384300" cy="369332"/>
+          </a:xfrm>
+          <a:prstGeom prst="rect">
+            <a:avLst/>
+          </a:prstGeom>
+          <a:noFill/>
+        </p:spPr>
+        <p:txBody>
+          <a:bodyPr wrap="square" rtlCol="0">
+            <a:spAutoFit/>
+          </a:bodyPr>
+          <a:lstStyle/>
+          <a:p>
+            <a:r>
+              <a:rPr lang="en-US" altLang="zh-CN" b="1" dirty="0">
+                <a:latin typeface="Times New Roman" panose="02020603050405020304" pitchFamily="18" charset="0"/>
+                <a:cs typeface="Times New Roman" panose="02020603050405020304" pitchFamily="18" charset="0"/>
+              </a:rPr>
+              <a:t>Advantages</a:t>
+            </a:r>
+            <a:endParaRPr lang="zh-CN" altLang="en-US" b="1" dirty="0">
+              <a:latin typeface="Times New Roman" panose="02020603050405020304" pitchFamily="18" charset="0"/>
+              <a:cs typeface="Times New Roman" panose="02020603050405020304" pitchFamily="18" charset="0"/>
+            </a:endParaRPr>
+          </a:p>
+        </p:txBody>
+      </p:sp>
+      <p:sp>
+        <p:nvSpPr>
+          <p:cNvPr id="14" name="文本框 13">
+            <a:extLst>
+              <a:ext uri="{FF2B5EF4-FFF2-40B4-BE49-F238E27FC236}">
+                <a16:creationId xmlns:a16="http://schemas.microsoft.com/office/drawing/2014/main" id="{70E254BB-4F47-483F-A76D-F532797C326B}"/>
+              </a:ext>
+            </a:extLst>
+          </p:cNvPr>
+          <p:cNvSpPr txBox="1"/>
+          <p:nvPr/>
+        </p:nvSpPr>
+        <p:spPr>
+          <a:xfrm>
+            <a:off x="5791240" y="971035"/>
+            <a:ext cx="1384300" cy="369332"/>
+          </a:xfrm>
+          <a:prstGeom prst="rect">
+            <a:avLst/>
+          </a:prstGeom>
+          <a:noFill/>
+        </p:spPr>
+        <p:txBody>
+          <a:bodyPr wrap="square" rtlCol="0">
+            <a:spAutoFit/>
+          </a:bodyPr>
+          <a:lstStyle/>
+          <a:p>
+            <a:r>
+              <a:rPr lang="en-US" altLang="zh-CN" b="1" dirty="0">
+                <a:latin typeface="Times New Roman" panose="02020603050405020304" pitchFamily="18" charset="0"/>
+                <a:cs typeface="Times New Roman" panose="02020603050405020304" pitchFamily="18" charset="0"/>
+              </a:rPr>
+              <a:t>Drawbacks</a:t>
+            </a:r>
+            <a:endParaRPr lang="zh-CN" altLang="en-US" b="1" dirty="0">
+              <a:latin typeface="Times New Roman" panose="02020603050405020304" pitchFamily="18" charset="0"/>
+              <a:cs typeface="Times New Roman" panose="02020603050405020304" pitchFamily="18" charset="0"/>
+            </a:endParaRPr>
+          </a:p>
+        </p:txBody>
+      </p:sp>
+      <p:sp>
+        <p:nvSpPr>
+          <p:cNvPr id="15" name="文本框 14">
+            <a:extLst>
+              <a:ext uri="{FF2B5EF4-FFF2-40B4-BE49-F238E27FC236}">
+                <a16:creationId xmlns:a16="http://schemas.microsoft.com/office/drawing/2014/main" id="{2D111850-5C68-4C26-9857-8EB96F90CA1B}"/>
+              </a:ext>
+            </a:extLst>
+          </p:cNvPr>
+          <p:cNvSpPr txBox="1"/>
+          <p:nvPr/>
+        </p:nvSpPr>
+        <p:spPr>
+          <a:xfrm>
+            <a:off x="260334" y="1382558"/>
+            <a:ext cx="5193698" cy="1168077"/>
+          </a:xfrm>
+          <a:prstGeom prst="rect">
+            <a:avLst/>
+          </a:prstGeom>
+          <a:noFill/>
+        </p:spPr>
+        <p:txBody>
+          <a:bodyPr wrap="square" rtlCol="0">
+            <a:spAutoFit/>
+          </a:bodyPr>
+          <a:lstStyle/>
+          <a:p>
+            <a:pPr marL="285750" indent="-285750">
+              <a:lnSpc>
+                <a:spcPct val="120000"/>
+              </a:lnSpc>
+              <a:buFont typeface="Arial" panose="020B0604020202020204" pitchFamily="34" charset="0"/>
+              <a:buChar char="•"/>
+            </a:pPr>
+            <a:r>
+              <a:rPr lang="en-US" altLang="zh-CN" sz="2000" dirty="0">
+                <a:latin typeface="Times New Roman" panose="02020603050405020304" pitchFamily="18" charset="0"/>
+                <a:cs typeface="Times New Roman" panose="02020603050405020304" pitchFamily="18" charset="0"/>
+              </a:rPr>
+              <a:t>Efficient memory sharing mechanism</a:t>
+            </a:r>
+          </a:p>
+          <a:p>
+            <a:pPr marL="285750" indent="-285750">
+              <a:lnSpc>
+                <a:spcPct val="120000"/>
+              </a:lnSpc>
+              <a:buFont typeface="Arial" panose="020B0604020202020204" pitchFamily="34" charset="0"/>
+              <a:buChar char="•"/>
+            </a:pPr>
+            <a:r>
+              <a:rPr lang="en-US" altLang="zh-CN" sz="2000" dirty="0">
+                <a:latin typeface="Times New Roman" panose="02020603050405020304" pitchFamily="18" charset="0"/>
+                <a:cs typeface="Times New Roman" panose="02020603050405020304" pitchFamily="18" charset="0"/>
+              </a:rPr>
+              <a:t>Striking improve multi-core efficiency</a:t>
+            </a:r>
+          </a:p>
+          <a:p>
+            <a:pPr marL="285750" indent="-285750">
+              <a:lnSpc>
+                <a:spcPct val="120000"/>
+              </a:lnSpc>
+              <a:buFont typeface="Arial" panose="020B0604020202020204" pitchFamily="34" charset="0"/>
+              <a:buChar char="•"/>
+            </a:pPr>
+            <a:r>
+              <a:rPr lang="en-US" altLang="zh-CN" sz="2000" dirty="0">
+                <a:latin typeface="Times New Roman" panose="02020603050405020304" pitchFamily="18" charset="0"/>
+                <a:cs typeface="Times New Roman" panose="02020603050405020304" pitchFamily="18" charset="0"/>
+              </a:rPr>
+              <a:t>Downgrade cache miss ratio</a:t>
+            </a:r>
+            <a:endParaRPr lang="zh-CN" altLang="en-US" sz="2000" dirty="0">
+              <a:latin typeface="Times New Roman" panose="02020603050405020304" pitchFamily="18" charset="0"/>
+              <a:cs typeface="Times New Roman" panose="02020603050405020304" pitchFamily="18" charset="0"/>
+            </a:endParaRPr>
+          </a:p>
+        </p:txBody>
+      </p:sp>
+      <p:sp>
+        <p:nvSpPr>
+          <p:cNvPr id="9" name="文本框 8">
+            <a:extLst>
+              <a:ext uri="{FF2B5EF4-FFF2-40B4-BE49-F238E27FC236}">
+                <a16:creationId xmlns:a16="http://schemas.microsoft.com/office/drawing/2014/main" id="{AAC76288-7D4A-4A2E-B512-7D218EC3C2CD}"/>
+              </a:ext>
+            </a:extLst>
+          </p:cNvPr>
+          <p:cNvSpPr txBox="1"/>
+          <p:nvPr/>
+        </p:nvSpPr>
+        <p:spPr>
+          <a:xfrm>
+            <a:off x="5835746" y="1340367"/>
+            <a:ext cx="5869383" cy="3384068"/>
+          </a:xfrm>
+          <a:prstGeom prst="rect">
+            <a:avLst/>
+          </a:prstGeom>
+          <a:noFill/>
+        </p:spPr>
+        <p:txBody>
+          <a:bodyPr wrap="square" rtlCol="0">
+            <a:spAutoFit/>
+          </a:bodyPr>
+          <a:lstStyle/>
+          <a:p>
+            <a:pPr marL="285750" indent="-285750">
+              <a:lnSpc>
+                <a:spcPct val="120000"/>
+              </a:lnSpc>
+              <a:buFont typeface="Arial" panose="020B0604020202020204" pitchFamily="34" charset="0"/>
+              <a:buChar char="•"/>
+            </a:pPr>
+            <a:r>
+              <a:rPr lang="en-US" altLang="zh-CN" sz="2000" dirty="0">
+                <a:latin typeface="Times New Roman" panose="02020603050405020304" pitchFamily="18" charset="0"/>
+                <a:cs typeface="Times New Roman" panose="02020603050405020304" pitchFamily="18" charset="0"/>
+              </a:rPr>
+              <a:t>Functionality:</a:t>
+            </a:r>
+          </a:p>
+          <a:p>
+            <a:pPr marL="742950" lvl="1" indent="-285750">
+              <a:lnSpc>
+                <a:spcPct val="120000"/>
+              </a:lnSpc>
+              <a:buFont typeface="Arial" panose="020B0604020202020204" pitchFamily="34" charset="0"/>
+              <a:buChar char="•"/>
+            </a:pPr>
+            <a:r>
+              <a:rPr lang="en-US" altLang="zh-CN" sz="2000" dirty="0">
+                <a:latin typeface="Times New Roman" panose="02020603050405020304" pitchFamily="18" charset="0"/>
+                <a:cs typeface="Times New Roman" panose="02020603050405020304" pitchFamily="18" charset="0"/>
+              </a:rPr>
+              <a:t>Lack supports on channel, mobility and protocol model</a:t>
+            </a:r>
+          </a:p>
+          <a:p>
+            <a:pPr marL="742950" lvl="1" indent="-285750">
+              <a:lnSpc>
+                <a:spcPct val="120000"/>
+              </a:lnSpc>
+              <a:buFont typeface="Arial" panose="020B0604020202020204" pitchFamily="34" charset="0"/>
+              <a:buChar char="•"/>
+            </a:pPr>
+            <a:r>
+              <a:rPr lang="en-US" altLang="zh-CN" sz="2000" dirty="0">
+                <a:latin typeface="Times New Roman" panose="02020603050405020304" pitchFamily="18" charset="0"/>
+                <a:cs typeface="Times New Roman" panose="02020603050405020304" pitchFamily="18" charset="0"/>
+              </a:rPr>
+              <a:t>Lack real-time simulator implementation</a:t>
+            </a:r>
+          </a:p>
+          <a:p>
+            <a:pPr marL="742950" lvl="1" indent="-285750">
+              <a:lnSpc>
+                <a:spcPct val="120000"/>
+              </a:lnSpc>
+              <a:buFont typeface="Arial" panose="020B0604020202020204" pitchFamily="34" charset="0"/>
+              <a:buChar char="•"/>
+            </a:pPr>
+            <a:r>
+              <a:rPr lang="en-US" altLang="zh-CN" sz="2000" dirty="0">
+                <a:latin typeface="Times New Roman" panose="02020603050405020304" pitchFamily="18" charset="0"/>
+                <a:cs typeface="Times New Roman" panose="02020603050405020304" pitchFamily="18" charset="0"/>
+              </a:rPr>
+              <a:t>Cannot transfer packets from physical machines</a:t>
+            </a:r>
+          </a:p>
+          <a:p>
+            <a:pPr marL="285750" indent="-285750">
+              <a:lnSpc>
+                <a:spcPct val="120000"/>
+              </a:lnSpc>
+              <a:buFont typeface="Arial" panose="020B0604020202020204" pitchFamily="34" charset="0"/>
+              <a:buChar char="•"/>
+            </a:pPr>
+            <a:r>
+              <a:rPr lang="en-US" altLang="zh-CN" sz="2000" dirty="0">
+                <a:latin typeface="Times New Roman" panose="02020603050405020304" pitchFamily="18" charset="0"/>
+                <a:cs typeface="Times New Roman" panose="02020603050405020304" pitchFamily="18" charset="0"/>
+              </a:rPr>
+              <a:t>Performance:</a:t>
+            </a:r>
+          </a:p>
+          <a:p>
+            <a:pPr marL="742950" lvl="1" indent="-285750">
+              <a:lnSpc>
+                <a:spcPct val="120000"/>
+              </a:lnSpc>
+              <a:buFont typeface="Arial" panose="020B0604020202020204" pitchFamily="34" charset="0"/>
+              <a:buChar char="•"/>
+            </a:pPr>
+            <a:r>
+              <a:rPr lang="en-US" altLang="zh-CN" sz="2000" dirty="0">
+                <a:latin typeface="Times New Roman" panose="02020603050405020304" pitchFamily="18" charset="0"/>
+                <a:cs typeface="Times New Roman" panose="02020603050405020304" pitchFamily="18" charset="0"/>
+              </a:rPr>
+              <a:t>Competition between threads may bring about fake sharing</a:t>
+            </a:r>
+          </a:p>
+          <a:p>
+            <a:pPr marL="742950" lvl="1" indent="-285750">
+              <a:lnSpc>
+                <a:spcPct val="120000"/>
+              </a:lnSpc>
+              <a:buFont typeface="Arial" panose="020B0604020202020204" pitchFamily="34" charset="0"/>
+              <a:buChar char="•"/>
+            </a:pPr>
+            <a:r>
+              <a:rPr lang="en-US" altLang="zh-CN" sz="2000" dirty="0">
+                <a:latin typeface="Times New Roman" panose="02020603050405020304" pitchFamily="18" charset="0"/>
+                <a:cs typeface="Times New Roman" panose="02020603050405020304" pitchFamily="18" charset="0"/>
+              </a:rPr>
+              <a:t>Ignore GPU</a:t>
+            </a:r>
+            <a:endParaRPr lang="zh-CN" altLang="en-US" sz="2000" dirty="0">
+              <a:latin typeface="Times New Roman" panose="02020603050405020304" pitchFamily="18" charset="0"/>
+              <a:cs typeface="Times New Roman" panose="02020603050405020304" pitchFamily="18" charset="0"/>
+            </a:endParaRPr>
+          </a:p>
+        </p:txBody>
+      </p:sp>
+      <p:sp>
+        <p:nvSpPr>
+          <p:cNvPr id="3" name="矩形 2">
+            <a:extLst>
+              <a:ext uri="{FF2B5EF4-FFF2-40B4-BE49-F238E27FC236}">
+                <a16:creationId xmlns:a16="http://schemas.microsoft.com/office/drawing/2014/main" id="{2531534A-B98B-4891-A179-40B7B66ABABF}"/>
               </a:ext>
             </a:extLst>
           </p:cNvPr>
@@ -12434,18 +12744,16 @@
         </p:nvSpPr>
         <p:spPr>
           <a:xfrm>
-            <a:off x="1085012" y="1155701"/>
-            <a:ext cx="4375150" cy="5194300"/>
-          </a:xfrm>
-          <a:prstGeom prst="roundRect">
-            <a:avLst>
-              <a:gd name="adj" fmla="val 2508"/>
-            </a:avLst>
+            <a:off x="1041332" y="3525881"/>
+            <a:ext cx="1633205" cy="644886"/>
+          </a:xfrm>
+          <a:prstGeom prst="rect">
+            <a:avLst/>
           </a:prstGeom>
           <a:solidFill>
             <a:schemeClr val="bg1"/>
           </a:solidFill>
-          <a:ln w="25400">
+          <a:ln>
             <a:solidFill>
               <a:schemeClr val="tx1"/>
             </a:solidFill>
@@ -12472,16 +12780,32 @@
           <a:lstStyle/>
           <a:p>
             <a:pPr algn="ctr"/>
-            <a:endParaRPr lang="zh-CN" altLang="en-US"/>
-          </a:p>
-        </p:txBody>
-      </p:sp>
-      <p:sp>
-        <p:nvSpPr>
-          <p:cNvPr id="12" name="矩形: 圆角 11">
-            <a:extLst>
-              <a:ext uri="{FF2B5EF4-FFF2-40B4-BE49-F238E27FC236}">
-                <a16:creationId xmlns:a16="http://schemas.microsoft.com/office/drawing/2014/main" id="{272AB33A-F99B-4825-908A-E75B9269269E}"/>
+            <a:r>
+              <a:rPr lang="en-US" altLang="zh-CN" dirty="0">
+                <a:solidFill>
+                  <a:schemeClr val="tx1"/>
+                </a:solidFill>
+                <a:latin typeface="Times New Roman" panose="02020603050405020304" pitchFamily="18" charset="0"/>
+                <a:cs typeface="Times New Roman" panose="02020603050405020304" pitchFamily="18" charset="0"/>
+              </a:rPr>
+              <a:t>Core 1</a:t>
+            </a:r>
+            <a:endParaRPr lang="zh-CN" altLang="en-US" dirty="0">
+              <a:solidFill>
+                <a:schemeClr val="tx1"/>
+              </a:solidFill>
+              <a:latin typeface="Times New Roman" panose="02020603050405020304" pitchFamily="18" charset="0"/>
+              <a:cs typeface="Times New Roman" panose="02020603050405020304" pitchFamily="18" charset="0"/>
+            </a:endParaRPr>
+          </a:p>
+        </p:txBody>
+      </p:sp>
+      <p:sp>
+        <p:nvSpPr>
+          <p:cNvPr id="5" name="矩形 4">
+            <a:extLst>
+              <a:ext uri="{FF2B5EF4-FFF2-40B4-BE49-F238E27FC236}">
+                <a16:creationId xmlns:a16="http://schemas.microsoft.com/office/drawing/2014/main" id="{4BBB73A4-E5E8-4C41-9A19-0AF96E3EB51E}"/>
               </a:ext>
             </a:extLst>
           </p:cNvPr>
@@ -12490,18 +12814,19 @@
         </p:nvSpPr>
         <p:spPr>
           <a:xfrm>
-            <a:off x="6692062" y="1155701"/>
-            <a:ext cx="4375150" cy="5194300"/>
-          </a:xfrm>
-          <a:prstGeom prst="roundRect">
-            <a:avLst>
-              <a:gd name="adj" fmla="val 2508"/>
-            </a:avLst>
+            <a:off x="1041332" y="4252318"/>
+            <a:ext cx="752608" cy="312625"/>
+          </a:xfrm>
+          <a:prstGeom prst="rect">
+            <a:avLst/>
           </a:prstGeom>
           <a:solidFill>
-            <a:schemeClr val="bg1"/>
+            <a:schemeClr val="accent6">
+              <a:lumMod val="60000"/>
+              <a:lumOff val="40000"/>
+            </a:schemeClr>
           </a:solidFill>
-          <a:ln w="25400">
+          <a:ln>
             <a:solidFill>
               <a:schemeClr val="tx1"/>
             </a:solidFill>
@@ -12528,16 +12853,443 @@
           <a:lstStyle/>
           <a:p>
             <a:pPr algn="ctr"/>
+            <a:endParaRPr lang="zh-CN" altLang="en-US">
+              <a:latin typeface="Times New Roman" panose="02020603050405020304" pitchFamily="18" charset="0"/>
+              <a:cs typeface="Times New Roman" panose="02020603050405020304" pitchFamily="18" charset="0"/>
+            </a:endParaRPr>
+          </a:p>
+        </p:txBody>
+      </p:sp>
+      <p:sp>
+        <p:nvSpPr>
+          <p:cNvPr id="18" name="矩形 17">
+            <a:extLst>
+              <a:ext uri="{FF2B5EF4-FFF2-40B4-BE49-F238E27FC236}">
+                <a16:creationId xmlns:a16="http://schemas.microsoft.com/office/drawing/2014/main" id="{600E4BF1-3FCE-4B16-9621-D37C6762820A}"/>
+              </a:ext>
+            </a:extLst>
+          </p:cNvPr>
+          <p:cNvSpPr/>
+          <p:nvPr/>
+        </p:nvSpPr>
+        <p:spPr>
+          <a:xfrm>
+            <a:off x="1921929" y="4252318"/>
+            <a:ext cx="752608" cy="312625"/>
+          </a:xfrm>
+          <a:prstGeom prst="rect">
+            <a:avLst/>
+          </a:prstGeom>
+          <a:solidFill>
+            <a:schemeClr val="accent6">
+              <a:lumMod val="60000"/>
+              <a:lumOff val="40000"/>
+            </a:schemeClr>
+          </a:solidFill>
+          <a:ln>
+            <a:solidFill>
+              <a:schemeClr val="tx1"/>
+            </a:solidFill>
+          </a:ln>
+        </p:spPr>
+        <p:style>
+          <a:lnRef idx="2">
+            <a:schemeClr val="accent1">
+              <a:shade val="50000"/>
+            </a:schemeClr>
+          </a:lnRef>
+          <a:fillRef idx="1">
+            <a:schemeClr val="accent1"/>
+          </a:fillRef>
+          <a:effectRef idx="0">
+            <a:schemeClr val="accent1"/>
+          </a:effectRef>
+          <a:fontRef idx="minor">
+            <a:schemeClr val="lt1"/>
+          </a:fontRef>
+        </p:style>
+        <p:txBody>
+          <a:bodyPr rtlCol="0" anchor="ctr"/>
+          <a:lstStyle/>
+          <a:p>
+            <a:pPr algn="ctr"/>
+            <a:endParaRPr lang="zh-CN" altLang="en-US">
+              <a:latin typeface="Times New Roman" panose="02020603050405020304" pitchFamily="18" charset="0"/>
+              <a:cs typeface="Times New Roman" panose="02020603050405020304" pitchFamily="18" charset="0"/>
+            </a:endParaRPr>
+          </a:p>
+        </p:txBody>
+      </p:sp>
+      <p:sp>
+        <p:nvSpPr>
+          <p:cNvPr id="19" name="矩形 18">
+            <a:extLst>
+              <a:ext uri="{FF2B5EF4-FFF2-40B4-BE49-F238E27FC236}">
+                <a16:creationId xmlns:a16="http://schemas.microsoft.com/office/drawing/2014/main" id="{16CF754B-D3A7-4B34-BCF8-54617A4A3EDF}"/>
+              </a:ext>
+            </a:extLst>
+          </p:cNvPr>
+          <p:cNvSpPr/>
+          <p:nvPr/>
+        </p:nvSpPr>
+        <p:spPr>
+          <a:xfrm>
+            <a:off x="1041332" y="4682223"/>
+            <a:ext cx="1633204" cy="312625"/>
+          </a:xfrm>
+          <a:prstGeom prst="rect">
+            <a:avLst/>
+          </a:prstGeom>
+          <a:solidFill>
+            <a:schemeClr val="accent4">
+              <a:lumMod val="60000"/>
+              <a:lumOff val="40000"/>
+            </a:schemeClr>
+          </a:solidFill>
+          <a:ln>
+            <a:solidFill>
+              <a:schemeClr val="tx1"/>
+            </a:solidFill>
+          </a:ln>
+        </p:spPr>
+        <p:style>
+          <a:lnRef idx="2">
+            <a:schemeClr val="accent1">
+              <a:shade val="50000"/>
+            </a:schemeClr>
+          </a:lnRef>
+          <a:fillRef idx="1">
+            <a:schemeClr val="accent1"/>
+          </a:fillRef>
+          <a:effectRef idx="0">
+            <a:schemeClr val="accent1"/>
+          </a:effectRef>
+          <a:fontRef idx="minor">
+            <a:schemeClr val="lt1"/>
+          </a:fontRef>
+        </p:style>
+        <p:txBody>
+          <a:bodyPr rtlCol="0" anchor="ctr"/>
+          <a:lstStyle/>
+          <a:p>
+            <a:pPr algn="ctr"/>
+            <a:endParaRPr lang="zh-CN" altLang="en-US">
+              <a:latin typeface="Times New Roman" panose="02020603050405020304" pitchFamily="18" charset="0"/>
+              <a:cs typeface="Times New Roman" panose="02020603050405020304" pitchFamily="18" charset="0"/>
+            </a:endParaRPr>
+          </a:p>
+        </p:txBody>
+      </p:sp>
+      <p:sp>
+        <p:nvSpPr>
+          <p:cNvPr id="20" name="矩形 19">
+            <a:extLst>
+              <a:ext uri="{FF2B5EF4-FFF2-40B4-BE49-F238E27FC236}">
+                <a16:creationId xmlns:a16="http://schemas.microsoft.com/office/drawing/2014/main" id="{A71A2DD0-4629-431D-9E92-FFA7D831B15B}"/>
+              </a:ext>
+            </a:extLst>
+          </p:cNvPr>
+          <p:cNvSpPr/>
+          <p:nvPr/>
+        </p:nvSpPr>
+        <p:spPr>
+          <a:xfrm>
+            <a:off x="1041332" y="5112128"/>
+            <a:ext cx="3750104" cy="312625"/>
+          </a:xfrm>
+          <a:prstGeom prst="rect">
+            <a:avLst/>
+          </a:prstGeom>
+          <a:solidFill>
+            <a:schemeClr val="bg2"/>
+          </a:solidFill>
+          <a:ln>
+            <a:solidFill>
+              <a:schemeClr val="tx1"/>
+            </a:solidFill>
+          </a:ln>
+        </p:spPr>
+        <p:style>
+          <a:lnRef idx="2">
+            <a:schemeClr val="accent1">
+              <a:shade val="50000"/>
+            </a:schemeClr>
+          </a:lnRef>
+          <a:fillRef idx="1">
+            <a:schemeClr val="accent1"/>
+          </a:fillRef>
+          <a:effectRef idx="0">
+            <a:schemeClr val="accent1"/>
+          </a:effectRef>
+          <a:fontRef idx="minor">
+            <a:schemeClr val="lt1"/>
+          </a:fontRef>
+        </p:style>
+        <p:txBody>
+          <a:bodyPr rtlCol="0" anchor="ctr"/>
+          <a:lstStyle/>
+          <a:p>
+            <a:pPr algn="ctr"/>
             <a:endParaRPr lang="zh-CN" altLang="en-US"/>
           </a:p>
         </p:txBody>
       </p:sp>
       <p:sp>
         <p:nvSpPr>
-          <p:cNvPr id="13" name="文本框 12">
-            <a:extLst>
-              <a:ext uri="{FF2B5EF4-FFF2-40B4-BE49-F238E27FC236}">
-                <a16:creationId xmlns:a16="http://schemas.microsoft.com/office/drawing/2014/main" id="{335C1311-FE7B-4A51-B23F-742F7B8F6BC5}"/>
+          <p:cNvPr id="25" name="矩形 24">
+            <a:extLst>
+              <a:ext uri="{FF2B5EF4-FFF2-40B4-BE49-F238E27FC236}">
+                <a16:creationId xmlns:a16="http://schemas.microsoft.com/office/drawing/2014/main" id="{751FEE64-E8BD-4DAE-8626-7666EE3F0A41}"/>
+              </a:ext>
+            </a:extLst>
+          </p:cNvPr>
+          <p:cNvSpPr/>
+          <p:nvPr/>
+        </p:nvSpPr>
+        <p:spPr>
+          <a:xfrm>
+            <a:off x="3158232" y="3520194"/>
+            <a:ext cx="1633205" cy="644886"/>
+          </a:xfrm>
+          <a:prstGeom prst="rect">
+            <a:avLst/>
+          </a:prstGeom>
+          <a:solidFill>
+            <a:schemeClr val="bg1"/>
+          </a:solidFill>
+          <a:ln>
+            <a:solidFill>
+              <a:schemeClr val="tx1"/>
+            </a:solidFill>
+          </a:ln>
+        </p:spPr>
+        <p:style>
+          <a:lnRef idx="2">
+            <a:schemeClr val="accent1">
+              <a:shade val="50000"/>
+            </a:schemeClr>
+          </a:lnRef>
+          <a:fillRef idx="1">
+            <a:schemeClr val="accent1"/>
+          </a:fillRef>
+          <a:effectRef idx="0">
+            <a:schemeClr val="accent1"/>
+          </a:effectRef>
+          <a:fontRef idx="minor">
+            <a:schemeClr val="lt1"/>
+          </a:fontRef>
+        </p:style>
+        <p:txBody>
+          <a:bodyPr rtlCol="0" anchor="ctr"/>
+          <a:lstStyle/>
+          <a:p>
+            <a:pPr algn="ctr"/>
+            <a:r>
+              <a:rPr lang="en-US" altLang="zh-CN" dirty="0">
+                <a:solidFill>
+                  <a:schemeClr val="tx1"/>
+                </a:solidFill>
+                <a:latin typeface="Times New Roman" panose="02020603050405020304" pitchFamily="18" charset="0"/>
+                <a:cs typeface="Times New Roman" panose="02020603050405020304" pitchFamily="18" charset="0"/>
+              </a:rPr>
+              <a:t>Core 2</a:t>
+            </a:r>
+            <a:endParaRPr lang="zh-CN" altLang="en-US" dirty="0">
+              <a:solidFill>
+                <a:schemeClr val="tx1"/>
+              </a:solidFill>
+              <a:latin typeface="Times New Roman" panose="02020603050405020304" pitchFamily="18" charset="0"/>
+              <a:cs typeface="Times New Roman" panose="02020603050405020304" pitchFamily="18" charset="0"/>
+            </a:endParaRPr>
+          </a:p>
+        </p:txBody>
+      </p:sp>
+      <p:sp>
+        <p:nvSpPr>
+          <p:cNvPr id="26" name="矩形 25">
+            <a:extLst>
+              <a:ext uri="{FF2B5EF4-FFF2-40B4-BE49-F238E27FC236}">
+                <a16:creationId xmlns:a16="http://schemas.microsoft.com/office/drawing/2014/main" id="{C532EB58-B8B4-432E-98FB-1A8EF7DB5B44}"/>
+              </a:ext>
+            </a:extLst>
+          </p:cNvPr>
+          <p:cNvSpPr/>
+          <p:nvPr/>
+        </p:nvSpPr>
+        <p:spPr>
+          <a:xfrm>
+            <a:off x="3158232" y="4246631"/>
+            <a:ext cx="752608" cy="312625"/>
+          </a:xfrm>
+          <a:prstGeom prst="rect">
+            <a:avLst/>
+          </a:prstGeom>
+          <a:solidFill>
+            <a:schemeClr val="accent6">
+              <a:lumMod val="60000"/>
+              <a:lumOff val="40000"/>
+            </a:schemeClr>
+          </a:solidFill>
+          <a:ln>
+            <a:solidFill>
+              <a:schemeClr val="tx1"/>
+            </a:solidFill>
+          </a:ln>
+        </p:spPr>
+        <p:style>
+          <a:lnRef idx="2">
+            <a:schemeClr val="accent1">
+              <a:shade val="50000"/>
+            </a:schemeClr>
+          </a:lnRef>
+          <a:fillRef idx="1">
+            <a:schemeClr val="accent1"/>
+          </a:fillRef>
+          <a:effectRef idx="0">
+            <a:schemeClr val="accent1"/>
+          </a:effectRef>
+          <a:fontRef idx="minor">
+            <a:schemeClr val="lt1"/>
+          </a:fontRef>
+        </p:style>
+        <p:txBody>
+          <a:bodyPr rtlCol="0" anchor="ctr"/>
+          <a:lstStyle/>
+          <a:p>
+            <a:pPr algn="ctr"/>
+            <a:endParaRPr lang="zh-CN" altLang="en-US">
+              <a:latin typeface="Times New Roman" panose="02020603050405020304" pitchFamily="18" charset="0"/>
+              <a:cs typeface="Times New Roman" panose="02020603050405020304" pitchFamily="18" charset="0"/>
+            </a:endParaRPr>
+          </a:p>
+        </p:txBody>
+      </p:sp>
+      <p:sp>
+        <p:nvSpPr>
+          <p:cNvPr id="27" name="矩形 26">
+            <a:extLst>
+              <a:ext uri="{FF2B5EF4-FFF2-40B4-BE49-F238E27FC236}">
+                <a16:creationId xmlns:a16="http://schemas.microsoft.com/office/drawing/2014/main" id="{32F72BF6-E048-49CE-9D44-DABFEAF41371}"/>
+              </a:ext>
+            </a:extLst>
+          </p:cNvPr>
+          <p:cNvSpPr/>
+          <p:nvPr/>
+        </p:nvSpPr>
+        <p:spPr>
+          <a:xfrm>
+            <a:off x="4038829" y="4246631"/>
+            <a:ext cx="752608" cy="312625"/>
+          </a:xfrm>
+          <a:prstGeom prst="rect">
+            <a:avLst/>
+          </a:prstGeom>
+          <a:solidFill>
+            <a:schemeClr val="accent6">
+              <a:lumMod val="60000"/>
+              <a:lumOff val="40000"/>
+            </a:schemeClr>
+          </a:solidFill>
+          <a:ln>
+            <a:solidFill>
+              <a:schemeClr val="tx1"/>
+            </a:solidFill>
+          </a:ln>
+        </p:spPr>
+        <p:style>
+          <a:lnRef idx="2">
+            <a:schemeClr val="accent1">
+              <a:shade val="50000"/>
+            </a:schemeClr>
+          </a:lnRef>
+          <a:fillRef idx="1">
+            <a:schemeClr val="accent1"/>
+          </a:fillRef>
+          <a:effectRef idx="0">
+            <a:schemeClr val="accent1"/>
+          </a:effectRef>
+          <a:fontRef idx="minor">
+            <a:schemeClr val="lt1"/>
+          </a:fontRef>
+        </p:style>
+        <p:txBody>
+          <a:bodyPr rtlCol="0" anchor="ctr"/>
+          <a:lstStyle/>
+          <a:p>
+            <a:pPr algn="ctr"/>
+            <a:endParaRPr lang="zh-CN" altLang="en-US">
+              <a:latin typeface="Times New Roman" panose="02020603050405020304" pitchFamily="18" charset="0"/>
+              <a:cs typeface="Times New Roman" panose="02020603050405020304" pitchFamily="18" charset="0"/>
+            </a:endParaRPr>
+          </a:p>
+        </p:txBody>
+      </p:sp>
+      <p:sp>
+        <p:nvSpPr>
+          <p:cNvPr id="28" name="矩形 27">
+            <a:extLst>
+              <a:ext uri="{FF2B5EF4-FFF2-40B4-BE49-F238E27FC236}">
+                <a16:creationId xmlns:a16="http://schemas.microsoft.com/office/drawing/2014/main" id="{8307DC03-FDC9-4A5A-96A7-B3F854FFDBC7}"/>
+              </a:ext>
+            </a:extLst>
+          </p:cNvPr>
+          <p:cNvSpPr/>
+          <p:nvPr/>
+        </p:nvSpPr>
+        <p:spPr>
+          <a:xfrm>
+            <a:off x="3158232" y="4676536"/>
+            <a:ext cx="1633204" cy="312625"/>
+          </a:xfrm>
+          <a:prstGeom prst="rect">
+            <a:avLst/>
+          </a:prstGeom>
+          <a:solidFill>
+            <a:schemeClr val="accent4">
+              <a:lumMod val="60000"/>
+              <a:lumOff val="40000"/>
+            </a:schemeClr>
+          </a:solidFill>
+          <a:ln>
+            <a:solidFill>
+              <a:schemeClr val="tx1"/>
+            </a:solidFill>
+          </a:ln>
+        </p:spPr>
+        <p:style>
+          <a:lnRef idx="2">
+            <a:schemeClr val="accent1">
+              <a:shade val="50000"/>
+            </a:schemeClr>
+          </a:lnRef>
+          <a:fillRef idx="1">
+            <a:schemeClr val="accent1"/>
+          </a:fillRef>
+          <a:effectRef idx="0">
+            <a:schemeClr val="accent1"/>
+          </a:effectRef>
+          <a:fontRef idx="minor">
+            <a:schemeClr val="lt1"/>
+          </a:fontRef>
+        </p:style>
+        <p:txBody>
+          <a:bodyPr rtlCol="0" anchor="ctr"/>
+          <a:lstStyle/>
+          <a:p>
+            <a:pPr algn="ctr"/>
+            <a:endParaRPr lang="zh-CN" altLang="en-US">
+              <a:latin typeface="Times New Roman" panose="02020603050405020304" pitchFamily="18" charset="0"/>
+              <a:cs typeface="Times New Roman" panose="02020603050405020304" pitchFamily="18" charset="0"/>
+            </a:endParaRPr>
+          </a:p>
+        </p:txBody>
+      </p:sp>
+      <p:sp>
+        <p:nvSpPr>
+          <p:cNvPr id="6" name="文本框 5">
+            <a:extLst>
+              <a:ext uri="{FF2B5EF4-FFF2-40B4-BE49-F238E27FC236}">
+                <a16:creationId xmlns:a16="http://schemas.microsoft.com/office/drawing/2014/main" id="{D51619F9-9EAE-4020-8973-D1CC6E1A0733}"/>
               </a:ext>
             </a:extLst>
           </p:cNvPr>
@@ -12546,8 +13298,8 @@
         </p:nvSpPr>
         <p:spPr>
           <a:xfrm>
-            <a:off x="2580437" y="1155701"/>
-            <a:ext cx="1384300" cy="369332"/>
+            <a:off x="523265" y="4184230"/>
+            <a:ext cx="441277" cy="369332"/>
           </a:xfrm>
           <a:prstGeom prst="rect">
             <a:avLst/>
@@ -12561,11 +13313,662 @@
           <a:lstStyle/>
           <a:p>
             <a:r>
+              <a:rPr lang="en-US" altLang="zh-CN" dirty="0">
+                <a:latin typeface="Times New Roman" panose="02020603050405020304" pitchFamily="18" charset="0"/>
+                <a:cs typeface="Times New Roman" panose="02020603050405020304" pitchFamily="18" charset="0"/>
+              </a:rPr>
+              <a:t>L1</a:t>
+            </a:r>
+            <a:endParaRPr lang="zh-CN" altLang="en-US" dirty="0">
+              <a:latin typeface="Times New Roman" panose="02020603050405020304" pitchFamily="18" charset="0"/>
+              <a:cs typeface="Times New Roman" panose="02020603050405020304" pitchFamily="18" charset="0"/>
+            </a:endParaRPr>
+          </a:p>
+        </p:txBody>
+      </p:sp>
+      <p:sp>
+        <p:nvSpPr>
+          <p:cNvPr id="29" name="文本框 28">
+            <a:extLst>
+              <a:ext uri="{FF2B5EF4-FFF2-40B4-BE49-F238E27FC236}">
+                <a16:creationId xmlns:a16="http://schemas.microsoft.com/office/drawing/2014/main" id="{1815CD1C-3331-4FBD-9ECF-6C22ED3A3C1E}"/>
+              </a:ext>
+            </a:extLst>
+          </p:cNvPr>
+          <p:cNvSpPr txBox="1"/>
+          <p:nvPr/>
+        </p:nvSpPr>
+        <p:spPr>
+          <a:xfrm>
+            <a:off x="523265" y="4648182"/>
+            <a:ext cx="441277" cy="369332"/>
+          </a:xfrm>
+          <a:prstGeom prst="rect">
+            <a:avLst/>
+          </a:prstGeom>
+          <a:noFill/>
+        </p:spPr>
+        <p:txBody>
+          <a:bodyPr wrap="square" rtlCol="0">
+            <a:spAutoFit/>
+          </a:bodyPr>
+          <a:lstStyle/>
+          <a:p>
+            <a:r>
+              <a:rPr lang="en-US" altLang="zh-CN" dirty="0">
+                <a:latin typeface="Times New Roman" panose="02020603050405020304" pitchFamily="18" charset="0"/>
+                <a:cs typeface="Times New Roman" panose="02020603050405020304" pitchFamily="18" charset="0"/>
+              </a:rPr>
+              <a:t>L2</a:t>
+            </a:r>
+            <a:endParaRPr lang="zh-CN" altLang="en-US" dirty="0">
+              <a:latin typeface="Times New Roman" panose="02020603050405020304" pitchFamily="18" charset="0"/>
+              <a:cs typeface="Times New Roman" panose="02020603050405020304" pitchFamily="18" charset="0"/>
+            </a:endParaRPr>
+          </a:p>
+        </p:txBody>
+      </p:sp>
+      <p:sp>
+        <p:nvSpPr>
+          <p:cNvPr id="30" name="文本框 29">
+            <a:extLst>
+              <a:ext uri="{FF2B5EF4-FFF2-40B4-BE49-F238E27FC236}">
+                <a16:creationId xmlns:a16="http://schemas.microsoft.com/office/drawing/2014/main" id="{4AF2FA16-7CF0-44AE-AFCF-B89E9C98D3B5}"/>
+              </a:ext>
+            </a:extLst>
+          </p:cNvPr>
+          <p:cNvSpPr txBox="1"/>
+          <p:nvPr/>
+        </p:nvSpPr>
+        <p:spPr>
+          <a:xfrm>
+            <a:off x="523265" y="5096627"/>
+            <a:ext cx="441277" cy="369332"/>
+          </a:xfrm>
+          <a:prstGeom prst="rect">
+            <a:avLst/>
+          </a:prstGeom>
+          <a:noFill/>
+        </p:spPr>
+        <p:txBody>
+          <a:bodyPr wrap="square" rtlCol="0">
+            <a:spAutoFit/>
+          </a:bodyPr>
+          <a:lstStyle/>
+          <a:p>
+            <a:r>
+              <a:rPr lang="en-US" altLang="zh-CN" dirty="0">
+                <a:latin typeface="Times New Roman" panose="02020603050405020304" pitchFamily="18" charset="0"/>
+                <a:cs typeface="Times New Roman" panose="02020603050405020304" pitchFamily="18" charset="0"/>
+              </a:rPr>
+              <a:t>L3</a:t>
+            </a:r>
+            <a:endParaRPr lang="zh-CN" altLang="en-US" dirty="0">
+              <a:latin typeface="Times New Roman" panose="02020603050405020304" pitchFamily="18" charset="0"/>
+              <a:cs typeface="Times New Roman" panose="02020603050405020304" pitchFamily="18" charset="0"/>
+            </a:endParaRPr>
+          </a:p>
+        </p:txBody>
+      </p:sp>
+      <p:sp>
+        <p:nvSpPr>
+          <p:cNvPr id="7" name="矩形 6">
+            <a:extLst>
+              <a:ext uri="{FF2B5EF4-FFF2-40B4-BE49-F238E27FC236}">
+                <a16:creationId xmlns:a16="http://schemas.microsoft.com/office/drawing/2014/main" id="{7B70CB58-F1AF-4FD8-9CEF-EBCE616B1DE6}"/>
+              </a:ext>
+            </a:extLst>
+          </p:cNvPr>
+          <p:cNvSpPr/>
+          <p:nvPr/>
+        </p:nvSpPr>
+        <p:spPr>
+          <a:xfrm>
+            <a:off x="2682095" y="5162150"/>
+            <a:ext cx="222914" cy="212581"/>
+          </a:xfrm>
+          <a:prstGeom prst="rect">
+            <a:avLst/>
+          </a:prstGeom>
+          <a:solidFill>
+            <a:schemeClr val="bg1"/>
+          </a:solidFill>
+          <a:ln>
+            <a:solidFill>
+              <a:schemeClr val="tx1"/>
+            </a:solidFill>
+          </a:ln>
+        </p:spPr>
+        <p:style>
+          <a:lnRef idx="2">
+            <a:schemeClr val="accent1">
+              <a:shade val="50000"/>
+            </a:schemeClr>
+          </a:lnRef>
+          <a:fillRef idx="1">
+            <a:schemeClr val="accent1"/>
+          </a:fillRef>
+          <a:effectRef idx="0">
+            <a:schemeClr val="accent1"/>
+          </a:effectRef>
+          <a:fontRef idx="minor">
+            <a:schemeClr val="lt1"/>
+          </a:fontRef>
+        </p:style>
+        <p:txBody>
+          <a:bodyPr rtlCol="0" anchor="ctr"/>
+          <a:lstStyle/>
+          <a:p>
+            <a:pPr algn="ctr"/>
+            <a:r>
+              <a:rPr lang="en-US" altLang="zh-CN" dirty="0">
+                <a:solidFill>
+                  <a:schemeClr val="tx1"/>
+                </a:solidFill>
+                <a:latin typeface="Times New Roman" panose="02020603050405020304" pitchFamily="18" charset="0"/>
+                <a:cs typeface="Times New Roman" panose="02020603050405020304" pitchFamily="18" charset="0"/>
+              </a:rPr>
+              <a:t>X</a:t>
+            </a:r>
+            <a:endParaRPr lang="zh-CN" altLang="en-US" dirty="0">
+              <a:solidFill>
+                <a:schemeClr val="tx1"/>
+              </a:solidFill>
+              <a:latin typeface="Times New Roman" panose="02020603050405020304" pitchFamily="18" charset="0"/>
+              <a:cs typeface="Times New Roman" panose="02020603050405020304" pitchFamily="18" charset="0"/>
+            </a:endParaRPr>
+          </a:p>
+        </p:txBody>
+      </p:sp>
+      <p:sp>
+        <p:nvSpPr>
+          <p:cNvPr id="31" name="矩形 30">
+            <a:extLst>
+              <a:ext uri="{FF2B5EF4-FFF2-40B4-BE49-F238E27FC236}">
+                <a16:creationId xmlns:a16="http://schemas.microsoft.com/office/drawing/2014/main" id="{D62D695E-2727-4436-BC25-BF110E919D66}"/>
+              </a:ext>
+            </a:extLst>
+          </p:cNvPr>
+          <p:cNvSpPr/>
+          <p:nvPr/>
+        </p:nvSpPr>
+        <p:spPr>
+          <a:xfrm>
+            <a:off x="2905009" y="5162150"/>
+            <a:ext cx="222914" cy="212581"/>
+          </a:xfrm>
+          <a:prstGeom prst="rect">
+            <a:avLst/>
+          </a:prstGeom>
+          <a:solidFill>
+            <a:schemeClr val="bg1"/>
+          </a:solidFill>
+          <a:ln>
+            <a:solidFill>
+              <a:schemeClr val="tx1"/>
+            </a:solidFill>
+          </a:ln>
+        </p:spPr>
+        <p:style>
+          <a:lnRef idx="2">
+            <a:schemeClr val="accent1">
+              <a:shade val="50000"/>
+            </a:schemeClr>
+          </a:lnRef>
+          <a:fillRef idx="1">
+            <a:schemeClr val="accent1"/>
+          </a:fillRef>
+          <a:effectRef idx="0">
+            <a:schemeClr val="accent1"/>
+          </a:effectRef>
+          <a:fontRef idx="minor">
+            <a:schemeClr val="lt1"/>
+          </a:fontRef>
+        </p:style>
+        <p:txBody>
+          <a:bodyPr rtlCol="0" anchor="ctr"/>
+          <a:lstStyle/>
+          <a:p>
+            <a:pPr algn="ctr"/>
+            <a:r>
+              <a:rPr lang="en-US" altLang="zh-CN" dirty="0">
+                <a:solidFill>
+                  <a:schemeClr val="tx1"/>
+                </a:solidFill>
+                <a:latin typeface="Times New Roman" panose="02020603050405020304" pitchFamily="18" charset="0"/>
+                <a:cs typeface="Times New Roman" panose="02020603050405020304" pitchFamily="18" charset="0"/>
+              </a:rPr>
+              <a:t>Y</a:t>
+            </a:r>
+            <a:endParaRPr lang="zh-CN" altLang="en-US" dirty="0">
+              <a:solidFill>
+                <a:schemeClr val="tx1"/>
+              </a:solidFill>
+              <a:latin typeface="Times New Roman" panose="02020603050405020304" pitchFamily="18" charset="0"/>
+              <a:cs typeface="Times New Roman" panose="02020603050405020304" pitchFamily="18" charset="0"/>
+            </a:endParaRPr>
+          </a:p>
+        </p:txBody>
+      </p:sp>
+      <p:cxnSp>
+        <p:nvCxnSpPr>
+          <p:cNvPr id="10" name="连接符: 曲线 9">
+            <a:extLst>
+              <a:ext uri="{FF2B5EF4-FFF2-40B4-BE49-F238E27FC236}">
+                <a16:creationId xmlns:a16="http://schemas.microsoft.com/office/drawing/2014/main" id="{B7A4025B-5860-4B1E-BB6D-A3C88300A50D}"/>
+              </a:ext>
+            </a:extLst>
+          </p:cNvPr>
+          <p:cNvCxnSpPr>
+            <a:cxnSpLocks/>
+            <a:endCxn id="7" idx="0"/>
+          </p:cNvCxnSpPr>
+          <p:nvPr/>
+        </p:nvCxnSpPr>
+        <p:spPr>
+          <a:xfrm rot="16200000" flipH="1">
+            <a:off x="2070117" y="4438715"/>
+            <a:ext cx="1308920" cy="137949"/>
+          </a:xfrm>
+          <a:prstGeom prst="curvedConnector3">
+            <a:avLst>
+              <a:gd name="adj1" fmla="val 994"/>
+            </a:avLst>
+          </a:prstGeom>
+          <a:ln w="25400">
+            <a:solidFill>
+              <a:schemeClr val="tx1"/>
+            </a:solidFill>
+            <a:tailEnd type="triangle"/>
+          </a:ln>
+        </p:spPr>
+        <p:style>
+          <a:lnRef idx="1">
+            <a:schemeClr val="accent1"/>
+          </a:lnRef>
+          <a:fillRef idx="0">
+            <a:schemeClr val="accent1"/>
+          </a:fillRef>
+          <a:effectRef idx="0">
+            <a:schemeClr val="accent1"/>
+          </a:effectRef>
+          <a:fontRef idx="minor">
+            <a:schemeClr val="tx1"/>
+          </a:fontRef>
+        </p:style>
+      </p:cxnSp>
+      <p:cxnSp>
+        <p:nvCxnSpPr>
+          <p:cNvPr id="34" name="连接符: 曲线 33">
+            <a:extLst>
+              <a:ext uri="{FF2B5EF4-FFF2-40B4-BE49-F238E27FC236}">
+                <a16:creationId xmlns:a16="http://schemas.microsoft.com/office/drawing/2014/main" id="{BCBB9A88-A940-4527-BDC0-AD40B36488B3}"/>
+              </a:ext>
+            </a:extLst>
+          </p:cNvPr>
+          <p:cNvCxnSpPr>
+            <a:cxnSpLocks/>
+            <a:stCxn id="25" idx="1"/>
+            <a:endCxn id="31" idx="0"/>
+          </p:cNvCxnSpPr>
+          <p:nvPr/>
+        </p:nvCxnSpPr>
+        <p:spPr>
+          <a:xfrm rot="10800000" flipV="1">
+            <a:off x="3016466" y="3842636"/>
+            <a:ext cx="141766" cy="1319513"/>
+          </a:xfrm>
+          <a:prstGeom prst="curvedConnector2">
+            <a:avLst/>
+          </a:prstGeom>
+          <a:ln w="25400">
+            <a:solidFill>
+              <a:schemeClr val="tx1"/>
+            </a:solidFill>
+            <a:tailEnd type="triangle"/>
+          </a:ln>
+        </p:spPr>
+        <p:style>
+          <a:lnRef idx="1">
+            <a:schemeClr val="accent1"/>
+          </a:lnRef>
+          <a:fillRef idx="0">
+            <a:schemeClr val="accent1"/>
+          </a:fillRef>
+          <a:effectRef idx="0">
+            <a:schemeClr val="accent1"/>
+          </a:effectRef>
+          <a:fontRef idx="minor">
+            <a:schemeClr val="tx1"/>
+          </a:fontRef>
+        </p:style>
+      </p:cxnSp>
+      <p:sp>
+        <p:nvSpPr>
+          <p:cNvPr id="38" name="矩形 37">
+            <a:extLst>
+              <a:ext uri="{FF2B5EF4-FFF2-40B4-BE49-F238E27FC236}">
+                <a16:creationId xmlns:a16="http://schemas.microsoft.com/office/drawing/2014/main" id="{EF258188-77C7-4B20-AEAD-578840F222B2}"/>
+              </a:ext>
+            </a:extLst>
+          </p:cNvPr>
+          <p:cNvSpPr/>
+          <p:nvPr/>
+        </p:nvSpPr>
+        <p:spPr>
+          <a:xfrm>
+            <a:off x="3851819" y="4731773"/>
+            <a:ext cx="222914" cy="212581"/>
+          </a:xfrm>
+          <a:prstGeom prst="rect">
+            <a:avLst/>
+          </a:prstGeom>
+          <a:solidFill>
+            <a:schemeClr val="accent5">
+              <a:lumMod val="60000"/>
+              <a:lumOff val="40000"/>
+            </a:schemeClr>
+          </a:solidFill>
+          <a:ln>
+            <a:solidFill>
+              <a:schemeClr val="tx1"/>
+            </a:solidFill>
+          </a:ln>
+        </p:spPr>
+        <p:style>
+          <a:lnRef idx="2">
+            <a:schemeClr val="accent1">
+              <a:shade val="50000"/>
+            </a:schemeClr>
+          </a:lnRef>
+          <a:fillRef idx="1">
+            <a:schemeClr val="accent1"/>
+          </a:fillRef>
+          <a:effectRef idx="0">
+            <a:schemeClr val="accent1"/>
+          </a:effectRef>
+          <a:fontRef idx="minor">
+            <a:schemeClr val="lt1"/>
+          </a:fontRef>
+        </p:style>
+        <p:txBody>
+          <a:bodyPr rtlCol="0" anchor="ctr"/>
+          <a:lstStyle/>
+          <a:p>
+            <a:pPr algn="ctr"/>
+            <a:r>
+              <a:rPr lang="en-US" altLang="zh-CN" dirty="0">
+                <a:solidFill>
+                  <a:schemeClr val="tx1"/>
+                </a:solidFill>
+                <a:latin typeface="Times New Roman" panose="02020603050405020304" pitchFamily="18" charset="0"/>
+                <a:cs typeface="Times New Roman" panose="02020603050405020304" pitchFamily="18" charset="0"/>
+              </a:rPr>
+              <a:t>X</a:t>
+            </a:r>
+            <a:endParaRPr lang="zh-CN" altLang="en-US" dirty="0">
+              <a:solidFill>
+                <a:schemeClr val="tx1"/>
+              </a:solidFill>
+              <a:latin typeface="Times New Roman" panose="02020603050405020304" pitchFamily="18" charset="0"/>
+              <a:cs typeface="Times New Roman" panose="02020603050405020304" pitchFamily="18" charset="0"/>
+            </a:endParaRPr>
+          </a:p>
+        </p:txBody>
+      </p:sp>
+      <p:sp>
+        <p:nvSpPr>
+          <p:cNvPr id="39" name="矩形 38">
+            <a:extLst>
+              <a:ext uri="{FF2B5EF4-FFF2-40B4-BE49-F238E27FC236}">
+                <a16:creationId xmlns:a16="http://schemas.microsoft.com/office/drawing/2014/main" id="{C0CCB702-7C55-4869-B4C1-1F9B5FA18093}"/>
+              </a:ext>
+            </a:extLst>
+          </p:cNvPr>
+          <p:cNvSpPr/>
+          <p:nvPr/>
+        </p:nvSpPr>
+        <p:spPr>
+          <a:xfrm>
+            <a:off x="1749241" y="4732164"/>
+            <a:ext cx="222914" cy="212581"/>
+          </a:xfrm>
+          <a:prstGeom prst="rect">
+            <a:avLst/>
+          </a:prstGeom>
+          <a:solidFill>
+            <a:schemeClr val="accent5">
+              <a:lumMod val="60000"/>
+              <a:lumOff val="40000"/>
+            </a:schemeClr>
+          </a:solidFill>
+          <a:ln>
+            <a:solidFill>
+              <a:schemeClr val="tx1"/>
+            </a:solidFill>
+          </a:ln>
+        </p:spPr>
+        <p:style>
+          <a:lnRef idx="2">
+            <a:schemeClr val="accent1">
+              <a:shade val="50000"/>
+            </a:schemeClr>
+          </a:lnRef>
+          <a:fillRef idx="1">
+            <a:schemeClr val="accent1"/>
+          </a:fillRef>
+          <a:effectRef idx="0">
+            <a:schemeClr val="accent1"/>
+          </a:effectRef>
+          <a:fontRef idx="minor">
+            <a:schemeClr val="lt1"/>
+          </a:fontRef>
+        </p:style>
+        <p:txBody>
+          <a:bodyPr rtlCol="0" anchor="ctr"/>
+          <a:lstStyle/>
+          <a:p>
+            <a:pPr algn="ctr"/>
+            <a:r>
+              <a:rPr lang="en-US" altLang="zh-CN" dirty="0">
+                <a:solidFill>
+                  <a:schemeClr val="tx1"/>
+                </a:solidFill>
+                <a:latin typeface="Times New Roman" panose="02020603050405020304" pitchFamily="18" charset="0"/>
+                <a:cs typeface="Times New Roman" panose="02020603050405020304" pitchFamily="18" charset="0"/>
+              </a:rPr>
+              <a:t>Y</a:t>
+            </a:r>
+            <a:endParaRPr lang="zh-CN" altLang="en-US" dirty="0">
+              <a:solidFill>
+                <a:schemeClr val="tx1"/>
+              </a:solidFill>
+              <a:latin typeface="Times New Roman" panose="02020603050405020304" pitchFamily="18" charset="0"/>
+              <a:cs typeface="Times New Roman" panose="02020603050405020304" pitchFamily="18" charset="0"/>
+            </a:endParaRPr>
+          </a:p>
+        </p:txBody>
+      </p:sp>
+      <p:sp>
+        <p:nvSpPr>
+          <p:cNvPr id="40" name="矩形 39">
+            <a:extLst>
+              <a:ext uri="{FF2B5EF4-FFF2-40B4-BE49-F238E27FC236}">
+                <a16:creationId xmlns:a16="http://schemas.microsoft.com/office/drawing/2014/main" id="{B1A79364-F8AF-456C-8140-AEEACCBB9D8B}"/>
+              </a:ext>
+            </a:extLst>
+          </p:cNvPr>
+          <p:cNvSpPr/>
+          <p:nvPr/>
+        </p:nvSpPr>
+        <p:spPr>
+          <a:xfrm>
+            <a:off x="4302655" y="4303358"/>
+            <a:ext cx="222914" cy="212581"/>
+          </a:xfrm>
+          <a:prstGeom prst="rect">
+            <a:avLst/>
+          </a:prstGeom>
+          <a:solidFill>
+            <a:schemeClr val="accent5">
+              <a:lumMod val="60000"/>
+              <a:lumOff val="40000"/>
+            </a:schemeClr>
+          </a:solidFill>
+          <a:ln>
+            <a:solidFill>
+              <a:schemeClr val="tx1"/>
+            </a:solidFill>
+          </a:ln>
+        </p:spPr>
+        <p:style>
+          <a:lnRef idx="2">
+            <a:schemeClr val="accent1">
+              <a:shade val="50000"/>
+            </a:schemeClr>
+          </a:lnRef>
+          <a:fillRef idx="1">
+            <a:schemeClr val="accent1"/>
+          </a:fillRef>
+          <a:effectRef idx="0">
+            <a:schemeClr val="accent1"/>
+          </a:effectRef>
+          <a:fontRef idx="minor">
+            <a:schemeClr val="lt1"/>
+          </a:fontRef>
+        </p:style>
+        <p:txBody>
+          <a:bodyPr rtlCol="0" anchor="ctr"/>
+          <a:lstStyle/>
+          <a:p>
+            <a:pPr algn="ctr"/>
+            <a:r>
+              <a:rPr lang="en-US" altLang="zh-CN" dirty="0">
+                <a:solidFill>
+                  <a:schemeClr val="tx1"/>
+                </a:solidFill>
+                <a:latin typeface="Times New Roman" panose="02020603050405020304" pitchFamily="18" charset="0"/>
+                <a:cs typeface="Times New Roman" panose="02020603050405020304" pitchFamily="18" charset="0"/>
+              </a:rPr>
+              <a:t>X</a:t>
+            </a:r>
+            <a:endParaRPr lang="zh-CN" altLang="en-US" dirty="0">
+              <a:solidFill>
+                <a:schemeClr val="tx1"/>
+              </a:solidFill>
+              <a:latin typeface="Times New Roman" panose="02020603050405020304" pitchFamily="18" charset="0"/>
+              <a:cs typeface="Times New Roman" panose="02020603050405020304" pitchFamily="18" charset="0"/>
+            </a:endParaRPr>
+          </a:p>
+        </p:txBody>
+      </p:sp>
+      <p:sp>
+        <p:nvSpPr>
+          <p:cNvPr id="41" name="矩形 40">
+            <a:extLst>
+              <a:ext uri="{FF2B5EF4-FFF2-40B4-BE49-F238E27FC236}">
+                <a16:creationId xmlns:a16="http://schemas.microsoft.com/office/drawing/2014/main" id="{F8A84C4F-95E5-4E9F-B8C0-5BC0B7AC76ED}"/>
+              </a:ext>
+            </a:extLst>
+          </p:cNvPr>
+          <p:cNvSpPr/>
+          <p:nvPr/>
+        </p:nvSpPr>
+        <p:spPr>
+          <a:xfrm>
+            <a:off x="2186776" y="4301868"/>
+            <a:ext cx="222914" cy="212581"/>
+          </a:xfrm>
+          <a:prstGeom prst="rect">
+            <a:avLst/>
+          </a:prstGeom>
+          <a:solidFill>
+            <a:schemeClr val="accent5">
+              <a:lumMod val="60000"/>
+              <a:lumOff val="40000"/>
+            </a:schemeClr>
+          </a:solidFill>
+          <a:ln>
+            <a:solidFill>
+              <a:schemeClr val="tx1"/>
+            </a:solidFill>
+          </a:ln>
+        </p:spPr>
+        <p:style>
+          <a:lnRef idx="2">
+            <a:schemeClr val="accent1">
+              <a:shade val="50000"/>
+            </a:schemeClr>
+          </a:lnRef>
+          <a:fillRef idx="1">
+            <a:schemeClr val="accent1"/>
+          </a:fillRef>
+          <a:effectRef idx="0">
+            <a:schemeClr val="accent1"/>
+          </a:effectRef>
+          <a:fontRef idx="minor">
+            <a:schemeClr val="lt1"/>
+          </a:fontRef>
+        </p:style>
+        <p:txBody>
+          <a:bodyPr rtlCol="0" anchor="ctr"/>
+          <a:lstStyle/>
+          <a:p>
+            <a:pPr algn="ctr"/>
+            <a:r>
+              <a:rPr lang="en-US" altLang="zh-CN" dirty="0">
+                <a:solidFill>
+                  <a:schemeClr val="tx1"/>
+                </a:solidFill>
+                <a:latin typeface="Times New Roman" panose="02020603050405020304" pitchFamily="18" charset="0"/>
+                <a:cs typeface="Times New Roman" panose="02020603050405020304" pitchFamily="18" charset="0"/>
+              </a:rPr>
+              <a:t>Y</a:t>
+            </a:r>
+            <a:endParaRPr lang="zh-CN" altLang="en-US" dirty="0">
+              <a:solidFill>
+                <a:schemeClr val="tx1"/>
+              </a:solidFill>
+              <a:latin typeface="Times New Roman" panose="02020603050405020304" pitchFamily="18" charset="0"/>
+              <a:cs typeface="Times New Roman" panose="02020603050405020304" pitchFamily="18" charset="0"/>
+            </a:endParaRPr>
+          </a:p>
+        </p:txBody>
+      </p:sp>
+      <p:sp>
+        <p:nvSpPr>
+          <p:cNvPr id="42" name="文本框 41">
+            <a:extLst>
+              <a:ext uri="{FF2B5EF4-FFF2-40B4-BE49-F238E27FC236}">
+                <a16:creationId xmlns:a16="http://schemas.microsoft.com/office/drawing/2014/main" id="{D5BE2E32-A6E0-4264-AD00-4FECF14DAC85}"/>
+              </a:ext>
+            </a:extLst>
+          </p:cNvPr>
+          <p:cNvSpPr txBox="1"/>
+          <p:nvPr/>
+        </p:nvSpPr>
+        <p:spPr>
+          <a:xfrm>
+            <a:off x="1417636" y="5701049"/>
+            <a:ext cx="2775045" cy="369332"/>
+          </a:xfrm>
+          <a:prstGeom prst="rect">
+            <a:avLst/>
+          </a:prstGeom>
+          <a:noFill/>
+        </p:spPr>
+        <p:txBody>
+          <a:bodyPr wrap="square" rtlCol="0">
+            <a:spAutoFit/>
+          </a:bodyPr>
+          <a:lstStyle/>
+          <a:p>
+            <a:r>
               <a:rPr lang="en-US" altLang="zh-CN" b="1" dirty="0">
                 <a:latin typeface="Times New Roman" panose="02020603050405020304" pitchFamily="18" charset="0"/>
                 <a:cs typeface="Times New Roman" panose="02020603050405020304" pitchFamily="18" charset="0"/>
               </a:rPr>
-              <a:t>Advantages</a:t>
+              <a:t>Frequent L2 cache refresh</a:t>
             </a:r>
             <a:endParaRPr lang="zh-CN" altLang="en-US" b="1" dirty="0">
               <a:latin typeface="Times New Roman" panose="02020603050405020304" pitchFamily="18" charset="0"/>
@@ -12574,129 +13977,48 @@
           </a:p>
         </p:txBody>
       </p:sp>
-      <p:sp>
-        <p:nvSpPr>
-          <p:cNvPr id="14" name="文本框 13">
-            <a:extLst>
-              <a:ext uri="{FF2B5EF4-FFF2-40B4-BE49-F238E27FC236}">
-                <a16:creationId xmlns:a16="http://schemas.microsoft.com/office/drawing/2014/main" id="{70E254BB-4F47-483F-A76D-F532797C326B}"/>
-              </a:ext>
-            </a:extLst>
-          </p:cNvPr>
-          <p:cNvSpPr txBox="1"/>
+      <p:cxnSp>
+        <p:nvCxnSpPr>
+          <p:cNvPr id="44" name="直接箭头连接符 43">
+            <a:extLst>
+              <a:ext uri="{FF2B5EF4-FFF2-40B4-BE49-F238E27FC236}">
+                <a16:creationId xmlns:a16="http://schemas.microsoft.com/office/drawing/2014/main" id="{E2CE90C6-70DE-4F95-8295-CD22C56093D2}"/>
+              </a:ext>
+            </a:extLst>
+          </p:cNvPr>
+          <p:cNvCxnSpPr/>
           <p:nvPr/>
-        </p:nvSpPr>
-        <p:spPr>
-          <a:xfrm>
-            <a:off x="8187487" y="1155701"/>
-            <a:ext cx="1384300" cy="369332"/>
-          </a:xfrm>
-          <a:prstGeom prst="rect">
+        </p:nvCxnSpPr>
+        <p:spPr>
+          <a:xfrm flipH="1">
+            <a:off x="5036024" y="3853229"/>
+            <a:ext cx="1110018" cy="448639"/>
+          </a:xfrm>
+          <a:prstGeom prst="straightConnector1">
             <a:avLst/>
           </a:prstGeom>
-          <a:noFill/>
-        </p:spPr>
-        <p:txBody>
-          <a:bodyPr wrap="square" rtlCol="0">
-            <a:spAutoFit/>
-          </a:bodyPr>
-          <a:lstStyle/>
-          <a:p>
-            <a:r>
-              <a:rPr lang="en-US" altLang="zh-CN" b="1" dirty="0">
-                <a:latin typeface="Times New Roman" panose="02020603050405020304" pitchFamily="18" charset="0"/>
-                <a:cs typeface="Times New Roman" panose="02020603050405020304" pitchFamily="18" charset="0"/>
-              </a:rPr>
-              <a:t>Drawbacks</a:t>
-            </a:r>
-            <a:endParaRPr lang="zh-CN" altLang="en-US" b="1" dirty="0">
-              <a:latin typeface="Times New Roman" panose="02020603050405020304" pitchFamily="18" charset="0"/>
-              <a:cs typeface="Times New Roman" panose="02020603050405020304" pitchFamily="18" charset="0"/>
-            </a:endParaRPr>
-          </a:p>
-        </p:txBody>
-      </p:sp>
-      <p:sp>
-        <p:nvSpPr>
-          <p:cNvPr id="15" name="文本框 14">
-            <a:extLst>
-              <a:ext uri="{FF2B5EF4-FFF2-40B4-BE49-F238E27FC236}">
-                <a16:creationId xmlns:a16="http://schemas.microsoft.com/office/drawing/2014/main" id="{2D111850-5C68-4C26-9857-8EB96F90CA1B}"/>
-              </a:ext>
-            </a:extLst>
-          </p:cNvPr>
-          <p:cNvSpPr txBox="1"/>
-          <p:nvPr/>
-        </p:nvSpPr>
-        <p:spPr>
-          <a:xfrm>
-            <a:off x="1162050" y="1847850"/>
-            <a:ext cx="4133850" cy="1537409"/>
-          </a:xfrm>
-          <a:prstGeom prst="rect">
-            <a:avLst/>
-          </a:prstGeom>
-          <a:noFill/>
-        </p:spPr>
-        <p:txBody>
-          <a:bodyPr wrap="square" rtlCol="0">
-            <a:spAutoFit/>
-          </a:bodyPr>
-          <a:lstStyle/>
-          <a:p>
-            <a:pPr marL="285750" indent="-285750">
-              <a:lnSpc>
-                <a:spcPct val="120000"/>
-              </a:lnSpc>
-              <a:buFont typeface="Arial" panose="020B0604020202020204" pitchFamily="34" charset="0"/>
-              <a:buChar char="•"/>
-            </a:pPr>
-            <a:r>
-              <a:rPr lang="en-US" altLang="zh-CN" sz="2000" dirty="0">
-                <a:latin typeface="Times New Roman" panose="02020603050405020304" pitchFamily="18" charset="0"/>
-                <a:cs typeface="Times New Roman" panose="02020603050405020304" pitchFamily="18" charset="0"/>
-              </a:rPr>
-              <a:t>Efficient memory sharing mechanism</a:t>
-            </a:r>
-          </a:p>
-          <a:p>
-            <a:pPr marL="285750" indent="-285750">
-              <a:lnSpc>
-                <a:spcPct val="120000"/>
-              </a:lnSpc>
-              <a:buFont typeface="Arial" panose="020B0604020202020204" pitchFamily="34" charset="0"/>
-              <a:buChar char="•"/>
-            </a:pPr>
-            <a:r>
-              <a:rPr lang="en-US" altLang="zh-CN" sz="2000" dirty="0">
-                <a:latin typeface="Times New Roman" panose="02020603050405020304" pitchFamily="18" charset="0"/>
-                <a:cs typeface="Times New Roman" panose="02020603050405020304" pitchFamily="18" charset="0"/>
-              </a:rPr>
-              <a:t>Striking performance improvement</a:t>
-            </a:r>
-          </a:p>
-          <a:p>
-            <a:pPr marL="285750" indent="-285750">
-              <a:lnSpc>
-                <a:spcPct val="120000"/>
-              </a:lnSpc>
-              <a:buFont typeface="Arial" panose="020B0604020202020204" pitchFamily="34" charset="0"/>
-              <a:buChar char="•"/>
-            </a:pPr>
-            <a:r>
-              <a:rPr lang="en-US" altLang="zh-CN" sz="2000" dirty="0">
-                <a:latin typeface="Times New Roman" panose="02020603050405020304" pitchFamily="18" charset="0"/>
-                <a:cs typeface="Times New Roman" panose="02020603050405020304" pitchFamily="18" charset="0"/>
-              </a:rPr>
-              <a:t>Downgrade cache miss ratio</a:t>
-            </a:r>
-            <a:endParaRPr lang="zh-CN" altLang="en-US" sz="2000" dirty="0">
-              <a:latin typeface="Times New Roman" panose="02020603050405020304" pitchFamily="18" charset="0"/>
-              <a:cs typeface="Times New Roman" panose="02020603050405020304" pitchFamily="18" charset="0"/>
-            </a:endParaRPr>
-          </a:p>
-        </p:txBody>
-      </p:sp>
+          <a:ln w="25400">
+            <a:solidFill>
+              <a:schemeClr val="tx1"/>
+            </a:solidFill>
+            <a:tailEnd type="triangle"/>
+          </a:ln>
+        </p:spPr>
+        <p:style>
+          <a:lnRef idx="1">
+            <a:schemeClr val="accent1"/>
+          </a:lnRef>
+          <a:fillRef idx="0">
+            <a:schemeClr val="accent1"/>
+          </a:fillRef>
+          <a:effectRef idx="0">
+            <a:schemeClr val="accent1"/>
+          </a:effectRef>
+          <a:fontRef idx="minor">
+            <a:schemeClr val="tx1"/>
+          </a:fontRef>
+        </p:style>
+      </p:cxnSp>
     </p:spTree>
     <p:extLst>
       <p:ext uri="{BB962C8B-B14F-4D97-AF65-F5344CB8AC3E}">
@@ -12750,7 +14072,7 @@
         <p:spPr>
           <a:xfrm>
             <a:off x="283801" y="86851"/>
-            <a:ext cx="1370888" cy="584775"/>
+            <a:ext cx="1641796" cy="584775"/>
           </a:xfrm>
           <a:prstGeom prst="rect">
             <a:avLst/>
@@ -12772,7 +14094,7 @@
                 <a:cs typeface="Times New Roman" panose="02020603050405020304" pitchFamily="18" charset="0"/>
                 <a:sym typeface="Arial" panose="020B0604020202020204" pitchFamily="34" charset="0"/>
               </a:rPr>
-              <a:t>Design</a:t>
+              <a:t>Solution</a:t>
             </a:r>
           </a:p>
         </p:txBody>
@@ -12829,6 +14151,831 @@
           </a:p>
         </p:txBody>
       </p:sp>
+      <p:graphicFrame>
+        <p:nvGraphicFramePr>
+          <p:cNvPr id="5" name="表格 5">
+            <a:extLst>
+              <a:ext uri="{FF2B5EF4-FFF2-40B4-BE49-F238E27FC236}">
+                <a16:creationId xmlns:a16="http://schemas.microsoft.com/office/drawing/2014/main" id="{9E0588E6-7B00-40D1-85F8-B6183C7E5A78}"/>
+              </a:ext>
+            </a:extLst>
+          </p:cNvPr>
+          <p:cNvGraphicFramePr>
+            <a:graphicFrameLocks noGrp="1"/>
+          </p:cNvGraphicFramePr>
+          <p:nvPr>
+            <p:extLst>
+              <p:ext uri="{D42A27DB-BD31-4B8C-83A1-F6EECF244321}">
+                <p14:modId xmlns:p14="http://schemas.microsoft.com/office/powerpoint/2010/main" val="2696987431"/>
+              </p:ext>
+            </p:extLst>
+          </p:nvPr>
+        </p:nvGraphicFramePr>
+        <p:xfrm>
+          <a:off x="344713" y="959152"/>
+          <a:ext cx="10927443" cy="2123440"/>
+        </p:xfrm>
+        <a:graphic>
+          <a:graphicData uri="http://schemas.openxmlformats.org/drawingml/2006/table">
+            <a:tbl>
+              <a:tblPr firstRow="1" bandRow="1">
+                <a:tableStyleId>{5C22544A-7EE6-4342-B048-85BDC9FD1C3A}</a:tableStyleId>
+              </a:tblPr>
+              <a:tblGrid>
+                <a:gridCol w="4401458">
+                  <a:extLst>
+                    <a:ext uri="{9D8B030D-6E8A-4147-A177-3AD203B41FA5}">
+                      <a16:colId xmlns:a16="http://schemas.microsoft.com/office/drawing/2014/main" val="2867769594"/>
+                    </a:ext>
+                  </a:extLst>
+                </a:gridCol>
+                <a:gridCol w="6525985">
+                  <a:extLst>
+                    <a:ext uri="{9D8B030D-6E8A-4147-A177-3AD203B41FA5}">
+                      <a16:colId xmlns:a16="http://schemas.microsoft.com/office/drawing/2014/main" val="1137863531"/>
+                    </a:ext>
+                  </a:extLst>
+                </a:gridCol>
+              </a:tblGrid>
+              <a:tr h="370840">
+                <a:tc>
+                  <a:txBody>
+                    <a:bodyPr/>
+                    <a:lstStyle/>
+                    <a:p>
+                      <a:r>
+                        <a:rPr lang="en-US" altLang="zh-CN" b="0" dirty="0">
+                          <a:solidFill>
+                            <a:schemeClr val="tx1"/>
+                          </a:solidFill>
+                          <a:latin typeface="Times New Roman" panose="02020603050405020304" pitchFamily="18" charset="0"/>
+                          <a:cs typeface="Times New Roman" panose="02020603050405020304" pitchFamily="18" charset="0"/>
+                        </a:rPr>
+                        <a:t>Channel, mobility, and protocol model</a:t>
+                      </a:r>
+                      <a:endParaRPr lang="zh-CN" altLang="en-US" b="0" dirty="0">
+                        <a:solidFill>
+                          <a:schemeClr val="tx1"/>
+                        </a:solidFill>
+                        <a:latin typeface="Times New Roman" panose="02020603050405020304" pitchFamily="18" charset="0"/>
+                        <a:cs typeface="Times New Roman" panose="02020603050405020304" pitchFamily="18" charset="0"/>
+                      </a:endParaRPr>
+                    </a:p>
+                  </a:txBody>
+                  <a:tcPr>
+                    <a:lnL w="12700" cap="flat" cmpd="sng" algn="ctr">
+                      <a:solidFill>
+                        <a:schemeClr val="tx1"/>
+                      </a:solidFill>
+                      <a:prstDash val="solid"/>
+                      <a:round/>
+                      <a:headEnd type="none" w="med" len="med"/>
+                      <a:tailEnd type="none" w="med" len="med"/>
+                    </a:lnL>
+                    <a:lnR w="12700" cap="flat" cmpd="sng" algn="ctr">
+                      <a:solidFill>
+                        <a:schemeClr val="tx1"/>
+                      </a:solidFill>
+                      <a:prstDash val="solid"/>
+                      <a:round/>
+                      <a:headEnd type="none" w="med" len="med"/>
+                      <a:tailEnd type="none" w="med" len="med"/>
+                    </a:lnR>
+                    <a:lnT w="12700" cap="flat" cmpd="sng" algn="ctr">
+                      <a:solidFill>
+                        <a:schemeClr val="tx1"/>
+                      </a:solidFill>
+                      <a:prstDash val="solid"/>
+                      <a:round/>
+                      <a:headEnd type="none" w="med" len="med"/>
+                      <a:tailEnd type="none" w="med" len="med"/>
+                    </a:lnT>
+                    <a:lnB w="12700" cap="flat" cmpd="sng" algn="ctr">
+                      <a:solidFill>
+                        <a:schemeClr val="tx1"/>
+                      </a:solidFill>
+                      <a:prstDash val="solid"/>
+                      <a:round/>
+                      <a:headEnd type="none" w="med" len="med"/>
+                      <a:tailEnd type="none" w="med" len="med"/>
+                    </a:lnB>
+                    <a:lnTlToBr w="12700" cmpd="sng">
+                      <a:noFill/>
+                      <a:prstDash val="solid"/>
+                    </a:lnTlToBr>
+                    <a:lnBlToTr w="12700" cmpd="sng">
+                      <a:noFill/>
+                      <a:prstDash val="solid"/>
+                    </a:lnBlToTr>
+                    <a:solidFill>
+                      <a:schemeClr val="bg1"/>
+                    </a:solidFill>
+                  </a:tcPr>
+                </a:tc>
+                <a:tc>
+                  <a:txBody>
+                    <a:bodyPr/>
+                    <a:lstStyle/>
+                    <a:p>
+                      <a:r>
+                        <a:rPr lang="en-US" altLang="zh-CN" b="0" dirty="0">
+                          <a:solidFill>
+                            <a:schemeClr val="tx1"/>
+                          </a:solidFill>
+                          <a:latin typeface="Times New Roman" panose="02020603050405020304" pitchFamily="18" charset="0"/>
+                          <a:cs typeface="Times New Roman" panose="02020603050405020304" pitchFamily="18" charset="0"/>
+                        </a:rPr>
+                        <a:t>Divide independent set</a:t>
+                      </a:r>
+                      <a:endParaRPr lang="zh-CN" altLang="en-US" b="0" dirty="0">
+                        <a:solidFill>
+                          <a:schemeClr val="tx1"/>
+                        </a:solidFill>
+                        <a:latin typeface="Times New Roman" panose="02020603050405020304" pitchFamily="18" charset="0"/>
+                        <a:cs typeface="Times New Roman" panose="02020603050405020304" pitchFamily="18" charset="0"/>
+                      </a:endParaRPr>
+                    </a:p>
+                  </a:txBody>
+                  <a:tcPr>
+                    <a:lnL w="12700" cap="flat" cmpd="sng" algn="ctr">
+                      <a:solidFill>
+                        <a:schemeClr val="tx1"/>
+                      </a:solidFill>
+                      <a:prstDash val="solid"/>
+                      <a:round/>
+                      <a:headEnd type="none" w="med" len="med"/>
+                      <a:tailEnd type="none" w="med" len="med"/>
+                    </a:lnL>
+                    <a:lnR w="12700" cap="flat" cmpd="sng" algn="ctr">
+                      <a:solidFill>
+                        <a:schemeClr val="tx1"/>
+                      </a:solidFill>
+                      <a:prstDash val="solid"/>
+                      <a:round/>
+                      <a:headEnd type="none" w="med" len="med"/>
+                      <a:tailEnd type="none" w="med" len="med"/>
+                    </a:lnR>
+                    <a:lnT w="12700" cap="flat" cmpd="sng" algn="ctr">
+                      <a:solidFill>
+                        <a:schemeClr val="tx1"/>
+                      </a:solidFill>
+                      <a:prstDash val="solid"/>
+                      <a:round/>
+                      <a:headEnd type="none" w="med" len="med"/>
+                      <a:tailEnd type="none" w="med" len="med"/>
+                    </a:lnT>
+                    <a:lnB w="12700" cap="flat" cmpd="sng" algn="ctr">
+                      <a:solidFill>
+                        <a:schemeClr val="tx1"/>
+                      </a:solidFill>
+                      <a:prstDash val="solid"/>
+                      <a:round/>
+                      <a:headEnd type="none" w="med" len="med"/>
+                      <a:tailEnd type="none" w="med" len="med"/>
+                    </a:lnB>
+                    <a:lnTlToBr w="12700" cmpd="sng">
+                      <a:noFill/>
+                      <a:prstDash val="solid"/>
+                    </a:lnTlToBr>
+                    <a:lnBlToTr w="12700" cmpd="sng">
+                      <a:noFill/>
+                      <a:prstDash val="solid"/>
+                    </a:lnBlToTr>
+                    <a:solidFill>
+                      <a:schemeClr val="bg1"/>
+                    </a:solidFill>
+                  </a:tcPr>
+                </a:tc>
+                <a:extLst>
+                  <a:ext uri="{0D108BD9-81ED-4DB2-BD59-A6C34878D82A}">
+                    <a16:rowId xmlns:a16="http://schemas.microsoft.com/office/drawing/2014/main" val="3086008836"/>
+                  </a:ext>
+                </a:extLst>
+              </a:tr>
+              <a:tr h="370840">
+                <a:tc>
+                  <a:txBody>
+                    <a:bodyPr/>
+                    <a:lstStyle/>
+                    <a:p>
+                      <a:r>
+                        <a:rPr lang="en-US" altLang="zh-CN" dirty="0">
+                          <a:solidFill>
+                            <a:schemeClr val="tx1"/>
+                          </a:solidFill>
+                          <a:latin typeface="Times New Roman" panose="02020603050405020304" pitchFamily="18" charset="0"/>
+                          <a:cs typeface="Times New Roman" panose="02020603050405020304" pitchFamily="18" charset="0"/>
+                        </a:rPr>
+                        <a:t>Real-time simulator implementation</a:t>
+                      </a:r>
+                      <a:endParaRPr lang="zh-CN" altLang="en-US" dirty="0">
+                        <a:solidFill>
+                          <a:schemeClr val="tx1"/>
+                        </a:solidFill>
+                        <a:latin typeface="Times New Roman" panose="02020603050405020304" pitchFamily="18" charset="0"/>
+                        <a:cs typeface="Times New Roman" panose="02020603050405020304" pitchFamily="18" charset="0"/>
+                      </a:endParaRPr>
+                    </a:p>
+                  </a:txBody>
+                  <a:tcPr>
+                    <a:lnL w="12700" cap="flat" cmpd="sng" algn="ctr">
+                      <a:solidFill>
+                        <a:schemeClr val="tx1"/>
+                      </a:solidFill>
+                      <a:prstDash val="solid"/>
+                      <a:round/>
+                      <a:headEnd type="none" w="med" len="med"/>
+                      <a:tailEnd type="none" w="med" len="med"/>
+                    </a:lnL>
+                    <a:lnR w="12700" cap="flat" cmpd="sng" algn="ctr">
+                      <a:solidFill>
+                        <a:schemeClr val="tx1"/>
+                      </a:solidFill>
+                      <a:prstDash val="solid"/>
+                      <a:round/>
+                      <a:headEnd type="none" w="med" len="med"/>
+                      <a:tailEnd type="none" w="med" len="med"/>
+                    </a:lnR>
+                    <a:lnT w="12700" cap="flat" cmpd="sng" algn="ctr">
+                      <a:solidFill>
+                        <a:schemeClr val="tx1"/>
+                      </a:solidFill>
+                      <a:prstDash val="solid"/>
+                      <a:round/>
+                      <a:headEnd type="none" w="med" len="med"/>
+                      <a:tailEnd type="none" w="med" len="med"/>
+                    </a:lnT>
+                    <a:lnB w="12700" cap="flat" cmpd="sng" algn="ctr">
+                      <a:solidFill>
+                        <a:schemeClr val="tx1"/>
+                      </a:solidFill>
+                      <a:prstDash val="solid"/>
+                      <a:round/>
+                      <a:headEnd type="none" w="med" len="med"/>
+                      <a:tailEnd type="none" w="med" len="med"/>
+                    </a:lnB>
+                    <a:lnTlToBr w="12700" cmpd="sng">
+                      <a:noFill/>
+                      <a:prstDash val="solid"/>
+                    </a:lnTlToBr>
+                    <a:lnBlToTr w="12700" cmpd="sng">
+                      <a:noFill/>
+                      <a:prstDash val="solid"/>
+                    </a:lnBlToTr>
+                    <a:solidFill>
+                      <a:schemeClr val="bg1"/>
+                    </a:solidFill>
+                  </a:tcPr>
+                </a:tc>
+                <a:tc>
+                  <a:txBody>
+                    <a:bodyPr/>
+                    <a:lstStyle/>
+                    <a:p>
+                      <a:r>
+                        <a:rPr lang="en-US" altLang="zh-CN" dirty="0">
+                          <a:solidFill>
+                            <a:schemeClr val="tx1"/>
+                          </a:solidFill>
+                          <a:latin typeface="Times New Roman" panose="02020603050405020304" pitchFamily="18" charset="0"/>
+                          <a:cs typeface="Times New Roman" panose="02020603050405020304" pitchFamily="18" charset="0"/>
+                        </a:rPr>
+                        <a:t>Double timelines</a:t>
+                      </a:r>
+                      <a:endParaRPr lang="zh-CN" altLang="en-US" dirty="0">
+                        <a:solidFill>
+                          <a:schemeClr val="tx1"/>
+                        </a:solidFill>
+                        <a:latin typeface="Times New Roman" panose="02020603050405020304" pitchFamily="18" charset="0"/>
+                        <a:cs typeface="Times New Roman" panose="02020603050405020304" pitchFamily="18" charset="0"/>
+                      </a:endParaRPr>
+                    </a:p>
+                  </a:txBody>
+                  <a:tcPr>
+                    <a:lnL w="12700" cap="flat" cmpd="sng" algn="ctr">
+                      <a:solidFill>
+                        <a:schemeClr val="tx1"/>
+                      </a:solidFill>
+                      <a:prstDash val="solid"/>
+                      <a:round/>
+                      <a:headEnd type="none" w="med" len="med"/>
+                      <a:tailEnd type="none" w="med" len="med"/>
+                    </a:lnL>
+                    <a:lnR w="12700" cap="flat" cmpd="sng" algn="ctr">
+                      <a:solidFill>
+                        <a:schemeClr val="tx1"/>
+                      </a:solidFill>
+                      <a:prstDash val="solid"/>
+                      <a:round/>
+                      <a:headEnd type="none" w="med" len="med"/>
+                      <a:tailEnd type="none" w="med" len="med"/>
+                    </a:lnR>
+                    <a:lnT w="12700" cap="flat" cmpd="sng" algn="ctr">
+                      <a:solidFill>
+                        <a:schemeClr val="tx1"/>
+                      </a:solidFill>
+                      <a:prstDash val="solid"/>
+                      <a:round/>
+                      <a:headEnd type="none" w="med" len="med"/>
+                      <a:tailEnd type="none" w="med" len="med"/>
+                    </a:lnT>
+                    <a:lnB w="12700" cap="flat" cmpd="sng" algn="ctr">
+                      <a:solidFill>
+                        <a:schemeClr val="tx1"/>
+                      </a:solidFill>
+                      <a:prstDash val="solid"/>
+                      <a:round/>
+                      <a:headEnd type="none" w="med" len="med"/>
+                      <a:tailEnd type="none" w="med" len="med"/>
+                    </a:lnB>
+                    <a:lnTlToBr w="12700" cmpd="sng">
+                      <a:noFill/>
+                      <a:prstDash val="solid"/>
+                    </a:lnTlToBr>
+                    <a:lnBlToTr w="12700" cmpd="sng">
+                      <a:noFill/>
+                      <a:prstDash val="solid"/>
+                    </a:lnBlToTr>
+                    <a:solidFill>
+                      <a:schemeClr val="bg1"/>
+                    </a:solidFill>
+                  </a:tcPr>
+                </a:tc>
+                <a:extLst>
+                  <a:ext uri="{0D108BD9-81ED-4DB2-BD59-A6C34878D82A}">
+                    <a16:rowId xmlns:a16="http://schemas.microsoft.com/office/drawing/2014/main" val="1789247201"/>
+                  </a:ext>
+                </a:extLst>
+              </a:tr>
+              <a:tr h="370840">
+                <a:tc>
+                  <a:txBody>
+                    <a:bodyPr/>
+                    <a:lstStyle/>
+                    <a:p>
+                      <a:r>
+                        <a:rPr lang="en-US" altLang="zh-CN" dirty="0">
+                          <a:solidFill>
+                            <a:schemeClr val="tx1"/>
+                          </a:solidFill>
+                          <a:latin typeface="Times New Roman" panose="02020603050405020304" pitchFamily="18" charset="0"/>
+                          <a:cs typeface="Times New Roman" panose="02020603050405020304" pitchFamily="18" charset="0"/>
+                        </a:rPr>
+                        <a:t>Interact with physical machine</a:t>
+                      </a:r>
+                      <a:endParaRPr lang="zh-CN" altLang="en-US" dirty="0">
+                        <a:solidFill>
+                          <a:schemeClr val="tx1"/>
+                        </a:solidFill>
+                        <a:latin typeface="Times New Roman" panose="02020603050405020304" pitchFamily="18" charset="0"/>
+                        <a:cs typeface="Times New Roman" panose="02020603050405020304" pitchFamily="18" charset="0"/>
+                      </a:endParaRPr>
+                    </a:p>
+                  </a:txBody>
+                  <a:tcPr>
+                    <a:lnL w="12700" cap="flat" cmpd="sng" algn="ctr">
+                      <a:solidFill>
+                        <a:schemeClr val="tx1"/>
+                      </a:solidFill>
+                      <a:prstDash val="solid"/>
+                      <a:round/>
+                      <a:headEnd type="none" w="med" len="med"/>
+                      <a:tailEnd type="none" w="med" len="med"/>
+                    </a:lnL>
+                    <a:lnR w="12700" cap="flat" cmpd="sng" algn="ctr">
+                      <a:solidFill>
+                        <a:schemeClr val="tx1"/>
+                      </a:solidFill>
+                      <a:prstDash val="solid"/>
+                      <a:round/>
+                      <a:headEnd type="none" w="med" len="med"/>
+                      <a:tailEnd type="none" w="med" len="med"/>
+                    </a:lnR>
+                    <a:lnT w="12700" cap="flat" cmpd="sng" algn="ctr">
+                      <a:solidFill>
+                        <a:schemeClr val="tx1"/>
+                      </a:solidFill>
+                      <a:prstDash val="solid"/>
+                      <a:round/>
+                      <a:headEnd type="none" w="med" len="med"/>
+                      <a:tailEnd type="none" w="med" len="med"/>
+                    </a:lnT>
+                    <a:lnB w="12700" cap="flat" cmpd="sng" algn="ctr">
+                      <a:solidFill>
+                        <a:schemeClr val="tx1"/>
+                      </a:solidFill>
+                      <a:prstDash val="solid"/>
+                      <a:round/>
+                      <a:headEnd type="none" w="med" len="med"/>
+                      <a:tailEnd type="none" w="med" len="med"/>
+                    </a:lnB>
+                    <a:lnTlToBr w="12700" cmpd="sng">
+                      <a:noFill/>
+                      <a:prstDash val="solid"/>
+                    </a:lnTlToBr>
+                    <a:lnBlToTr w="12700" cmpd="sng">
+                      <a:noFill/>
+                      <a:prstDash val="solid"/>
+                    </a:lnBlToTr>
+                    <a:solidFill>
+                      <a:schemeClr val="bg1"/>
+                    </a:solidFill>
+                  </a:tcPr>
+                </a:tc>
+                <a:tc>
+                  <a:txBody>
+                    <a:bodyPr/>
+                    <a:lstStyle/>
+                    <a:p>
+                      <a:r>
+                        <a:rPr lang="en-US" altLang="zh-CN" dirty="0">
+                          <a:solidFill>
+                            <a:schemeClr val="tx1"/>
+                          </a:solidFill>
+                          <a:latin typeface="Times New Roman" panose="02020603050405020304" pitchFamily="18" charset="0"/>
+                          <a:cs typeface="Times New Roman" panose="02020603050405020304" pitchFamily="18" charset="0"/>
+                        </a:rPr>
+                        <a:t>TAP/TUN device</a:t>
+                      </a:r>
+                      <a:endParaRPr lang="zh-CN" altLang="en-US" dirty="0">
+                        <a:solidFill>
+                          <a:schemeClr val="tx1"/>
+                        </a:solidFill>
+                        <a:latin typeface="Times New Roman" panose="02020603050405020304" pitchFamily="18" charset="0"/>
+                        <a:cs typeface="Times New Roman" panose="02020603050405020304" pitchFamily="18" charset="0"/>
+                      </a:endParaRPr>
+                    </a:p>
+                  </a:txBody>
+                  <a:tcPr>
+                    <a:lnL w="12700" cap="flat" cmpd="sng" algn="ctr">
+                      <a:solidFill>
+                        <a:schemeClr val="tx1"/>
+                      </a:solidFill>
+                      <a:prstDash val="solid"/>
+                      <a:round/>
+                      <a:headEnd type="none" w="med" len="med"/>
+                      <a:tailEnd type="none" w="med" len="med"/>
+                    </a:lnL>
+                    <a:lnR w="12700" cap="flat" cmpd="sng" algn="ctr">
+                      <a:solidFill>
+                        <a:schemeClr val="tx1"/>
+                      </a:solidFill>
+                      <a:prstDash val="solid"/>
+                      <a:round/>
+                      <a:headEnd type="none" w="med" len="med"/>
+                      <a:tailEnd type="none" w="med" len="med"/>
+                    </a:lnR>
+                    <a:lnT w="12700" cap="flat" cmpd="sng" algn="ctr">
+                      <a:solidFill>
+                        <a:schemeClr val="tx1"/>
+                      </a:solidFill>
+                      <a:prstDash val="solid"/>
+                      <a:round/>
+                      <a:headEnd type="none" w="med" len="med"/>
+                      <a:tailEnd type="none" w="med" len="med"/>
+                    </a:lnT>
+                    <a:lnB w="12700" cap="flat" cmpd="sng" algn="ctr">
+                      <a:solidFill>
+                        <a:schemeClr val="tx1"/>
+                      </a:solidFill>
+                      <a:prstDash val="solid"/>
+                      <a:round/>
+                      <a:headEnd type="none" w="med" len="med"/>
+                      <a:tailEnd type="none" w="med" len="med"/>
+                    </a:lnB>
+                    <a:lnTlToBr w="12700" cmpd="sng">
+                      <a:noFill/>
+                      <a:prstDash val="solid"/>
+                    </a:lnTlToBr>
+                    <a:lnBlToTr w="12700" cmpd="sng">
+                      <a:noFill/>
+                      <a:prstDash val="solid"/>
+                    </a:lnBlToTr>
+                    <a:solidFill>
+                      <a:schemeClr val="bg1"/>
+                    </a:solidFill>
+                  </a:tcPr>
+                </a:tc>
+                <a:extLst>
+                  <a:ext uri="{0D108BD9-81ED-4DB2-BD59-A6C34878D82A}">
+                    <a16:rowId xmlns:a16="http://schemas.microsoft.com/office/drawing/2014/main" val="2918393320"/>
+                  </a:ext>
+                </a:extLst>
+              </a:tr>
+              <a:tr h="370840">
+                <a:tc>
+                  <a:txBody>
+                    <a:bodyPr/>
+                    <a:lstStyle/>
+                    <a:p>
+                      <a:r>
+                        <a:rPr lang="en-US" altLang="zh-CN" dirty="0">
+                          <a:solidFill>
+                            <a:schemeClr val="tx1"/>
+                          </a:solidFill>
+                          <a:latin typeface="Times New Roman" panose="02020603050405020304" pitchFamily="18" charset="0"/>
+                          <a:cs typeface="Times New Roman" panose="02020603050405020304" pitchFamily="18" charset="0"/>
+                        </a:rPr>
+                        <a:t>Fake sharing</a:t>
+                      </a:r>
+                      <a:endParaRPr lang="zh-CN" altLang="en-US" dirty="0">
+                        <a:solidFill>
+                          <a:schemeClr val="tx1"/>
+                        </a:solidFill>
+                        <a:latin typeface="Times New Roman" panose="02020603050405020304" pitchFamily="18" charset="0"/>
+                        <a:cs typeface="Times New Roman" panose="02020603050405020304" pitchFamily="18" charset="0"/>
+                      </a:endParaRPr>
+                    </a:p>
+                  </a:txBody>
+                  <a:tcPr>
+                    <a:lnL w="12700" cap="flat" cmpd="sng" algn="ctr">
+                      <a:solidFill>
+                        <a:schemeClr val="tx1"/>
+                      </a:solidFill>
+                      <a:prstDash val="solid"/>
+                      <a:round/>
+                      <a:headEnd type="none" w="med" len="med"/>
+                      <a:tailEnd type="none" w="med" len="med"/>
+                    </a:lnL>
+                    <a:lnR w="12700" cap="flat" cmpd="sng" algn="ctr">
+                      <a:solidFill>
+                        <a:schemeClr val="tx1"/>
+                      </a:solidFill>
+                      <a:prstDash val="solid"/>
+                      <a:round/>
+                      <a:headEnd type="none" w="med" len="med"/>
+                      <a:tailEnd type="none" w="med" len="med"/>
+                    </a:lnR>
+                    <a:lnT w="12700" cap="flat" cmpd="sng" algn="ctr">
+                      <a:solidFill>
+                        <a:schemeClr val="tx1"/>
+                      </a:solidFill>
+                      <a:prstDash val="solid"/>
+                      <a:round/>
+                      <a:headEnd type="none" w="med" len="med"/>
+                      <a:tailEnd type="none" w="med" len="med"/>
+                    </a:lnT>
+                    <a:lnB w="12700" cap="flat" cmpd="sng" algn="ctr">
+                      <a:solidFill>
+                        <a:schemeClr val="tx1"/>
+                      </a:solidFill>
+                      <a:prstDash val="solid"/>
+                      <a:round/>
+                      <a:headEnd type="none" w="med" len="med"/>
+                      <a:tailEnd type="none" w="med" len="med"/>
+                    </a:lnB>
+                    <a:lnTlToBr w="12700" cmpd="sng">
+                      <a:noFill/>
+                      <a:prstDash val="solid"/>
+                    </a:lnTlToBr>
+                    <a:lnBlToTr w="12700" cmpd="sng">
+                      <a:noFill/>
+                      <a:prstDash val="solid"/>
+                    </a:lnBlToTr>
+                    <a:solidFill>
+                      <a:schemeClr val="bg1"/>
+                    </a:solidFill>
+                  </a:tcPr>
+                </a:tc>
+                <a:tc>
+                  <a:txBody>
+                    <a:bodyPr/>
+                    <a:lstStyle/>
+                    <a:p>
+                      <a:r>
+                        <a:rPr lang="en-US" altLang="zh-CN" dirty="0">
+                          <a:solidFill>
+                            <a:schemeClr val="tx1"/>
+                          </a:solidFill>
+                          <a:latin typeface="Times New Roman" panose="02020603050405020304" pitchFamily="18" charset="0"/>
+                          <a:cs typeface="Times New Roman" panose="02020603050405020304" pitchFamily="18" charset="0"/>
+                        </a:rPr>
+                        <a:t>Re-design data structure, disperse mutable variables and gather stable variables together</a:t>
+                      </a:r>
+                      <a:endParaRPr lang="zh-CN" altLang="en-US" dirty="0">
+                        <a:solidFill>
+                          <a:schemeClr val="tx1"/>
+                        </a:solidFill>
+                        <a:latin typeface="Times New Roman" panose="02020603050405020304" pitchFamily="18" charset="0"/>
+                        <a:cs typeface="Times New Roman" panose="02020603050405020304" pitchFamily="18" charset="0"/>
+                      </a:endParaRPr>
+                    </a:p>
+                  </a:txBody>
+                  <a:tcPr>
+                    <a:lnL w="12700" cap="flat" cmpd="sng" algn="ctr">
+                      <a:solidFill>
+                        <a:schemeClr val="tx1"/>
+                      </a:solidFill>
+                      <a:prstDash val="solid"/>
+                      <a:round/>
+                      <a:headEnd type="none" w="med" len="med"/>
+                      <a:tailEnd type="none" w="med" len="med"/>
+                    </a:lnL>
+                    <a:lnR w="12700" cap="flat" cmpd="sng" algn="ctr">
+                      <a:solidFill>
+                        <a:schemeClr val="tx1"/>
+                      </a:solidFill>
+                      <a:prstDash val="solid"/>
+                      <a:round/>
+                      <a:headEnd type="none" w="med" len="med"/>
+                      <a:tailEnd type="none" w="med" len="med"/>
+                    </a:lnR>
+                    <a:lnT w="12700" cap="flat" cmpd="sng" algn="ctr">
+                      <a:solidFill>
+                        <a:schemeClr val="tx1"/>
+                      </a:solidFill>
+                      <a:prstDash val="solid"/>
+                      <a:round/>
+                      <a:headEnd type="none" w="med" len="med"/>
+                      <a:tailEnd type="none" w="med" len="med"/>
+                    </a:lnT>
+                    <a:lnB w="12700" cap="flat" cmpd="sng" algn="ctr">
+                      <a:solidFill>
+                        <a:schemeClr val="tx1"/>
+                      </a:solidFill>
+                      <a:prstDash val="solid"/>
+                      <a:round/>
+                      <a:headEnd type="none" w="med" len="med"/>
+                      <a:tailEnd type="none" w="med" len="med"/>
+                    </a:lnB>
+                    <a:lnTlToBr w="12700" cmpd="sng">
+                      <a:noFill/>
+                      <a:prstDash val="solid"/>
+                    </a:lnTlToBr>
+                    <a:lnBlToTr w="12700" cmpd="sng">
+                      <a:noFill/>
+                      <a:prstDash val="solid"/>
+                    </a:lnBlToTr>
+                    <a:solidFill>
+                      <a:schemeClr val="bg1"/>
+                    </a:solidFill>
+                  </a:tcPr>
+                </a:tc>
+                <a:extLst>
+                  <a:ext uri="{0D108BD9-81ED-4DB2-BD59-A6C34878D82A}">
+                    <a16:rowId xmlns:a16="http://schemas.microsoft.com/office/drawing/2014/main" val="2534719106"/>
+                  </a:ext>
+                </a:extLst>
+              </a:tr>
+              <a:tr h="370840">
+                <a:tc>
+                  <a:txBody>
+                    <a:bodyPr/>
+                    <a:lstStyle/>
+                    <a:p>
+                      <a:r>
+                        <a:rPr lang="en-US" altLang="zh-CN" dirty="0">
+                          <a:solidFill>
+                            <a:schemeClr val="tx1"/>
+                          </a:solidFill>
+                          <a:latin typeface="Times New Roman" panose="02020603050405020304" pitchFamily="18" charset="0"/>
+                          <a:cs typeface="Times New Roman" panose="02020603050405020304" pitchFamily="18" charset="0"/>
+                        </a:rPr>
+                        <a:t>GPU</a:t>
+                      </a:r>
+                      <a:endParaRPr lang="zh-CN" altLang="en-US" dirty="0">
+                        <a:solidFill>
+                          <a:schemeClr val="tx1"/>
+                        </a:solidFill>
+                        <a:latin typeface="Times New Roman" panose="02020603050405020304" pitchFamily="18" charset="0"/>
+                        <a:cs typeface="Times New Roman" panose="02020603050405020304" pitchFamily="18" charset="0"/>
+                      </a:endParaRPr>
+                    </a:p>
+                  </a:txBody>
+                  <a:tcPr>
+                    <a:lnL w="12700" cap="flat" cmpd="sng" algn="ctr">
+                      <a:solidFill>
+                        <a:schemeClr val="tx1"/>
+                      </a:solidFill>
+                      <a:prstDash val="solid"/>
+                      <a:round/>
+                      <a:headEnd type="none" w="med" len="med"/>
+                      <a:tailEnd type="none" w="med" len="med"/>
+                    </a:lnL>
+                    <a:lnR w="12700" cap="flat" cmpd="sng" algn="ctr">
+                      <a:solidFill>
+                        <a:schemeClr val="tx1"/>
+                      </a:solidFill>
+                      <a:prstDash val="solid"/>
+                      <a:round/>
+                      <a:headEnd type="none" w="med" len="med"/>
+                      <a:tailEnd type="none" w="med" len="med"/>
+                    </a:lnR>
+                    <a:lnT w="12700" cap="flat" cmpd="sng" algn="ctr">
+                      <a:solidFill>
+                        <a:schemeClr val="tx1"/>
+                      </a:solidFill>
+                      <a:prstDash val="solid"/>
+                      <a:round/>
+                      <a:headEnd type="none" w="med" len="med"/>
+                      <a:tailEnd type="none" w="med" len="med"/>
+                    </a:lnT>
+                    <a:lnB w="12700" cap="flat" cmpd="sng" algn="ctr">
+                      <a:solidFill>
+                        <a:schemeClr val="tx1"/>
+                      </a:solidFill>
+                      <a:prstDash val="solid"/>
+                      <a:round/>
+                      <a:headEnd type="none" w="med" len="med"/>
+                      <a:tailEnd type="none" w="med" len="med"/>
+                    </a:lnB>
+                    <a:lnTlToBr w="12700" cmpd="sng">
+                      <a:noFill/>
+                      <a:prstDash val="solid"/>
+                    </a:lnTlToBr>
+                    <a:lnBlToTr w="12700" cmpd="sng">
+                      <a:noFill/>
+                      <a:prstDash val="solid"/>
+                    </a:lnBlToTr>
+                    <a:solidFill>
+                      <a:schemeClr val="bg1"/>
+                    </a:solidFill>
+                  </a:tcPr>
+                </a:tc>
+                <a:tc>
+                  <a:txBody>
+                    <a:bodyPr/>
+                    <a:lstStyle/>
+                    <a:p>
+                      <a:r>
+                        <a:rPr lang="en-US" altLang="zh-CN" dirty="0">
+                          <a:solidFill>
+                            <a:schemeClr val="tx1"/>
+                          </a:solidFill>
+                          <a:latin typeface="Times New Roman" panose="02020603050405020304" pitchFamily="18" charset="0"/>
+                          <a:cs typeface="Times New Roman" panose="02020603050405020304" pitchFamily="18" charset="0"/>
+                        </a:rPr>
+                        <a:t>GPU-assisted architecture</a:t>
+                      </a:r>
+                      <a:endParaRPr lang="zh-CN" altLang="en-US" dirty="0">
+                        <a:solidFill>
+                          <a:schemeClr val="tx1"/>
+                        </a:solidFill>
+                        <a:latin typeface="Times New Roman" panose="02020603050405020304" pitchFamily="18" charset="0"/>
+                        <a:cs typeface="Times New Roman" panose="02020603050405020304" pitchFamily="18" charset="0"/>
+                      </a:endParaRPr>
+                    </a:p>
+                  </a:txBody>
+                  <a:tcPr>
+                    <a:lnL w="12700" cap="flat" cmpd="sng" algn="ctr">
+                      <a:solidFill>
+                        <a:schemeClr val="tx1"/>
+                      </a:solidFill>
+                      <a:prstDash val="solid"/>
+                      <a:round/>
+                      <a:headEnd type="none" w="med" len="med"/>
+                      <a:tailEnd type="none" w="med" len="med"/>
+                    </a:lnL>
+                    <a:lnR w="12700" cap="flat" cmpd="sng" algn="ctr">
+                      <a:solidFill>
+                        <a:schemeClr val="tx1"/>
+                      </a:solidFill>
+                      <a:prstDash val="solid"/>
+                      <a:round/>
+                      <a:headEnd type="none" w="med" len="med"/>
+                      <a:tailEnd type="none" w="med" len="med"/>
+                    </a:lnR>
+                    <a:lnT w="12700" cap="flat" cmpd="sng" algn="ctr">
+                      <a:solidFill>
+                        <a:schemeClr val="tx1"/>
+                      </a:solidFill>
+                      <a:prstDash val="solid"/>
+                      <a:round/>
+                      <a:headEnd type="none" w="med" len="med"/>
+                      <a:tailEnd type="none" w="med" len="med"/>
+                    </a:lnT>
+                    <a:lnB w="12700" cap="flat" cmpd="sng" algn="ctr">
+                      <a:solidFill>
+                        <a:schemeClr val="tx1"/>
+                      </a:solidFill>
+                      <a:prstDash val="solid"/>
+                      <a:round/>
+                      <a:headEnd type="none" w="med" len="med"/>
+                      <a:tailEnd type="none" w="med" len="med"/>
+                    </a:lnB>
+                    <a:lnTlToBr w="12700" cmpd="sng">
+                      <a:noFill/>
+                      <a:prstDash val="solid"/>
+                    </a:lnTlToBr>
+                    <a:lnBlToTr w="12700" cmpd="sng">
+                      <a:noFill/>
+                      <a:prstDash val="solid"/>
+                    </a:lnBlToTr>
+                    <a:solidFill>
+                      <a:schemeClr val="bg1"/>
+                    </a:solidFill>
+                  </a:tcPr>
+                </a:tc>
+                <a:extLst>
+                  <a:ext uri="{0D108BD9-81ED-4DB2-BD59-A6C34878D82A}">
+                    <a16:rowId xmlns:a16="http://schemas.microsoft.com/office/drawing/2014/main" val="492498836"/>
+                  </a:ext>
+                </a:extLst>
+              </a:tr>
+            </a:tbl>
+          </a:graphicData>
+        </a:graphic>
+      </p:graphicFrame>
     </p:spTree>
     <p:extLst>
       <p:ext uri="{BB962C8B-B14F-4D97-AF65-F5344CB8AC3E}">

</xml_diff>

<commit_message>
vault backup: 2023-09-15 21:24:54
</commit_message>
<xml_diff>
--- a/OS/DONS/FES.pptx
+++ b/OS/DONS/FES.pptx
@@ -205,7 +205,7 @@
           <a:p>
             <a:fld id="{DC8DF830-0B68-4DA1-B7F1-3F604F3412E2}" type="datetimeFigureOut">
               <a:rPr lang="zh-CN" altLang="en-US" smtClean="0"/>
-              <a:t>2023/9/14</a:t>
+              <a:t>2023/9/15</a:t>
             </a:fld>
             <a:endParaRPr lang="zh-CN" altLang="en-US"/>
           </a:p>
@@ -1771,7 +1771,7 @@
           <a:p>
             <a:fld id="{5C67483F-86B4-4181-AEB3-1074CE197F11}" type="datetimeFigureOut">
               <a:rPr lang="zh-CN" altLang="en-US" smtClean="0"/>
-              <a:t>2023/9/14</a:t>
+              <a:t>2023/9/15</a:t>
             </a:fld>
             <a:endParaRPr lang="zh-CN" altLang="en-US"/>
           </a:p>
@@ -1969,7 +1969,7 @@
           <a:p>
             <a:fld id="{5C67483F-86B4-4181-AEB3-1074CE197F11}" type="datetimeFigureOut">
               <a:rPr lang="zh-CN" altLang="en-US" smtClean="0"/>
-              <a:t>2023/9/14</a:t>
+              <a:t>2023/9/15</a:t>
             </a:fld>
             <a:endParaRPr lang="zh-CN" altLang="en-US"/>
           </a:p>
@@ -2177,7 +2177,7 @@
           <a:p>
             <a:fld id="{5C67483F-86B4-4181-AEB3-1074CE197F11}" type="datetimeFigureOut">
               <a:rPr lang="zh-CN" altLang="en-US" smtClean="0"/>
-              <a:t>2023/9/14</a:t>
+              <a:t>2023/9/15</a:t>
             </a:fld>
             <a:endParaRPr lang="zh-CN" altLang="en-US"/>
           </a:p>
@@ -2326,7 +2326,7 @@
             <a:fld id="{DB494AA1-4C1D-4C99-92BC-CE5686F06754}" type="datetime1">
               <a:rPr lang="zh-CN" altLang="en-US" smtClean="0"/>
               <a:pPr/>
-              <a:t>2023/9/14</a:t>
+              <a:t>2023/9/15</a:t>
             </a:fld>
             <a:endParaRPr lang="zh-CN" altLang="en-US"/>
           </a:p>
@@ -2668,7 +2668,7 @@
           <a:p>
             <a:fld id="{5C67483F-86B4-4181-AEB3-1074CE197F11}" type="datetimeFigureOut">
               <a:rPr lang="zh-CN" altLang="en-US" smtClean="0"/>
-              <a:t>2023/9/14</a:t>
+              <a:t>2023/9/15</a:t>
             </a:fld>
             <a:endParaRPr lang="zh-CN" altLang="en-US"/>
           </a:p>
@@ -2943,7 +2943,7 @@
           <a:p>
             <a:fld id="{5C67483F-86B4-4181-AEB3-1074CE197F11}" type="datetimeFigureOut">
               <a:rPr lang="zh-CN" altLang="en-US" smtClean="0"/>
-              <a:t>2023/9/14</a:t>
+              <a:t>2023/9/15</a:t>
             </a:fld>
             <a:endParaRPr lang="zh-CN" altLang="en-US"/>
           </a:p>
@@ -3208,7 +3208,7 @@
           <a:p>
             <a:fld id="{5C67483F-86B4-4181-AEB3-1074CE197F11}" type="datetimeFigureOut">
               <a:rPr lang="zh-CN" altLang="en-US" smtClean="0"/>
-              <a:t>2023/9/14</a:t>
+              <a:t>2023/9/15</a:t>
             </a:fld>
             <a:endParaRPr lang="zh-CN" altLang="en-US"/>
           </a:p>
@@ -3620,7 +3620,7 @@
           <a:p>
             <a:fld id="{5C67483F-86B4-4181-AEB3-1074CE197F11}" type="datetimeFigureOut">
               <a:rPr lang="zh-CN" altLang="en-US" smtClean="0"/>
-              <a:t>2023/9/14</a:t>
+              <a:t>2023/9/15</a:t>
             </a:fld>
             <a:endParaRPr lang="zh-CN" altLang="en-US"/>
           </a:p>
@@ -3761,7 +3761,7 @@
           <a:p>
             <a:fld id="{5C67483F-86B4-4181-AEB3-1074CE197F11}" type="datetimeFigureOut">
               <a:rPr lang="zh-CN" altLang="en-US" smtClean="0"/>
-              <a:t>2023/9/14</a:t>
+              <a:t>2023/9/15</a:t>
             </a:fld>
             <a:endParaRPr lang="zh-CN" altLang="en-US"/>
           </a:p>
@@ -3874,7 +3874,7 @@
           <a:p>
             <a:fld id="{5C67483F-86B4-4181-AEB3-1074CE197F11}" type="datetimeFigureOut">
               <a:rPr lang="zh-CN" altLang="en-US" smtClean="0"/>
-              <a:t>2023/9/14</a:t>
+              <a:t>2023/9/15</a:t>
             </a:fld>
             <a:endParaRPr lang="zh-CN" altLang="en-US"/>
           </a:p>
@@ -4185,7 +4185,7 @@
           <a:p>
             <a:fld id="{5C67483F-86B4-4181-AEB3-1074CE197F11}" type="datetimeFigureOut">
               <a:rPr lang="zh-CN" altLang="en-US" smtClean="0"/>
-              <a:t>2023/9/14</a:t>
+              <a:t>2023/9/15</a:t>
             </a:fld>
             <a:endParaRPr lang="zh-CN" altLang="en-US"/>
           </a:p>
@@ -4473,7 +4473,7 @@
           <a:p>
             <a:fld id="{5C67483F-86B4-4181-AEB3-1074CE197F11}" type="datetimeFigureOut">
               <a:rPr lang="zh-CN" altLang="en-US" smtClean="0"/>
-              <a:t>2023/9/14</a:t>
+              <a:t>2023/9/15</a:t>
             </a:fld>
             <a:endParaRPr lang="zh-CN" altLang="en-US"/>
           </a:p>
@@ -4714,7 +4714,7 @@
           <a:p>
             <a:fld id="{5C67483F-86B4-4181-AEB3-1074CE197F11}" type="datetimeFigureOut">
               <a:rPr lang="zh-CN" altLang="en-US" smtClean="0"/>
-              <a:t>2023/9/14</a:t>
+              <a:t>2023/9/15</a:t>
             </a:fld>
             <a:endParaRPr lang="zh-CN" altLang="en-US"/>
           </a:p>
@@ -15715,8 +15715,8 @@
         </p:nvSpPr>
         <p:spPr>
           <a:xfrm>
-            <a:off x="7640930" y="863383"/>
-            <a:ext cx="3912799" cy="5333346"/>
+            <a:off x="4976328" y="862789"/>
+            <a:ext cx="6636286" cy="4632658"/>
           </a:xfrm>
           <a:prstGeom prst="roundRect">
             <a:avLst>
@@ -15771,7 +15771,7 @@
         </p:nvSpPr>
         <p:spPr>
           <a:xfrm>
-            <a:off x="8298023" y="967030"/>
+            <a:off x="6915022" y="825158"/>
             <a:ext cx="2758898" cy="369332"/>
           </a:xfrm>
           <a:prstGeom prst="rect">
@@ -15813,8 +15813,8 @@
         </p:nvSpPr>
         <p:spPr>
           <a:xfrm>
-            <a:off x="638271" y="1004660"/>
-            <a:ext cx="4032752" cy="5333346"/>
+            <a:off x="217801" y="862789"/>
+            <a:ext cx="3610049" cy="3526880"/>
           </a:xfrm>
           <a:prstGeom prst="roundRect">
             <a:avLst>
@@ -15869,8 +15869,8 @@
         </p:nvSpPr>
         <p:spPr>
           <a:xfrm>
-            <a:off x="1757615" y="967030"/>
-            <a:ext cx="1794064" cy="369332"/>
+            <a:off x="1064741" y="825158"/>
+            <a:ext cx="1916169" cy="369332"/>
           </a:xfrm>
           <a:prstGeom prst="rect">
             <a:avLst/>
@@ -15888,7 +15888,7 @@
                 <a:latin typeface="Times New Roman" panose="02020603050405020304" pitchFamily="18" charset="0"/>
                 <a:cs typeface="Times New Roman" panose="02020603050405020304" pitchFamily="18" charset="0"/>
               </a:rPr>
-              <a:t>Design  Principle</a:t>
+              <a:t>Design  Principles</a:t>
             </a:r>
             <a:endParaRPr lang="zh-CN" altLang="en-US" dirty="0">
               <a:latin typeface="Times New Roman" panose="02020603050405020304" pitchFamily="18" charset="0"/>
@@ -15911,8 +15911,8 @@
         </p:nvSpPr>
         <p:spPr>
           <a:xfrm>
-            <a:off x="814073" y="1373992"/>
-            <a:ext cx="3681147" cy="2031325"/>
+            <a:off x="265242" y="1159292"/>
+            <a:ext cx="3429089" cy="3054939"/>
           </a:xfrm>
           <a:prstGeom prst="rect">
             <a:avLst/>
@@ -15926,44 +15926,279 @@
           <a:lstStyle/>
           <a:p>
             <a:pPr marL="285750" indent="-285750">
+              <a:lnSpc>
+                <a:spcPct val="120000"/>
+              </a:lnSpc>
               <a:buFont typeface="Arial" panose="020B0604020202020204" pitchFamily="34" charset="0"/>
               <a:buChar char="•"/>
             </a:pPr>
             <a:r>
-              <a:rPr lang="en-US" altLang="zh-CN" dirty="0"/>
-              <a:t>Divide discrete events into independent sets</a:t>
+              <a:rPr lang="en-US" altLang="zh-CN" dirty="0">
+                <a:latin typeface="Times New Roman" panose="02020603050405020304" pitchFamily="18" charset="0"/>
+                <a:cs typeface="Times New Roman" panose="02020603050405020304" pitchFamily="18" charset="0"/>
+              </a:rPr>
+              <a:t>Batch-based parallelism</a:t>
             </a:r>
           </a:p>
           <a:p>
             <a:pPr marL="285750" indent="-285750">
+              <a:lnSpc>
+                <a:spcPct val="120000"/>
+              </a:lnSpc>
               <a:buFont typeface="Arial" panose="020B0604020202020204" pitchFamily="34" charset="0"/>
               <a:buChar char="•"/>
             </a:pPr>
             <a:r>
-              <a:rPr lang="en-US" altLang="zh-CN" dirty="0"/>
+              <a:rPr lang="en-US" altLang="zh-CN" dirty="0">
+                <a:latin typeface="Times New Roman" panose="02020603050405020304" pitchFamily="18" charset="0"/>
+                <a:cs typeface="Times New Roman" panose="02020603050405020304" pitchFamily="18" charset="0"/>
+              </a:rPr>
               <a:t>Decouple logical control from computing</a:t>
             </a:r>
           </a:p>
           <a:p>
             <a:pPr marL="285750" indent="-285750">
+              <a:lnSpc>
+                <a:spcPct val="120000"/>
+              </a:lnSpc>
               <a:buFont typeface="Arial" panose="020B0604020202020204" pitchFamily="34" charset="0"/>
               <a:buChar char="•"/>
             </a:pPr>
             <a:r>
-              <a:rPr lang="en-US" altLang="zh-CN" dirty="0"/>
+              <a:rPr lang="en-US" altLang="zh-CN" dirty="0">
+                <a:latin typeface="Times New Roman" panose="02020603050405020304" pitchFamily="18" charset="0"/>
+                <a:cs typeface="Times New Roman" panose="02020603050405020304" pitchFamily="18" charset="0"/>
+              </a:rPr>
               <a:t>Disperse mutable variables into different cache lines </a:t>
             </a:r>
           </a:p>
           <a:p>
             <a:pPr marL="285750" indent="-285750">
+              <a:lnSpc>
+                <a:spcPct val="120000"/>
+              </a:lnSpc>
               <a:buFont typeface="Arial" panose="020B0604020202020204" pitchFamily="34" charset="0"/>
               <a:buChar char="•"/>
             </a:pPr>
             <a:r>
-              <a:rPr lang="en-US" altLang="zh-CN"/>
-              <a:t>Reduce branches and </a:t>
-            </a:r>
+              <a:rPr lang="en-US" altLang="zh-CN" dirty="0">
+                <a:latin typeface="Times New Roman" panose="02020603050405020304" pitchFamily="18" charset="0"/>
+                <a:cs typeface="Times New Roman" panose="02020603050405020304" pitchFamily="18" charset="0"/>
+              </a:rPr>
+              <a:t>Reduce condition branches of kernel functions</a:t>
+            </a:r>
+          </a:p>
+          <a:p>
+            <a:pPr marL="285750" indent="-285750">
+              <a:lnSpc>
+                <a:spcPct val="120000"/>
+              </a:lnSpc>
+              <a:buFont typeface="Arial" panose="020B0604020202020204" pitchFamily="34" charset="0"/>
+              <a:buChar char="•"/>
+            </a:pPr>
+            <a:r>
+              <a:rPr lang="en-US" altLang="zh-CN" dirty="0">
+                <a:latin typeface="Times New Roman" panose="02020603050405020304" pitchFamily="18" charset="0"/>
+                <a:cs typeface="Times New Roman" panose="02020603050405020304" pitchFamily="18" charset="0"/>
+              </a:rPr>
+              <a:t>Avoid frequent data exchange between GPU and host</a:t>
+            </a:r>
+          </a:p>
+        </p:txBody>
+      </p:sp>
+      <p:sp>
+        <p:nvSpPr>
+          <p:cNvPr id="11" name="矩形: 圆角 10">
+            <a:extLst>
+              <a:ext uri="{FF2B5EF4-FFF2-40B4-BE49-F238E27FC236}">
+                <a16:creationId xmlns:a16="http://schemas.microsoft.com/office/drawing/2014/main" id="{A2B29C7B-14D5-47E2-A938-918D5B3B0F82}"/>
+              </a:ext>
+            </a:extLst>
+          </p:cNvPr>
+          <p:cNvSpPr/>
+          <p:nvPr/>
+        </p:nvSpPr>
+        <p:spPr>
+          <a:xfrm>
+            <a:off x="5117677" y="1305636"/>
+            <a:ext cx="6326293" cy="1860646"/>
+          </a:xfrm>
+          <a:prstGeom prst="roundRect">
+            <a:avLst>
+              <a:gd name="adj" fmla="val 2536"/>
+            </a:avLst>
+          </a:prstGeom>
+          <a:solidFill>
+            <a:schemeClr val="bg1"/>
+          </a:solidFill>
+          <a:ln>
+            <a:solidFill>
+              <a:schemeClr val="tx1"/>
+            </a:solidFill>
+          </a:ln>
+        </p:spPr>
+        <p:style>
+          <a:lnRef idx="2">
+            <a:schemeClr val="accent1">
+              <a:shade val="50000"/>
+            </a:schemeClr>
+          </a:lnRef>
+          <a:fillRef idx="1">
+            <a:schemeClr val="accent1"/>
+          </a:fillRef>
+          <a:effectRef idx="0">
+            <a:schemeClr val="accent1"/>
+          </a:effectRef>
+          <a:fontRef idx="minor">
+            <a:schemeClr val="lt1"/>
+          </a:fontRef>
+        </p:style>
+        <p:txBody>
+          <a:bodyPr rtlCol="0" anchor="ctr"/>
+          <a:lstStyle/>
+          <a:p>
+            <a:pPr algn="ctr"/>
             <a:endParaRPr lang="zh-CN" altLang="en-US" dirty="0"/>
+          </a:p>
+        </p:txBody>
+      </p:sp>
+      <p:sp>
+        <p:nvSpPr>
+          <p:cNvPr id="7" name="文本框 6">
+            <a:extLst>
+              <a:ext uri="{FF2B5EF4-FFF2-40B4-BE49-F238E27FC236}">
+                <a16:creationId xmlns:a16="http://schemas.microsoft.com/office/drawing/2014/main" id="{0B2B4194-ED1E-4792-B393-459170D6E863}"/>
+              </a:ext>
+            </a:extLst>
+          </p:cNvPr>
+          <p:cNvSpPr txBox="1"/>
+          <p:nvPr/>
+        </p:nvSpPr>
+        <p:spPr>
+          <a:xfrm>
+            <a:off x="5117677" y="1269241"/>
+            <a:ext cx="1601337" cy="369332"/>
+          </a:xfrm>
+          <a:prstGeom prst="rect">
+            <a:avLst/>
+          </a:prstGeom>
+          <a:noFill/>
+        </p:spPr>
+        <p:txBody>
+          <a:bodyPr wrap="square" rtlCol="0">
+            <a:spAutoFit/>
+          </a:bodyPr>
+          <a:lstStyle/>
+          <a:p>
+            <a:r>
+              <a:rPr lang="en-US" altLang="zh-CN" dirty="0">
+                <a:latin typeface="Times New Roman" panose="02020603050405020304" pitchFamily="18" charset="0"/>
+                <a:cs typeface="Times New Roman" panose="02020603050405020304" pitchFamily="18" charset="0"/>
+              </a:rPr>
+              <a:t>Main Progress</a:t>
+            </a:r>
+            <a:endParaRPr lang="zh-CN" altLang="en-US" dirty="0">
+              <a:latin typeface="Times New Roman" panose="02020603050405020304" pitchFamily="18" charset="0"/>
+              <a:cs typeface="Times New Roman" panose="02020603050405020304" pitchFamily="18" charset="0"/>
+            </a:endParaRPr>
+          </a:p>
+        </p:txBody>
+      </p:sp>
+      <p:sp>
+        <p:nvSpPr>
+          <p:cNvPr id="14" name="矩形: 圆角 13">
+            <a:extLst>
+              <a:ext uri="{FF2B5EF4-FFF2-40B4-BE49-F238E27FC236}">
+                <a16:creationId xmlns:a16="http://schemas.microsoft.com/office/drawing/2014/main" id="{A99E4D78-7CE0-45FB-B3BA-86BDE6001847}"/>
+              </a:ext>
+            </a:extLst>
+          </p:cNvPr>
+          <p:cNvSpPr/>
+          <p:nvPr/>
+        </p:nvSpPr>
+        <p:spPr>
+          <a:xfrm>
+            <a:off x="5117677" y="3382344"/>
+            <a:ext cx="6326293" cy="1860646"/>
+          </a:xfrm>
+          <a:prstGeom prst="roundRect">
+            <a:avLst>
+              <a:gd name="adj" fmla="val 2536"/>
+            </a:avLst>
+          </a:prstGeom>
+          <a:solidFill>
+            <a:schemeClr val="bg1"/>
+          </a:solidFill>
+          <a:ln>
+            <a:solidFill>
+              <a:schemeClr val="tx1"/>
+            </a:solidFill>
+          </a:ln>
+        </p:spPr>
+        <p:style>
+          <a:lnRef idx="2">
+            <a:schemeClr val="accent1">
+              <a:shade val="50000"/>
+            </a:schemeClr>
+          </a:lnRef>
+          <a:fillRef idx="1">
+            <a:schemeClr val="accent1"/>
+          </a:fillRef>
+          <a:effectRef idx="0">
+            <a:schemeClr val="accent1"/>
+          </a:effectRef>
+          <a:fontRef idx="minor">
+            <a:schemeClr val="lt1"/>
+          </a:fontRef>
+        </p:style>
+        <p:txBody>
+          <a:bodyPr rtlCol="0" anchor="ctr"/>
+          <a:lstStyle/>
+          <a:p>
+            <a:pPr algn="ctr"/>
+            <a:endParaRPr lang="zh-CN" altLang="en-US" dirty="0"/>
+          </a:p>
+        </p:txBody>
+      </p:sp>
+      <p:sp>
+        <p:nvSpPr>
+          <p:cNvPr id="18" name="文本框 17">
+            <a:extLst>
+              <a:ext uri="{FF2B5EF4-FFF2-40B4-BE49-F238E27FC236}">
+                <a16:creationId xmlns:a16="http://schemas.microsoft.com/office/drawing/2014/main" id="{4C38D50C-0588-4879-BF1B-AE40A5249D27}"/>
+              </a:ext>
+            </a:extLst>
+          </p:cNvPr>
+          <p:cNvSpPr txBox="1"/>
+          <p:nvPr/>
+        </p:nvSpPr>
+        <p:spPr>
+          <a:xfrm>
+            <a:off x="5117677" y="3345949"/>
+            <a:ext cx="646227" cy="369332"/>
+          </a:xfrm>
+          <a:prstGeom prst="rect">
+            <a:avLst/>
+          </a:prstGeom>
+          <a:noFill/>
+        </p:spPr>
+        <p:txBody>
+          <a:bodyPr wrap="square" rtlCol="0">
+            <a:spAutoFit/>
+          </a:bodyPr>
+          <a:lstStyle/>
+          <a:p>
+            <a:r>
+              <a:rPr lang="en-US" altLang="zh-CN" dirty="0">
+                <a:latin typeface="Times New Roman" panose="02020603050405020304" pitchFamily="18" charset="0"/>
+                <a:cs typeface="Times New Roman" panose="02020603050405020304" pitchFamily="18" charset="0"/>
+              </a:rPr>
+              <a:t>GPU</a:t>
+            </a:r>
+            <a:endParaRPr lang="zh-CN" altLang="en-US" dirty="0">
+              <a:latin typeface="Times New Roman" panose="02020603050405020304" pitchFamily="18" charset="0"/>
+              <a:cs typeface="Times New Roman" panose="02020603050405020304" pitchFamily="18" charset="0"/>
+            </a:endParaRPr>
           </a:p>
         </p:txBody>
       </p:sp>

</xml_diff>

<commit_message>
vault backup: 2023-09-17 20:54:31
</commit_message>
<xml_diff>
--- a/OS/DONS/FES.pptx
+++ b/OS/DONS/FES.pptx
@@ -205,7 +205,7 @@
           <a:p>
             <a:fld id="{DC8DF830-0B68-4DA1-B7F1-3F604F3412E2}" type="datetimeFigureOut">
               <a:rPr lang="zh-CN" altLang="en-US" smtClean="0"/>
-              <a:t>2023/9/15</a:t>
+              <a:t>2023/9/17</a:t>
             </a:fld>
             <a:endParaRPr lang="zh-CN" altLang="en-US"/>
           </a:p>
@@ -1771,7 +1771,7 @@
           <a:p>
             <a:fld id="{5C67483F-86B4-4181-AEB3-1074CE197F11}" type="datetimeFigureOut">
               <a:rPr lang="zh-CN" altLang="en-US" smtClean="0"/>
-              <a:t>2023/9/15</a:t>
+              <a:t>2023/9/17</a:t>
             </a:fld>
             <a:endParaRPr lang="zh-CN" altLang="en-US"/>
           </a:p>
@@ -1969,7 +1969,7 @@
           <a:p>
             <a:fld id="{5C67483F-86B4-4181-AEB3-1074CE197F11}" type="datetimeFigureOut">
               <a:rPr lang="zh-CN" altLang="en-US" smtClean="0"/>
-              <a:t>2023/9/15</a:t>
+              <a:t>2023/9/17</a:t>
             </a:fld>
             <a:endParaRPr lang="zh-CN" altLang="en-US"/>
           </a:p>
@@ -2177,7 +2177,7 @@
           <a:p>
             <a:fld id="{5C67483F-86B4-4181-AEB3-1074CE197F11}" type="datetimeFigureOut">
               <a:rPr lang="zh-CN" altLang="en-US" smtClean="0"/>
-              <a:t>2023/9/15</a:t>
+              <a:t>2023/9/17</a:t>
             </a:fld>
             <a:endParaRPr lang="zh-CN" altLang="en-US"/>
           </a:p>
@@ -2326,7 +2326,7 @@
             <a:fld id="{DB494AA1-4C1D-4C99-92BC-CE5686F06754}" type="datetime1">
               <a:rPr lang="zh-CN" altLang="en-US" smtClean="0"/>
               <a:pPr/>
-              <a:t>2023/9/15</a:t>
+              <a:t>2023/9/17</a:t>
             </a:fld>
             <a:endParaRPr lang="zh-CN" altLang="en-US"/>
           </a:p>
@@ -2668,7 +2668,7 @@
           <a:p>
             <a:fld id="{5C67483F-86B4-4181-AEB3-1074CE197F11}" type="datetimeFigureOut">
               <a:rPr lang="zh-CN" altLang="en-US" smtClean="0"/>
-              <a:t>2023/9/15</a:t>
+              <a:t>2023/9/17</a:t>
             </a:fld>
             <a:endParaRPr lang="zh-CN" altLang="en-US"/>
           </a:p>
@@ -2943,7 +2943,7 @@
           <a:p>
             <a:fld id="{5C67483F-86B4-4181-AEB3-1074CE197F11}" type="datetimeFigureOut">
               <a:rPr lang="zh-CN" altLang="en-US" smtClean="0"/>
-              <a:t>2023/9/15</a:t>
+              <a:t>2023/9/17</a:t>
             </a:fld>
             <a:endParaRPr lang="zh-CN" altLang="en-US"/>
           </a:p>
@@ -3208,7 +3208,7 @@
           <a:p>
             <a:fld id="{5C67483F-86B4-4181-AEB3-1074CE197F11}" type="datetimeFigureOut">
               <a:rPr lang="zh-CN" altLang="en-US" smtClean="0"/>
-              <a:t>2023/9/15</a:t>
+              <a:t>2023/9/17</a:t>
             </a:fld>
             <a:endParaRPr lang="zh-CN" altLang="en-US"/>
           </a:p>
@@ -3620,7 +3620,7 @@
           <a:p>
             <a:fld id="{5C67483F-86B4-4181-AEB3-1074CE197F11}" type="datetimeFigureOut">
               <a:rPr lang="zh-CN" altLang="en-US" smtClean="0"/>
-              <a:t>2023/9/15</a:t>
+              <a:t>2023/9/17</a:t>
             </a:fld>
             <a:endParaRPr lang="zh-CN" altLang="en-US"/>
           </a:p>
@@ -3761,7 +3761,7 @@
           <a:p>
             <a:fld id="{5C67483F-86B4-4181-AEB3-1074CE197F11}" type="datetimeFigureOut">
               <a:rPr lang="zh-CN" altLang="en-US" smtClean="0"/>
-              <a:t>2023/9/15</a:t>
+              <a:t>2023/9/17</a:t>
             </a:fld>
             <a:endParaRPr lang="zh-CN" altLang="en-US"/>
           </a:p>
@@ -3874,7 +3874,7 @@
           <a:p>
             <a:fld id="{5C67483F-86B4-4181-AEB3-1074CE197F11}" type="datetimeFigureOut">
               <a:rPr lang="zh-CN" altLang="en-US" smtClean="0"/>
-              <a:t>2023/9/15</a:t>
+              <a:t>2023/9/17</a:t>
             </a:fld>
             <a:endParaRPr lang="zh-CN" altLang="en-US"/>
           </a:p>
@@ -4185,7 +4185,7 @@
           <a:p>
             <a:fld id="{5C67483F-86B4-4181-AEB3-1074CE197F11}" type="datetimeFigureOut">
               <a:rPr lang="zh-CN" altLang="en-US" smtClean="0"/>
-              <a:t>2023/9/15</a:t>
+              <a:t>2023/9/17</a:t>
             </a:fld>
             <a:endParaRPr lang="zh-CN" altLang="en-US"/>
           </a:p>
@@ -4473,7 +4473,7 @@
           <a:p>
             <a:fld id="{5C67483F-86B4-4181-AEB3-1074CE197F11}" type="datetimeFigureOut">
               <a:rPr lang="zh-CN" altLang="en-US" smtClean="0"/>
-              <a:t>2023/9/15</a:t>
+              <a:t>2023/9/17</a:t>
             </a:fld>
             <a:endParaRPr lang="zh-CN" altLang="en-US"/>
           </a:p>
@@ -4714,7 +4714,7 @@
           <a:p>
             <a:fld id="{5C67483F-86B4-4181-AEB3-1074CE197F11}" type="datetimeFigureOut">
               <a:rPr lang="zh-CN" altLang="en-US" smtClean="0"/>
-              <a:t>2023/9/15</a:t>
+              <a:t>2023/9/17</a:t>
             </a:fld>
             <a:endParaRPr lang="zh-CN" altLang="en-US"/>
           </a:p>
@@ -15345,7 +15345,7 @@
         </p:nvSpPr>
         <p:spPr>
           <a:xfrm>
-            <a:off x="853129" y="3638409"/>
+            <a:off x="925700" y="3558669"/>
             <a:ext cx="3730646" cy="2065309"/>
           </a:xfrm>
           <a:prstGeom prst="rect">
@@ -15715,12 +15715,12 @@
         </p:nvSpPr>
         <p:spPr>
           <a:xfrm>
-            <a:off x="4976328" y="862789"/>
-            <a:ext cx="6636286" cy="4632658"/>
+            <a:off x="4185611" y="825158"/>
+            <a:ext cx="7909965" cy="5651299"/>
           </a:xfrm>
           <a:prstGeom prst="roundRect">
             <a:avLst>
-              <a:gd name="adj" fmla="val 2536"/>
+              <a:gd name="adj" fmla="val 1605"/>
             </a:avLst>
           </a:prstGeom>
           <a:solidFill>
@@ -15759,52 +15759,10 @@
       </p:sp>
       <p:sp>
         <p:nvSpPr>
-          <p:cNvPr id="6" name="文本框 5">
-            <a:extLst>
-              <a:ext uri="{FF2B5EF4-FFF2-40B4-BE49-F238E27FC236}">
-                <a16:creationId xmlns:a16="http://schemas.microsoft.com/office/drawing/2014/main" id="{1A1E79FE-FB54-4507-8351-D3F8B497EDF3}"/>
-              </a:ext>
-            </a:extLst>
-          </p:cNvPr>
-          <p:cNvSpPr txBox="1"/>
-          <p:nvPr/>
-        </p:nvSpPr>
-        <p:spPr>
-          <a:xfrm>
-            <a:off x="6915022" y="825158"/>
-            <a:ext cx="2758898" cy="369332"/>
-          </a:xfrm>
-          <a:prstGeom prst="rect">
-            <a:avLst/>
-          </a:prstGeom>
-          <a:noFill/>
-        </p:spPr>
-        <p:txBody>
-          <a:bodyPr wrap="square" rtlCol="0">
-            <a:spAutoFit/>
-          </a:bodyPr>
-          <a:lstStyle/>
-          <a:p>
-            <a:r>
-              <a:rPr lang="en-US" altLang="zh-CN" dirty="0">
-                <a:latin typeface="Times New Roman" panose="02020603050405020304" pitchFamily="18" charset="0"/>
-                <a:cs typeface="Times New Roman" panose="02020603050405020304" pitchFamily="18" charset="0"/>
-              </a:rPr>
-              <a:t>Simulator Engine Overview</a:t>
-            </a:r>
-            <a:endParaRPr lang="zh-CN" altLang="en-US" dirty="0">
-              <a:latin typeface="Times New Roman" panose="02020603050405020304" pitchFamily="18" charset="0"/>
-              <a:cs typeface="Times New Roman" panose="02020603050405020304" pitchFamily="18" charset="0"/>
-            </a:endParaRPr>
-          </a:p>
-        </p:txBody>
-      </p:sp>
-      <p:sp>
-        <p:nvSpPr>
-          <p:cNvPr id="15" name="矩形: 圆角 14">
-            <a:extLst>
-              <a:ext uri="{FF2B5EF4-FFF2-40B4-BE49-F238E27FC236}">
-                <a16:creationId xmlns:a16="http://schemas.microsoft.com/office/drawing/2014/main" id="{CA48F34E-DD8B-4301-8040-4EBE901E8619}"/>
+          <p:cNvPr id="74" name="矩形: 圆角 73">
+            <a:extLst>
+              <a:ext uri="{FF2B5EF4-FFF2-40B4-BE49-F238E27FC236}">
+                <a16:creationId xmlns:a16="http://schemas.microsoft.com/office/drawing/2014/main" id="{3A4EDFF5-81B6-49FA-8074-24202F53F851}"/>
               </a:ext>
             </a:extLst>
           </p:cNvPr>
@@ -15813,12 +15771,12 @@
         </p:nvSpPr>
         <p:spPr>
           <a:xfrm>
-            <a:off x="217801" y="862789"/>
-            <a:ext cx="3610049" cy="3526880"/>
+            <a:off x="4338012" y="1194490"/>
+            <a:ext cx="7636188" cy="2383281"/>
           </a:xfrm>
           <a:prstGeom prst="roundRect">
             <a:avLst>
-              <a:gd name="adj" fmla="val 2536"/>
+              <a:gd name="adj" fmla="val 1605"/>
             </a:avLst>
           </a:prstGeom>
           <a:solidFill>
@@ -15851,16 +15809,16 @@
           <a:lstStyle/>
           <a:p>
             <a:pPr algn="ctr"/>
-            <a:endParaRPr lang="zh-CN" altLang="en-US" dirty="0"/>
-          </a:p>
-        </p:txBody>
-      </p:sp>
-      <p:sp>
-        <p:nvSpPr>
-          <p:cNvPr id="16" name="文本框 15">
-            <a:extLst>
-              <a:ext uri="{FF2B5EF4-FFF2-40B4-BE49-F238E27FC236}">
-                <a16:creationId xmlns:a16="http://schemas.microsoft.com/office/drawing/2014/main" id="{710FFF85-E58F-4691-B271-30367F979F27}"/>
+            <a:endParaRPr lang="zh-CN" altLang="en-US"/>
+          </a:p>
+        </p:txBody>
+      </p:sp>
+      <p:sp>
+        <p:nvSpPr>
+          <p:cNvPr id="6" name="文本框 5">
+            <a:extLst>
+              <a:ext uri="{FF2B5EF4-FFF2-40B4-BE49-F238E27FC236}">
+                <a16:creationId xmlns:a16="http://schemas.microsoft.com/office/drawing/2014/main" id="{1A1E79FE-FB54-4507-8351-D3F8B497EDF3}"/>
               </a:ext>
             </a:extLst>
           </p:cNvPr>
@@ -15869,8 +15827,8 @@
         </p:nvSpPr>
         <p:spPr>
           <a:xfrm>
-            <a:off x="1064741" y="825158"/>
-            <a:ext cx="1916169" cy="369332"/>
+            <a:off x="6722700" y="825158"/>
+            <a:ext cx="2758898" cy="369332"/>
           </a:xfrm>
           <a:prstGeom prst="rect">
             <a:avLst/>
@@ -15888,7 +15846,7 @@
                 <a:latin typeface="Times New Roman" panose="02020603050405020304" pitchFamily="18" charset="0"/>
                 <a:cs typeface="Times New Roman" panose="02020603050405020304" pitchFamily="18" charset="0"/>
               </a:rPr>
-              <a:t>Design  Principles</a:t>
+              <a:t>Simulator Engine Overview</a:t>
             </a:r>
             <a:endParaRPr lang="zh-CN" altLang="en-US" dirty="0">
               <a:latin typeface="Times New Roman" panose="02020603050405020304" pitchFamily="18" charset="0"/>
@@ -15899,119 +15857,10 @@
       </p:sp>
       <p:sp>
         <p:nvSpPr>
-          <p:cNvPr id="17" name="文本框 16">
-            <a:extLst>
-              <a:ext uri="{FF2B5EF4-FFF2-40B4-BE49-F238E27FC236}">
-                <a16:creationId xmlns:a16="http://schemas.microsoft.com/office/drawing/2014/main" id="{72CAA8F2-EA18-41D3-B82E-9A061F6255DD}"/>
-              </a:ext>
-            </a:extLst>
-          </p:cNvPr>
-          <p:cNvSpPr txBox="1"/>
-          <p:nvPr/>
-        </p:nvSpPr>
-        <p:spPr>
-          <a:xfrm>
-            <a:off x="265242" y="1159292"/>
-            <a:ext cx="3429089" cy="3054939"/>
-          </a:xfrm>
-          <a:prstGeom prst="rect">
-            <a:avLst/>
-          </a:prstGeom>
-          <a:noFill/>
-        </p:spPr>
-        <p:txBody>
-          <a:bodyPr wrap="square" rtlCol="0">
-            <a:spAutoFit/>
-          </a:bodyPr>
-          <a:lstStyle/>
-          <a:p>
-            <a:pPr marL="285750" indent="-285750">
-              <a:lnSpc>
-                <a:spcPct val="120000"/>
-              </a:lnSpc>
-              <a:buFont typeface="Arial" panose="020B0604020202020204" pitchFamily="34" charset="0"/>
-              <a:buChar char="•"/>
-            </a:pPr>
-            <a:r>
-              <a:rPr lang="en-US" altLang="zh-CN" dirty="0">
-                <a:latin typeface="Times New Roman" panose="02020603050405020304" pitchFamily="18" charset="0"/>
-                <a:cs typeface="Times New Roman" panose="02020603050405020304" pitchFamily="18" charset="0"/>
-              </a:rPr>
-              <a:t>Batch-based parallelism</a:t>
-            </a:r>
-          </a:p>
-          <a:p>
-            <a:pPr marL="285750" indent="-285750">
-              <a:lnSpc>
-                <a:spcPct val="120000"/>
-              </a:lnSpc>
-              <a:buFont typeface="Arial" panose="020B0604020202020204" pitchFamily="34" charset="0"/>
-              <a:buChar char="•"/>
-            </a:pPr>
-            <a:r>
-              <a:rPr lang="en-US" altLang="zh-CN" dirty="0">
-                <a:latin typeface="Times New Roman" panose="02020603050405020304" pitchFamily="18" charset="0"/>
-                <a:cs typeface="Times New Roman" panose="02020603050405020304" pitchFamily="18" charset="0"/>
-              </a:rPr>
-              <a:t>Decouple logical control from computing</a:t>
-            </a:r>
-          </a:p>
-          <a:p>
-            <a:pPr marL="285750" indent="-285750">
-              <a:lnSpc>
-                <a:spcPct val="120000"/>
-              </a:lnSpc>
-              <a:buFont typeface="Arial" panose="020B0604020202020204" pitchFamily="34" charset="0"/>
-              <a:buChar char="•"/>
-            </a:pPr>
-            <a:r>
-              <a:rPr lang="en-US" altLang="zh-CN" dirty="0">
-                <a:latin typeface="Times New Roman" panose="02020603050405020304" pitchFamily="18" charset="0"/>
-                <a:cs typeface="Times New Roman" panose="02020603050405020304" pitchFamily="18" charset="0"/>
-              </a:rPr>
-              <a:t>Disperse mutable variables into different cache lines </a:t>
-            </a:r>
-          </a:p>
-          <a:p>
-            <a:pPr marL="285750" indent="-285750">
-              <a:lnSpc>
-                <a:spcPct val="120000"/>
-              </a:lnSpc>
-              <a:buFont typeface="Arial" panose="020B0604020202020204" pitchFamily="34" charset="0"/>
-              <a:buChar char="•"/>
-            </a:pPr>
-            <a:r>
-              <a:rPr lang="en-US" altLang="zh-CN" dirty="0">
-                <a:latin typeface="Times New Roman" panose="02020603050405020304" pitchFamily="18" charset="0"/>
-                <a:cs typeface="Times New Roman" panose="02020603050405020304" pitchFamily="18" charset="0"/>
-              </a:rPr>
-              <a:t>Reduce condition branches of kernel functions</a:t>
-            </a:r>
-          </a:p>
-          <a:p>
-            <a:pPr marL="285750" indent="-285750">
-              <a:lnSpc>
-                <a:spcPct val="120000"/>
-              </a:lnSpc>
-              <a:buFont typeface="Arial" panose="020B0604020202020204" pitchFamily="34" charset="0"/>
-              <a:buChar char="•"/>
-            </a:pPr>
-            <a:r>
-              <a:rPr lang="en-US" altLang="zh-CN" dirty="0">
-                <a:latin typeface="Times New Roman" panose="02020603050405020304" pitchFamily="18" charset="0"/>
-                <a:cs typeface="Times New Roman" panose="02020603050405020304" pitchFamily="18" charset="0"/>
-              </a:rPr>
-              <a:t>Avoid frequent data exchange between GPU and host</a:t>
-            </a:r>
-          </a:p>
-        </p:txBody>
-      </p:sp>
-      <p:sp>
-        <p:nvSpPr>
-          <p:cNvPr id="11" name="矩形: 圆角 10">
-            <a:extLst>
-              <a:ext uri="{FF2B5EF4-FFF2-40B4-BE49-F238E27FC236}">
-                <a16:creationId xmlns:a16="http://schemas.microsoft.com/office/drawing/2014/main" id="{A2B29C7B-14D5-47E2-A938-918D5B3B0F82}"/>
+          <p:cNvPr id="15" name="矩形: 圆角 14">
+            <a:extLst>
+              <a:ext uri="{FF2B5EF4-FFF2-40B4-BE49-F238E27FC236}">
+                <a16:creationId xmlns:a16="http://schemas.microsoft.com/office/drawing/2014/main" id="{CA48F34E-DD8B-4301-8040-4EBE901E8619}"/>
               </a:ext>
             </a:extLst>
           </p:cNvPr>
@@ -16020,8 +15869,8 @@
         </p:nvSpPr>
         <p:spPr>
           <a:xfrm>
-            <a:off x="5117677" y="1305636"/>
-            <a:ext cx="6326293" cy="1860646"/>
+            <a:off x="217801" y="862789"/>
+            <a:ext cx="3610049" cy="5613668"/>
           </a:xfrm>
           <a:prstGeom prst="roundRect">
             <a:avLst>
@@ -16064,10 +15913,10 @@
       </p:sp>
       <p:sp>
         <p:nvSpPr>
-          <p:cNvPr id="7" name="文本框 6">
-            <a:extLst>
-              <a:ext uri="{FF2B5EF4-FFF2-40B4-BE49-F238E27FC236}">
-                <a16:creationId xmlns:a16="http://schemas.microsoft.com/office/drawing/2014/main" id="{0B2B4194-ED1E-4792-B393-459170D6E863}"/>
+          <p:cNvPr id="16" name="文本框 15">
+            <a:extLst>
+              <a:ext uri="{FF2B5EF4-FFF2-40B4-BE49-F238E27FC236}">
+                <a16:creationId xmlns:a16="http://schemas.microsoft.com/office/drawing/2014/main" id="{710FFF85-E58F-4691-B271-30367F979F27}"/>
               </a:ext>
             </a:extLst>
           </p:cNvPr>
@@ -16076,8 +15925,8 @@
         </p:nvSpPr>
         <p:spPr>
           <a:xfrm>
-            <a:off x="5117677" y="1269241"/>
-            <a:ext cx="1601337" cy="369332"/>
+            <a:off x="1064741" y="825158"/>
+            <a:ext cx="1916169" cy="369332"/>
           </a:xfrm>
           <a:prstGeom prst="rect">
             <a:avLst/>
@@ -16095,7 +15944,7 @@
                 <a:latin typeface="Times New Roman" panose="02020603050405020304" pitchFamily="18" charset="0"/>
                 <a:cs typeface="Times New Roman" panose="02020603050405020304" pitchFamily="18" charset="0"/>
               </a:rPr>
-              <a:t>Main Progress</a:t>
+              <a:t>Design  Principles</a:t>
             </a:r>
             <a:endParaRPr lang="zh-CN" altLang="en-US" dirty="0">
               <a:latin typeface="Times New Roman" panose="02020603050405020304" pitchFamily="18" charset="0"/>
@@ -16106,10 +15955,530 @@
       </p:sp>
       <p:sp>
         <p:nvSpPr>
+          <p:cNvPr id="17" name="文本框 16">
+            <a:extLst>
+              <a:ext uri="{FF2B5EF4-FFF2-40B4-BE49-F238E27FC236}">
+                <a16:creationId xmlns:a16="http://schemas.microsoft.com/office/drawing/2014/main" id="{72CAA8F2-EA18-41D3-B82E-9A061F6255DD}"/>
+              </a:ext>
+            </a:extLst>
+          </p:cNvPr>
+          <p:cNvSpPr txBox="1"/>
+          <p:nvPr/>
+        </p:nvSpPr>
+        <p:spPr>
+          <a:xfrm>
+            <a:off x="265242" y="1159292"/>
+            <a:ext cx="3429089" cy="4384534"/>
+          </a:xfrm>
+          <a:prstGeom prst="rect">
+            <a:avLst/>
+          </a:prstGeom>
+          <a:noFill/>
+        </p:spPr>
+        <p:txBody>
+          <a:bodyPr wrap="square" rtlCol="0">
+            <a:spAutoFit/>
+          </a:bodyPr>
+          <a:lstStyle/>
+          <a:p>
+            <a:pPr marL="285750" indent="-285750">
+              <a:lnSpc>
+                <a:spcPct val="120000"/>
+              </a:lnSpc>
+              <a:buFont typeface="Arial" panose="020B0604020202020204" pitchFamily="34" charset="0"/>
+              <a:buChar char="•"/>
+            </a:pPr>
+            <a:r>
+              <a:rPr lang="en-US" altLang="zh-CN" dirty="0">
+                <a:latin typeface="Times New Roman" panose="02020603050405020304" pitchFamily="18" charset="0"/>
+                <a:cs typeface="Times New Roman" panose="02020603050405020304" pitchFamily="18" charset="0"/>
+              </a:rPr>
+              <a:t>Batch-based parallelism</a:t>
+            </a:r>
+          </a:p>
+          <a:p>
+            <a:pPr marL="285750" indent="-285750">
+              <a:lnSpc>
+                <a:spcPct val="120000"/>
+              </a:lnSpc>
+              <a:buFont typeface="Arial" panose="020B0604020202020204" pitchFamily="34" charset="0"/>
+              <a:buChar char="•"/>
+            </a:pPr>
+            <a:r>
+              <a:rPr lang="en-US" altLang="zh-CN" dirty="0">
+                <a:latin typeface="Times New Roman" panose="02020603050405020304" pitchFamily="18" charset="0"/>
+                <a:cs typeface="Times New Roman" panose="02020603050405020304" pitchFamily="18" charset="0"/>
+              </a:rPr>
+              <a:t>Decouple logical control from computing</a:t>
+            </a:r>
+          </a:p>
+          <a:p>
+            <a:pPr marL="285750" indent="-285750">
+              <a:lnSpc>
+                <a:spcPct val="120000"/>
+              </a:lnSpc>
+              <a:buFont typeface="Arial" panose="020B0604020202020204" pitchFamily="34" charset="0"/>
+              <a:buChar char="•"/>
+            </a:pPr>
+            <a:r>
+              <a:rPr lang="en-US" altLang="zh-CN" dirty="0">
+                <a:latin typeface="Times New Roman" panose="02020603050405020304" pitchFamily="18" charset="0"/>
+                <a:cs typeface="Times New Roman" panose="02020603050405020304" pitchFamily="18" charset="0"/>
+              </a:rPr>
+              <a:t>Disperse mutable variables into different cache lines </a:t>
+            </a:r>
+          </a:p>
+          <a:p>
+            <a:pPr marL="285750" indent="-285750">
+              <a:lnSpc>
+                <a:spcPct val="120000"/>
+              </a:lnSpc>
+              <a:buFont typeface="Arial" panose="020B0604020202020204" pitchFamily="34" charset="0"/>
+              <a:buChar char="•"/>
+            </a:pPr>
+            <a:r>
+              <a:rPr lang="en-US" altLang="zh-CN" dirty="0">
+                <a:latin typeface="Times New Roman" panose="02020603050405020304" pitchFamily="18" charset="0"/>
+                <a:cs typeface="Times New Roman" panose="02020603050405020304" pitchFamily="18" charset="0"/>
+              </a:rPr>
+              <a:t>Reduce condition branches of kernel functions</a:t>
+            </a:r>
+          </a:p>
+          <a:p>
+            <a:pPr marL="285750" indent="-285750">
+              <a:lnSpc>
+                <a:spcPct val="120000"/>
+              </a:lnSpc>
+              <a:buFont typeface="Arial" panose="020B0604020202020204" pitchFamily="34" charset="0"/>
+              <a:buChar char="•"/>
+            </a:pPr>
+            <a:r>
+              <a:rPr lang="en-US" altLang="zh-CN" dirty="0">
+                <a:latin typeface="Times New Roman" panose="02020603050405020304" pitchFamily="18" charset="0"/>
+                <a:cs typeface="Times New Roman" panose="02020603050405020304" pitchFamily="18" charset="0"/>
+              </a:rPr>
+              <a:t>Simple kernel functions, try not to invoke third-party </a:t>
+            </a:r>
+            <a:r>
+              <a:rPr lang="en-US" altLang="zh-CN" dirty="0" err="1">
+                <a:latin typeface="Times New Roman" panose="02020603050405020304" pitchFamily="18" charset="0"/>
+                <a:cs typeface="Times New Roman" panose="02020603050405020304" pitchFamily="18" charset="0"/>
+              </a:rPr>
+              <a:t>cpu</a:t>
+            </a:r>
+            <a:r>
+              <a:rPr lang="en-US" altLang="zh-CN" dirty="0">
+                <a:latin typeface="Times New Roman" panose="02020603050405020304" pitchFamily="18" charset="0"/>
+                <a:cs typeface="Times New Roman" panose="02020603050405020304" pitchFamily="18" charset="0"/>
+              </a:rPr>
+              <a:t>-based libraries</a:t>
+            </a:r>
+          </a:p>
+          <a:p>
+            <a:pPr marL="285750" indent="-285750">
+              <a:lnSpc>
+                <a:spcPct val="120000"/>
+              </a:lnSpc>
+              <a:buFont typeface="Arial" panose="020B0604020202020204" pitchFamily="34" charset="0"/>
+              <a:buChar char="•"/>
+            </a:pPr>
+            <a:r>
+              <a:rPr lang="en-US" altLang="zh-CN" dirty="0">
+                <a:latin typeface="Times New Roman" panose="02020603050405020304" pitchFamily="18" charset="0"/>
+                <a:cs typeface="Times New Roman" panose="02020603050405020304" pitchFamily="18" charset="0"/>
+              </a:rPr>
+              <a:t>Avoid frequent data exchange between GPU and host</a:t>
+            </a:r>
+          </a:p>
+          <a:p>
+            <a:pPr marL="285750" indent="-285750">
+              <a:lnSpc>
+                <a:spcPct val="120000"/>
+              </a:lnSpc>
+              <a:buFont typeface="Arial" panose="020B0604020202020204" pitchFamily="34" charset="0"/>
+              <a:buChar char="•"/>
+            </a:pPr>
+            <a:r>
+              <a:rPr lang="en-US" altLang="zh-CN" dirty="0">
+                <a:latin typeface="Times New Roman" panose="02020603050405020304" pitchFamily="18" charset="0"/>
+                <a:cs typeface="Times New Roman" panose="02020603050405020304" pitchFamily="18" charset="0"/>
+              </a:rPr>
+              <a:t>GPU execute tasks in offline</a:t>
+            </a:r>
+          </a:p>
+        </p:txBody>
+      </p:sp>
+      <p:sp>
+        <p:nvSpPr>
+          <p:cNvPr id="8" name="矩形: 圆角 7">
+            <a:extLst>
+              <a:ext uri="{FF2B5EF4-FFF2-40B4-BE49-F238E27FC236}">
+                <a16:creationId xmlns:a16="http://schemas.microsoft.com/office/drawing/2014/main" id="{61D2EC52-B1FC-4AAA-98B6-A729B063DD79}"/>
+              </a:ext>
+            </a:extLst>
+          </p:cNvPr>
+          <p:cNvSpPr/>
+          <p:nvPr/>
+        </p:nvSpPr>
+        <p:spPr>
+          <a:xfrm>
+            <a:off x="4454215" y="1358133"/>
+            <a:ext cx="1080000" cy="360000"/>
+          </a:xfrm>
+          <a:prstGeom prst="roundRect">
+            <a:avLst/>
+          </a:prstGeom>
+          <a:solidFill>
+            <a:schemeClr val="accent6">
+              <a:lumMod val="20000"/>
+              <a:lumOff val="80000"/>
+            </a:schemeClr>
+          </a:solidFill>
+          <a:ln>
+            <a:solidFill>
+              <a:schemeClr val="tx1"/>
+            </a:solidFill>
+          </a:ln>
+        </p:spPr>
+        <p:style>
+          <a:lnRef idx="2">
+            <a:schemeClr val="accent1">
+              <a:shade val="50000"/>
+            </a:schemeClr>
+          </a:lnRef>
+          <a:fillRef idx="1">
+            <a:schemeClr val="accent1"/>
+          </a:fillRef>
+          <a:effectRef idx="0">
+            <a:schemeClr val="accent1"/>
+          </a:effectRef>
+          <a:fontRef idx="minor">
+            <a:schemeClr val="lt1"/>
+          </a:fontRef>
+        </p:style>
+        <p:txBody>
+          <a:bodyPr rtlCol="0" anchor="ctr"/>
+          <a:lstStyle/>
+          <a:p>
+            <a:pPr algn="ctr"/>
+            <a:r>
+              <a:rPr lang="en-US" altLang="zh-CN" sz="1200" dirty="0">
+                <a:solidFill>
+                  <a:schemeClr val="tx1"/>
+                </a:solidFill>
+                <a:latin typeface="Times New Roman" panose="02020603050405020304" pitchFamily="18" charset="0"/>
+                <a:cs typeface="Times New Roman" panose="02020603050405020304" pitchFamily="18" charset="0"/>
+              </a:rPr>
+              <a:t>Packet Generation</a:t>
+            </a:r>
+            <a:endParaRPr lang="zh-CN" altLang="en-US" sz="1200" dirty="0">
+              <a:solidFill>
+                <a:schemeClr val="tx1"/>
+              </a:solidFill>
+              <a:latin typeface="Times New Roman" panose="02020603050405020304" pitchFamily="18" charset="0"/>
+              <a:cs typeface="Times New Roman" panose="02020603050405020304" pitchFamily="18" charset="0"/>
+            </a:endParaRPr>
+          </a:p>
+        </p:txBody>
+      </p:sp>
+      <p:sp>
+        <p:nvSpPr>
+          <p:cNvPr id="21" name="矩形: 圆角 20">
+            <a:extLst>
+              <a:ext uri="{FF2B5EF4-FFF2-40B4-BE49-F238E27FC236}">
+                <a16:creationId xmlns:a16="http://schemas.microsoft.com/office/drawing/2014/main" id="{61DBB4BA-DD9D-4292-A844-0AAD7C9A9B1D}"/>
+              </a:ext>
+            </a:extLst>
+          </p:cNvPr>
+          <p:cNvSpPr/>
+          <p:nvPr/>
+        </p:nvSpPr>
+        <p:spPr>
+          <a:xfrm>
+            <a:off x="5713677" y="1358133"/>
+            <a:ext cx="1080000" cy="360000"/>
+          </a:xfrm>
+          <a:prstGeom prst="roundRect">
+            <a:avLst/>
+          </a:prstGeom>
+          <a:solidFill>
+            <a:schemeClr val="accent6">
+              <a:lumMod val="20000"/>
+              <a:lumOff val="80000"/>
+            </a:schemeClr>
+          </a:solidFill>
+          <a:ln>
+            <a:solidFill>
+              <a:schemeClr val="tx1"/>
+            </a:solidFill>
+          </a:ln>
+        </p:spPr>
+        <p:style>
+          <a:lnRef idx="2">
+            <a:schemeClr val="accent1">
+              <a:shade val="50000"/>
+            </a:schemeClr>
+          </a:lnRef>
+          <a:fillRef idx="1">
+            <a:schemeClr val="accent1"/>
+          </a:fillRef>
+          <a:effectRef idx="0">
+            <a:schemeClr val="accent1"/>
+          </a:effectRef>
+          <a:fontRef idx="minor">
+            <a:schemeClr val="lt1"/>
+          </a:fontRef>
+        </p:style>
+        <p:txBody>
+          <a:bodyPr rtlCol="0" anchor="ctr"/>
+          <a:lstStyle/>
+          <a:p>
+            <a:pPr algn="ctr"/>
+            <a:r>
+              <a:rPr lang="en-US" altLang="zh-CN" sz="1200" dirty="0">
+                <a:solidFill>
+                  <a:schemeClr val="tx1"/>
+                </a:solidFill>
+                <a:latin typeface="Times New Roman" panose="02020603050405020304" pitchFamily="18" charset="0"/>
+                <a:cs typeface="Times New Roman" panose="02020603050405020304" pitchFamily="18" charset="0"/>
+              </a:rPr>
+              <a:t>Protocol System</a:t>
+            </a:r>
+            <a:endParaRPr lang="zh-CN" altLang="en-US" sz="1200" dirty="0">
+              <a:solidFill>
+                <a:schemeClr val="tx1"/>
+              </a:solidFill>
+              <a:latin typeface="Times New Roman" panose="02020603050405020304" pitchFamily="18" charset="0"/>
+              <a:cs typeface="Times New Roman" panose="02020603050405020304" pitchFamily="18" charset="0"/>
+            </a:endParaRPr>
+          </a:p>
+        </p:txBody>
+      </p:sp>
+      <p:sp>
+        <p:nvSpPr>
+          <p:cNvPr id="22" name="矩形: 圆角 21">
+            <a:extLst>
+              <a:ext uri="{FF2B5EF4-FFF2-40B4-BE49-F238E27FC236}">
+                <a16:creationId xmlns:a16="http://schemas.microsoft.com/office/drawing/2014/main" id="{80987DE8-F111-4774-8140-5C9ADDE095DF}"/>
+              </a:ext>
+            </a:extLst>
+          </p:cNvPr>
+          <p:cNvSpPr/>
+          <p:nvPr/>
+        </p:nvSpPr>
+        <p:spPr>
+          <a:xfrm>
+            <a:off x="6973139" y="1358133"/>
+            <a:ext cx="1080000" cy="360000"/>
+          </a:xfrm>
+          <a:prstGeom prst="roundRect">
+            <a:avLst/>
+          </a:prstGeom>
+          <a:solidFill>
+            <a:schemeClr val="accent6">
+              <a:lumMod val="20000"/>
+              <a:lumOff val="80000"/>
+            </a:schemeClr>
+          </a:solidFill>
+          <a:ln>
+            <a:solidFill>
+              <a:schemeClr val="tx1"/>
+            </a:solidFill>
+          </a:ln>
+        </p:spPr>
+        <p:style>
+          <a:lnRef idx="2">
+            <a:schemeClr val="accent1">
+              <a:shade val="50000"/>
+            </a:schemeClr>
+          </a:lnRef>
+          <a:fillRef idx="1">
+            <a:schemeClr val="accent1"/>
+          </a:fillRef>
+          <a:effectRef idx="0">
+            <a:schemeClr val="accent1"/>
+          </a:effectRef>
+          <a:fontRef idx="minor">
+            <a:schemeClr val="lt1"/>
+          </a:fontRef>
+        </p:style>
+        <p:txBody>
+          <a:bodyPr rtlCol="0" anchor="ctr"/>
+          <a:lstStyle/>
+          <a:p>
+            <a:pPr algn="ctr"/>
+            <a:r>
+              <a:rPr lang="en-US" altLang="zh-CN" sz="1200" dirty="0">
+                <a:solidFill>
+                  <a:schemeClr val="tx1"/>
+                </a:solidFill>
+                <a:latin typeface="Times New Roman" panose="02020603050405020304" pitchFamily="18" charset="0"/>
+                <a:cs typeface="Times New Roman" panose="02020603050405020304" pitchFamily="18" charset="0"/>
+              </a:rPr>
+              <a:t>Send System</a:t>
+            </a:r>
+            <a:endParaRPr lang="zh-CN" altLang="en-US" sz="1200" dirty="0">
+              <a:solidFill>
+                <a:schemeClr val="tx1"/>
+              </a:solidFill>
+              <a:latin typeface="Times New Roman" panose="02020603050405020304" pitchFamily="18" charset="0"/>
+              <a:cs typeface="Times New Roman" panose="02020603050405020304" pitchFamily="18" charset="0"/>
+            </a:endParaRPr>
+          </a:p>
+        </p:txBody>
+      </p:sp>
+      <p:sp>
+        <p:nvSpPr>
+          <p:cNvPr id="23" name="矩形: 圆角 22">
+            <a:extLst>
+              <a:ext uri="{FF2B5EF4-FFF2-40B4-BE49-F238E27FC236}">
+                <a16:creationId xmlns:a16="http://schemas.microsoft.com/office/drawing/2014/main" id="{12221C85-1C3B-4564-8C7E-1ECB5B743800}"/>
+              </a:ext>
+            </a:extLst>
+          </p:cNvPr>
+          <p:cNvSpPr/>
+          <p:nvPr/>
+        </p:nvSpPr>
+        <p:spPr>
+          <a:xfrm>
+            <a:off x="9492063" y="1358133"/>
+            <a:ext cx="1080000" cy="360000"/>
+          </a:xfrm>
+          <a:prstGeom prst="roundRect">
+            <a:avLst/>
+          </a:prstGeom>
+          <a:solidFill>
+            <a:schemeClr val="accent6">
+              <a:lumMod val="20000"/>
+              <a:lumOff val="80000"/>
+            </a:schemeClr>
+          </a:solidFill>
+          <a:ln>
+            <a:solidFill>
+              <a:schemeClr val="tx1"/>
+            </a:solidFill>
+          </a:ln>
+        </p:spPr>
+        <p:style>
+          <a:lnRef idx="2">
+            <a:schemeClr val="accent1">
+              <a:shade val="50000"/>
+            </a:schemeClr>
+          </a:lnRef>
+          <a:fillRef idx="1">
+            <a:schemeClr val="accent1"/>
+          </a:fillRef>
+          <a:effectRef idx="0">
+            <a:schemeClr val="accent1"/>
+          </a:effectRef>
+          <a:fontRef idx="minor">
+            <a:schemeClr val="lt1"/>
+          </a:fontRef>
+        </p:style>
+        <p:txBody>
+          <a:bodyPr rtlCol="0" anchor="ctr"/>
+          <a:lstStyle/>
+          <a:p>
+            <a:pPr algn="ctr"/>
+            <a:r>
+              <a:rPr lang="en-US" altLang="zh-CN" sz="1200" dirty="0">
+                <a:solidFill>
+                  <a:schemeClr val="tx1"/>
+                </a:solidFill>
+                <a:latin typeface="Times New Roman" panose="02020603050405020304" pitchFamily="18" charset="0"/>
+                <a:cs typeface="Times New Roman" panose="02020603050405020304" pitchFamily="18" charset="0"/>
+              </a:rPr>
+              <a:t>Receive System</a:t>
+            </a:r>
+            <a:endParaRPr lang="zh-CN" altLang="en-US" sz="1200" dirty="0">
+              <a:solidFill>
+                <a:schemeClr val="tx1"/>
+              </a:solidFill>
+              <a:latin typeface="Times New Roman" panose="02020603050405020304" pitchFamily="18" charset="0"/>
+              <a:cs typeface="Times New Roman" panose="02020603050405020304" pitchFamily="18" charset="0"/>
+            </a:endParaRPr>
+          </a:p>
+        </p:txBody>
+      </p:sp>
+      <p:sp>
+        <p:nvSpPr>
+          <p:cNvPr id="24" name="矩形: 圆角 23">
+            <a:extLst>
+              <a:ext uri="{FF2B5EF4-FFF2-40B4-BE49-F238E27FC236}">
+                <a16:creationId xmlns:a16="http://schemas.microsoft.com/office/drawing/2014/main" id="{A4D91004-46AE-4A6C-ADC9-6EF408B14611}"/>
+              </a:ext>
+            </a:extLst>
+          </p:cNvPr>
+          <p:cNvSpPr/>
+          <p:nvPr/>
+        </p:nvSpPr>
+        <p:spPr>
+          <a:xfrm>
+            <a:off x="8232601" y="1358133"/>
+            <a:ext cx="1080000" cy="360000"/>
+          </a:xfrm>
+          <a:prstGeom prst="roundRect">
+            <a:avLst/>
+          </a:prstGeom>
+          <a:solidFill>
+            <a:schemeClr val="accent6">
+              <a:lumMod val="20000"/>
+              <a:lumOff val="80000"/>
+            </a:schemeClr>
+          </a:solidFill>
+          <a:ln>
+            <a:solidFill>
+              <a:schemeClr val="tx1"/>
+            </a:solidFill>
+          </a:ln>
+        </p:spPr>
+        <p:style>
+          <a:lnRef idx="2">
+            <a:schemeClr val="accent1">
+              <a:shade val="50000"/>
+            </a:schemeClr>
+          </a:lnRef>
+          <a:fillRef idx="1">
+            <a:schemeClr val="accent1"/>
+          </a:fillRef>
+          <a:effectRef idx="0">
+            <a:schemeClr val="accent1"/>
+          </a:effectRef>
+          <a:fontRef idx="minor">
+            <a:schemeClr val="lt1"/>
+          </a:fontRef>
+        </p:style>
+        <p:txBody>
+          <a:bodyPr rtlCol="0" anchor="ctr"/>
+          <a:lstStyle/>
+          <a:p>
+            <a:pPr algn="ctr"/>
+            <a:r>
+              <a:rPr lang="en-US" altLang="zh-CN" sz="1200" dirty="0">
+                <a:solidFill>
+                  <a:schemeClr val="tx1"/>
+                </a:solidFill>
+                <a:latin typeface="Times New Roman" panose="02020603050405020304" pitchFamily="18" charset="0"/>
+                <a:cs typeface="Times New Roman" panose="02020603050405020304" pitchFamily="18" charset="0"/>
+              </a:rPr>
+              <a:t>Transmission System</a:t>
+            </a:r>
+            <a:endParaRPr lang="zh-CN" altLang="en-US" sz="1200" dirty="0">
+              <a:solidFill>
+                <a:schemeClr val="tx1"/>
+              </a:solidFill>
+              <a:latin typeface="Times New Roman" panose="02020603050405020304" pitchFamily="18" charset="0"/>
+              <a:cs typeface="Times New Roman" panose="02020603050405020304" pitchFamily="18" charset="0"/>
+            </a:endParaRPr>
+          </a:p>
+        </p:txBody>
+      </p:sp>
+      <p:sp>
+        <p:nvSpPr>
           <p:cNvPr id="14" name="矩形: 圆角 13">
             <a:extLst>
               <a:ext uri="{FF2B5EF4-FFF2-40B4-BE49-F238E27FC236}">
-                <a16:creationId xmlns:a16="http://schemas.microsoft.com/office/drawing/2014/main" id="{A99E4D78-7CE0-45FB-B3BA-86BDE6001847}"/>
+                <a16:creationId xmlns:a16="http://schemas.microsoft.com/office/drawing/2014/main" id="{B0DEA722-6541-4D15-8B5C-4C59C9A58633}"/>
               </a:ext>
             </a:extLst>
           </p:cNvPr>
@@ -16118,12 +16487,1813 @@
         </p:nvSpPr>
         <p:spPr>
           <a:xfrm>
-            <a:off x="5117677" y="3382344"/>
-            <a:ext cx="6326293" cy="1860646"/>
+            <a:off x="10751526" y="1358133"/>
+            <a:ext cx="1080000" cy="360000"/>
+          </a:xfrm>
+          <a:prstGeom prst="roundRect">
+            <a:avLst/>
+          </a:prstGeom>
+          <a:solidFill>
+            <a:schemeClr val="accent6">
+              <a:lumMod val="20000"/>
+              <a:lumOff val="80000"/>
+            </a:schemeClr>
+          </a:solidFill>
+          <a:ln>
+            <a:solidFill>
+              <a:schemeClr val="tx1"/>
+            </a:solidFill>
+          </a:ln>
+        </p:spPr>
+        <p:style>
+          <a:lnRef idx="2">
+            <a:schemeClr val="accent1">
+              <a:shade val="50000"/>
+            </a:schemeClr>
+          </a:lnRef>
+          <a:fillRef idx="1">
+            <a:schemeClr val="accent1"/>
+          </a:fillRef>
+          <a:effectRef idx="0">
+            <a:schemeClr val="accent1"/>
+          </a:effectRef>
+          <a:fontRef idx="minor">
+            <a:schemeClr val="lt1"/>
+          </a:fontRef>
+        </p:style>
+        <p:txBody>
+          <a:bodyPr rtlCol="0" anchor="ctr"/>
+          <a:lstStyle/>
+          <a:p>
+            <a:pPr algn="ctr"/>
+            <a:r>
+              <a:rPr lang="en-US" altLang="zh-CN" sz="1200" dirty="0">
+                <a:solidFill>
+                  <a:schemeClr val="tx1"/>
+                </a:solidFill>
+                <a:latin typeface="Times New Roman" panose="02020603050405020304" pitchFamily="18" charset="0"/>
+                <a:cs typeface="Times New Roman" panose="02020603050405020304" pitchFamily="18" charset="0"/>
+              </a:rPr>
+              <a:t>Mobility System</a:t>
+            </a:r>
+            <a:endParaRPr lang="zh-CN" altLang="en-US" sz="1200" dirty="0">
+              <a:solidFill>
+                <a:schemeClr val="tx1"/>
+              </a:solidFill>
+              <a:latin typeface="Times New Roman" panose="02020603050405020304" pitchFamily="18" charset="0"/>
+              <a:cs typeface="Times New Roman" panose="02020603050405020304" pitchFamily="18" charset="0"/>
+            </a:endParaRPr>
+          </a:p>
+        </p:txBody>
+      </p:sp>
+      <p:cxnSp>
+        <p:nvCxnSpPr>
+          <p:cNvPr id="7" name="直接连接符 6">
+            <a:extLst>
+              <a:ext uri="{FF2B5EF4-FFF2-40B4-BE49-F238E27FC236}">
+                <a16:creationId xmlns:a16="http://schemas.microsoft.com/office/drawing/2014/main" id="{D3A3AB47-9318-44EA-B186-B528AF7F6241}"/>
+              </a:ext>
+            </a:extLst>
+          </p:cNvPr>
+          <p:cNvCxnSpPr>
+            <a:cxnSpLocks/>
+          </p:cNvCxnSpPr>
+          <p:nvPr/>
+        </p:nvCxnSpPr>
+        <p:spPr>
+          <a:xfrm>
+            <a:off x="4994215" y="1718132"/>
+            <a:ext cx="5118" cy="1797023"/>
+          </a:xfrm>
+          <a:prstGeom prst="line">
+            <a:avLst/>
+          </a:prstGeom>
+          <a:ln w="19050">
+            <a:solidFill>
+              <a:schemeClr val="tx1"/>
+            </a:solidFill>
+          </a:ln>
+        </p:spPr>
+        <p:style>
+          <a:lnRef idx="1">
+            <a:schemeClr val="accent1"/>
+          </a:lnRef>
+          <a:fillRef idx="0">
+            <a:schemeClr val="accent1"/>
+          </a:fillRef>
+          <a:effectRef idx="0">
+            <a:schemeClr val="accent1"/>
+          </a:effectRef>
+          <a:fontRef idx="minor">
+            <a:schemeClr val="tx1"/>
+          </a:fontRef>
+        </p:style>
+      </p:cxnSp>
+      <p:cxnSp>
+        <p:nvCxnSpPr>
+          <p:cNvPr id="18" name="直接连接符 17">
+            <a:extLst>
+              <a:ext uri="{FF2B5EF4-FFF2-40B4-BE49-F238E27FC236}">
+                <a16:creationId xmlns:a16="http://schemas.microsoft.com/office/drawing/2014/main" id="{C9CB6A81-E249-4EC0-8BE6-0DC2C6C2E2D3}"/>
+              </a:ext>
+            </a:extLst>
+          </p:cNvPr>
+          <p:cNvCxnSpPr>
+            <a:cxnSpLocks/>
+          </p:cNvCxnSpPr>
+          <p:nvPr/>
+        </p:nvCxnSpPr>
+        <p:spPr>
+          <a:xfrm>
+            <a:off x="6253677" y="1718132"/>
+            <a:ext cx="5118" cy="1797023"/>
+          </a:xfrm>
+          <a:prstGeom prst="line">
+            <a:avLst/>
+          </a:prstGeom>
+          <a:ln w="19050">
+            <a:solidFill>
+              <a:schemeClr val="tx1"/>
+            </a:solidFill>
+          </a:ln>
+        </p:spPr>
+        <p:style>
+          <a:lnRef idx="1">
+            <a:schemeClr val="accent1"/>
+          </a:lnRef>
+          <a:fillRef idx="0">
+            <a:schemeClr val="accent1"/>
+          </a:fillRef>
+          <a:effectRef idx="0">
+            <a:schemeClr val="accent1"/>
+          </a:effectRef>
+          <a:fontRef idx="minor">
+            <a:schemeClr val="tx1"/>
+          </a:fontRef>
+        </p:style>
+      </p:cxnSp>
+      <p:cxnSp>
+        <p:nvCxnSpPr>
+          <p:cNvPr id="19" name="直接连接符 18">
+            <a:extLst>
+              <a:ext uri="{FF2B5EF4-FFF2-40B4-BE49-F238E27FC236}">
+                <a16:creationId xmlns:a16="http://schemas.microsoft.com/office/drawing/2014/main" id="{7430234D-3AF4-484E-A376-C48884D8F59F}"/>
+              </a:ext>
+            </a:extLst>
+          </p:cNvPr>
+          <p:cNvCxnSpPr>
+            <a:cxnSpLocks/>
+          </p:cNvCxnSpPr>
+          <p:nvPr/>
+        </p:nvCxnSpPr>
+        <p:spPr>
+          <a:xfrm>
+            <a:off x="7513139" y="1718132"/>
+            <a:ext cx="5118" cy="1797023"/>
+          </a:xfrm>
+          <a:prstGeom prst="line">
+            <a:avLst/>
+          </a:prstGeom>
+          <a:ln w="19050">
+            <a:solidFill>
+              <a:schemeClr val="tx1"/>
+            </a:solidFill>
+          </a:ln>
+        </p:spPr>
+        <p:style>
+          <a:lnRef idx="1">
+            <a:schemeClr val="accent1"/>
+          </a:lnRef>
+          <a:fillRef idx="0">
+            <a:schemeClr val="accent1"/>
+          </a:fillRef>
+          <a:effectRef idx="0">
+            <a:schemeClr val="accent1"/>
+          </a:effectRef>
+          <a:fontRef idx="minor">
+            <a:schemeClr val="tx1"/>
+          </a:fontRef>
+        </p:style>
+      </p:cxnSp>
+      <p:cxnSp>
+        <p:nvCxnSpPr>
+          <p:cNvPr id="20" name="直接连接符 19">
+            <a:extLst>
+              <a:ext uri="{FF2B5EF4-FFF2-40B4-BE49-F238E27FC236}">
+                <a16:creationId xmlns:a16="http://schemas.microsoft.com/office/drawing/2014/main" id="{78BA444E-2C2E-46A1-B06C-1DD565AE84AD}"/>
+              </a:ext>
+            </a:extLst>
+          </p:cNvPr>
+          <p:cNvCxnSpPr>
+            <a:cxnSpLocks/>
+          </p:cNvCxnSpPr>
+          <p:nvPr/>
+        </p:nvCxnSpPr>
+        <p:spPr>
+          <a:xfrm>
+            <a:off x="8772601" y="1718132"/>
+            <a:ext cx="5118" cy="1797023"/>
+          </a:xfrm>
+          <a:prstGeom prst="line">
+            <a:avLst/>
+          </a:prstGeom>
+          <a:ln w="19050">
+            <a:solidFill>
+              <a:schemeClr val="tx1"/>
+            </a:solidFill>
+          </a:ln>
+        </p:spPr>
+        <p:style>
+          <a:lnRef idx="1">
+            <a:schemeClr val="accent1"/>
+          </a:lnRef>
+          <a:fillRef idx="0">
+            <a:schemeClr val="accent1"/>
+          </a:fillRef>
+          <a:effectRef idx="0">
+            <a:schemeClr val="accent1"/>
+          </a:effectRef>
+          <a:fontRef idx="minor">
+            <a:schemeClr val="tx1"/>
+          </a:fontRef>
+        </p:style>
+      </p:cxnSp>
+      <p:cxnSp>
+        <p:nvCxnSpPr>
+          <p:cNvPr id="25" name="直接连接符 24">
+            <a:extLst>
+              <a:ext uri="{FF2B5EF4-FFF2-40B4-BE49-F238E27FC236}">
+                <a16:creationId xmlns:a16="http://schemas.microsoft.com/office/drawing/2014/main" id="{5B0AC992-62C8-48C6-B3DE-7F9C0AB7335D}"/>
+              </a:ext>
+            </a:extLst>
+          </p:cNvPr>
+          <p:cNvCxnSpPr>
+            <a:cxnSpLocks/>
+          </p:cNvCxnSpPr>
+          <p:nvPr/>
+        </p:nvCxnSpPr>
+        <p:spPr>
+          <a:xfrm>
+            <a:off x="10032063" y="1718132"/>
+            <a:ext cx="5118" cy="1797023"/>
+          </a:xfrm>
+          <a:prstGeom prst="line">
+            <a:avLst/>
+          </a:prstGeom>
+          <a:ln w="19050">
+            <a:solidFill>
+              <a:schemeClr val="tx1"/>
+            </a:solidFill>
+          </a:ln>
+        </p:spPr>
+        <p:style>
+          <a:lnRef idx="1">
+            <a:schemeClr val="accent1"/>
+          </a:lnRef>
+          <a:fillRef idx="0">
+            <a:schemeClr val="accent1"/>
+          </a:fillRef>
+          <a:effectRef idx="0">
+            <a:schemeClr val="accent1"/>
+          </a:effectRef>
+          <a:fontRef idx="minor">
+            <a:schemeClr val="tx1"/>
+          </a:fontRef>
+        </p:style>
+      </p:cxnSp>
+      <p:cxnSp>
+        <p:nvCxnSpPr>
+          <p:cNvPr id="26" name="直接连接符 25">
+            <a:extLst>
+              <a:ext uri="{FF2B5EF4-FFF2-40B4-BE49-F238E27FC236}">
+                <a16:creationId xmlns:a16="http://schemas.microsoft.com/office/drawing/2014/main" id="{CDF625EE-950B-4DB5-851D-D735A970511B}"/>
+              </a:ext>
+            </a:extLst>
+          </p:cNvPr>
+          <p:cNvCxnSpPr>
+            <a:cxnSpLocks/>
+          </p:cNvCxnSpPr>
+          <p:nvPr/>
+        </p:nvCxnSpPr>
+        <p:spPr>
+          <a:xfrm>
+            <a:off x="11291526" y="1718132"/>
+            <a:ext cx="5118" cy="1797023"/>
+          </a:xfrm>
+          <a:prstGeom prst="line">
+            <a:avLst/>
+          </a:prstGeom>
+          <a:ln w="19050">
+            <a:solidFill>
+              <a:schemeClr val="tx1"/>
+            </a:solidFill>
+          </a:ln>
+        </p:spPr>
+        <p:style>
+          <a:lnRef idx="1">
+            <a:schemeClr val="accent1"/>
+          </a:lnRef>
+          <a:fillRef idx="0">
+            <a:schemeClr val="accent1"/>
+          </a:fillRef>
+          <a:effectRef idx="0">
+            <a:schemeClr val="accent1"/>
+          </a:effectRef>
+          <a:fontRef idx="minor">
+            <a:schemeClr val="tx1"/>
+          </a:fontRef>
+        </p:style>
+      </p:cxnSp>
+      <p:sp>
+        <p:nvSpPr>
+          <p:cNvPr id="9" name="矩形 8">
+            <a:extLst>
+              <a:ext uri="{FF2B5EF4-FFF2-40B4-BE49-F238E27FC236}">
+                <a16:creationId xmlns:a16="http://schemas.microsoft.com/office/drawing/2014/main" id="{E085502C-B287-4541-8289-6D9687FBBA77}"/>
+              </a:ext>
+            </a:extLst>
+          </p:cNvPr>
+          <p:cNvSpPr/>
+          <p:nvPr/>
+        </p:nvSpPr>
+        <p:spPr>
+          <a:xfrm>
+            <a:off x="4907433" y="1874750"/>
+            <a:ext cx="169643" cy="78114"/>
+          </a:xfrm>
+          <a:prstGeom prst="rect">
+            <a:avLst/>
+          </a:prstGeom>
+          <a:ln>
+            <a:solidFill>
+              <a:schemeClr val="tx1"/>
+            </a:solidFill>
+          </a:ln>
+        </p:spPr>
+        <p:style>
+          <a:lnRef idx="2">
+            <a:schemeClr val="accent1">
+              <a:shade val="50000"/>
+            </a:schemeClr>
+          </a:lnRef>
+          <a:fillRef idx="1">
+            <a:schemeClr val="accent1"/>
+          </a:fillRef>
+          <a:effectRef idx="0">
+            <a:schemeClr val="accent1"/>
+          </a:effectRef>
+          <a:fontRef idx="minor">
+            <a:schemeClr val="lt1"/>
+          </a:fontRef>
+        </p:style>
+        <p:txBody>
+          <a:bodyPr rtlCol="0" anchor="ctr"/>
+          <a:lstStyle/>
+          <a:p>
+            <a:pPr algn="ctr"/>
+            <a:endParaRPr lang="zh-CN" altLang="en-US"/>
+          </a:p>
+        </p:txBody>
+      </p:sp>
+      <p:sp>
+        <p:nvSpPr>
+          <p:cNvPr id="27" name="矩形 26">
+            <a:extLst>
+              <a:ext uri="{FF2B5EF4-FFF2-40B4-BE49-F238E27FC236}">
+                <a16:creationId xmlns:a16="http://schemas.microsoft.com/office/drawing/2014/main" id="{609695AA-E01D-435A-AFCA-F63D062048A6}"/>
+              </a:ext>
+            </a:extLst>
+          </p:cNvPr>
+          <p:cNvSpPr/>
+          <p:nvPr/>
+        </p:nvSpPr>
+        <p:spPr>
+          <a:xfrm>
+            <a:off x="4907433" y="1999580"/>
+            <a:ext cx="169643" cy="78114"/>
+          </a:xfrm>
+          <a:prstGeom prst="rect">
+            <a:avLst/>
+          </a:prstGeom>
+          <a:ln>
+            <a:solidFill>
+              <a:schemeClr val="tx1"/>
+            </a:solidFill>
+          </a:ln>
+        </p:spPr>
+        <p:style>
+          <a:lnRef idx="2">
+            <a:schemeClr val="accent1">
+              <a:shade val="50000"/>
+            </a:schemeClr>
+          </a:lnRef>
+          <a:fillRef idx="1">
+            <a:schemeClr val="accent1"/>
+          </a:fillRef>
+          <a:effectRef idx="0">
+            <a:schemeClr val="accent1"/>
+          </a:effectRef>
+          <a:fontRef idx="minor">
+            <a:schemeClr val="lt1"/>
+          </a:fontRef>
+        </p:style>
+        <p:txBody>
+          <a:bodyPr rtlCol="0" anchor="ctr"/>
+          <a:lstStyle/>
+          <a:p>
+            <a:pPr algn="ctr"/>
+            <a:endParaRPr lang="zh-CN" altLang="en-US"/>
+          </a:p>
+        </p:txBody>
+      </p:sp>
+      <p:sp>
+        <p:nvSpPr>
+          <p:cNvPr id="28" name="矩形 27">
+            <a:extLst>
+              <a:ext uri="{FF2B5EF4-FFF2-40B4-BE49-F238E27FC236}">
+                <a16:creationId xmlns:a16="http://schemas.microsoft.com/office/drawing/2014/main" id="{E543E235-5E81-4C5C-A47A-24A8DC6041DB}"/>
+              </a:ext>
+            </a:extLst>
+          </p:cNvPr>
+          <p:cNvSpPr/>
+          <p:nvPr/>
+        </p:nvSpPr>
+        <p:spPr>
+          <a:xfrm>
+            <a:off x="6167228" y="2100670"/>
+            <a:ext cx="169643" cy="78114"/>
+          </a:xfrm>
+          <a:prstGeom prst="rect">
+            <a:avLst/>
+          </a:prstGeom>
+          <a:ln>
+            <a:solidFill>
+              <a:schemeClr val="tx1"/>
+            </a:solidFill>
+          </a:ln>
+        </p:spPr>
+        <p:style>
+          <a:lnRef idx="2">
+            <a:schemeClr val="accent1">
+              <a:shade val="50000"/>
+            </a:schemeClr>
+          </a:lnRef>
+          <a:fillRef idx="1">
+            <a:schemeClr val="accent1"/>
+          </a:fillRef>
+          <a:effectRef idx="0">
+            <a:schemeClr val="accent1"/>
+          </a:effectRef>
+          <a:fontRef idx="minor">
+            <a:schemeClr val="lt1"/>
+          </a:fontRef>
+        </p:style>
+        <p:txBody>
+          <a:bodyPr rtlCol="0" anchor="ctr"/>
+          <a:lstStyle/>
+          <a:p>
+            <a:pPr algn="ctr"/>
+            <a:endParaRPr lang="zh-CN" altLang="en-US"/>
+          </a:p>
+        </p:txBody>
+      </p:sp>
+      <p:sp>
+        <p:nvSpPr>
+          <p:cNvPr id="29" name="矩形 28">
+            <a:extLst>
+              <a:ext uri="{FF2B5EF4-FFF2-40B4-BE49-F238E27FC236}">
+                <a16:creationId xmlns:a16="http://schemas.microsoft.com/office/drawing/2014/main" id="{BA6ADC1A-98B7-42A4-8570-B440F1563342}"/>
+              </a:ext>
+            </a:extLst>
+          </p:cNvPr>
+          <p:cNvSpPr/>
+          <p:nvPr/>
+        </p:nvSpPr>
+        <p:spPr>
+          <a:xfrm>
+            <a:off x="6167228" y="2225500"/>
+            <a:ext cx="169643" cy="78114"/>
+          </a:xfrm>
+          <a:prstGeom prst="rect">
+            <a:avLst/>
+          </a:prstGeom>
+          <a:ln>
+            <a:solidFill>
+              <a:schemeClr val="tx1"/>
+            </a:solidFill>
+          </a:ln>
+        </p:spPr>
+        <p:style>
+          <a:lnRef idx="2">
+            <a:schemeClr val="accent1">
+              <a:shade val="50000"/>
+            </a:schemeClr>
+          </a:lnRef>
+          <a:fillRef idx="1">
+            <a:schemeClr val="accent1"/>
+          </a:fillRef>
+          <a:effectRef idx="0">
+            <a:schemeClr val="accent1"/>
+          </a:effectRef>
+          <a:fontRef idx="minor">
+            <a:schemeClr val="lt1"/>
+          </a:fontRef>
+        </p:style>
+        <p:txBody>
+          <a:bodyPr rtlCol="0" anchor="ctr"/>
+          <a:lstStyle/>
+          <a:p>
+            <a:pPr algn="ctr"/>
+            <a:endParaRPr lang="zh-CN" altLang="en-US"/>
+          </a:p>
+        </p:txBody>
+      </p:sp>
+      <p:sp>
+        <p:nvSpPr>
+          <p:cNvPr id="30" name="矩形 29">
+            <a:extLst>
+              <a:ext uri="{FF2B5EF4-FFF2-40B4-BE49-F238E27FC236}">
+                <a16:creationId xmlns:a16="http://schemas.microsoft.com/office/drawing/2014/main" id="{924501B1-697F-409A-96C7-B83451B4C304}"/>
+              </a:ext>
+            </a:extLst>
+          </p:cNvPr>
+          <p:cNvSpPr/>
+          <p:nvPr/>
+        </p:nvSpPr>
+        <p:spPr>
+          <a:xfrm>
+            <a:off x="7430853" y="2390155"/>
+            <a:ext cx="169643" cy="78114"/>
+          </a:xfrm>
+          <a:prstGeom prst="rect">
+            <a:avLst/>
+          </a:prstGeom>
+          <a:ln>
+            <a:solidFill>
+              <a:schemeClr val="tx1"/>
+            </a:solidFill>
+          </a:ln>
+        </p:spPr>
+        <p:style>
+          <a:lnRef idx="2">
+            <a:schemeClr val="accent1">
+              <a:shade val="50000"/>
+            </a:schemeClr>
+          </a:lnRef>
+          <a:fillRef idx="1">
+            <a:schemeClr val="accent1"/>
+          </a:fillRef>
+          <a:effectRef idx="0">
+            <a:schemeClr val="accent1"/>
+          </a:effectRef>
+          <a:fontRef idx="minor">
+            <a:schemeClr val="lt1"/>
+          </a:fontRef>
+        </p:style>
+        <p:txBody>
+          <a:bodyPr rtlCol="0" anchor="ctr"/>
+          <a:lstStyle/>
+          <a:p>
+            <a:pPr algn="ctr"/>
+            <a:endParaRPr lang="zh-CN" altLang="en-US"/>
+          </a:p>
+        </p:txBody>
+      </p:sp>
+      <p:sp>
+        <p:nvSpPr>
+          <p:cNvPr id="31" name="矩形 30">
+            <a:extLst>
+              <a:ext uri="{FF2B5EF4-FFF2-40B4-BE49-F238E27FC236}">
+                <a16:creationId xmlns:a16="http://schemas.microsoft.com/office/drawing/2014/main" id="{2EE2FDF3-DAF5-41C5-833C-22C929D4AF64}"/>
+              </a:ext>
+            </a:extLst>
+          </p:cNvPr>
+          <p:cNvSpPr/>
+          <p:nvPr/>
+        </p:nvSpPr>
+        <p:spPr>
+          <a:xfrm>
+            <a:off x="7430853" y="2514985"/>
+            <a:ext cx="169643" cy="78114"/>
+          </a:xfrm>
+          <a:prstGeom prst="rect">
+            <a:avLst/>
+          </a:prstGeom>
+          <a:ln>
+            <a:solidFill>
+              <a:schemeClr val="tx1"/>
+            </a:solidFill>
+          </a:ln>
+        </p:spPr>
+        <p:style>
+          <a:lnRef idx="2">
+            <a:schemeClr val="accent1">
+              <a:shade val="50000"/>
+            </a:schemeClr>
+          </a:lnRef>
+          <a:fillRef idx="1">
+            <a:schemeClr val="accent1"/>
+          </a:fillRef>
+          <a:effectRef idx="0">
+            <a:schemeClr val="accent1"/>
+          </a:effectRef>
+          <a:fontRef idx="minor">
+            <a:schemeClr val="lt1"/>
+          </a:fontRef>
+        </p:style>
+        <p:txBody>
+          <a:bodyPr rtlCol="0" anchor="ctr"/>
+          <a:lstStyle/>
+          <a:p>
+            <a:pPr algn="ctr"/>
+            <a:endParaRPr lang="zh-CN" altLang="en-US"/>
+          </a:p>
+        </p:txBody>
+      </p:sp>
+      <p:sp>
+        <p:nvSpPr>
+          <p:cNvPr id="32" name="矩形 31">
+            <a:extLst>
+              <a:ext uri="{FF2B5EF4-FFF2-40B4-BE49-F238E27FC236}">
+                <a16:creationId xmlns:a16="http://schemas.microsoft.com/office/drawing/2014/main" id="{43B84A41-9976-43B9-A101-3B611F22B644}"/>
+              </a:ext>
+            </a:extLst>
+          </p:cNvPr>
+          <p:cNvSpPr/>
+          <p:nvPr/>
+        </p:nvSpPr>
+        <p:spPr>
+          <a:xfrm>
+            <a:off x="8680693" y="2693425"/>
+            <a:ext cx="169643" cy="78114"/>
+          </a:xfrm>
+          <a:prstGeom prst="rect">
+            <a:avLst/>
+          </a:prstGeom>
+          <a:ln>
+            <a:solidFill>
+              <a:schemeClr val="tx1"/>
+            </a:solidFill>
+          </a:ln>
+        </p:spPr>
+        <p:style>
+          <a:lnRef idx="2">
+            <a:schemeClr val="accent1">
+              <a:shade val="50000"/>
+            </a:schemeClr>
+          </a:lnRef>
+          <a:fillRef idx="1">
+            <a:schemeClr val="accent1"/>
+          </a:fillRef>
+          <a:effectRef idx="0">
+            <a:schemeClr val="accent1"/>
+          </a:effectRef>
+          <a:fontRef idx="minor">
+            <a:schemeClr val="lt1"/>
+          </a:fontRef>
+        </p:style>
+        <p:txBody>
+          <a:bodyPr rtlCol="0" anchor="ctr"/>
+          <a:lstStyle/>
+          <a:p>
+            <a:pPr algn="ctr"/>
+            <a:endParaRPr lang="zh-CN" altLang="en-US"/>
+          </a:p>
+        </p:txBody>
+      </p:sp>
+      <p:sp>
+        <p:nvSpPr>
+          <p:cNvPr id="33" name="矩形 32">
+            <a:extLst>
+              <a:ext uri="{FF2B5EF4-FFF2-40B4-BE49-F238E27FC236}">
+                <a16:creationId xmlns:a16="http://schemas.microsoft.com/office/drawing/2014/main" id="{ABB63E35-5EF5-488F-B767-E62EB5F28C55}"/>
+              </a:ext>
+            </a:extLst>
+          </p:cNvPr>
+          <p:cNvSpPr/>
+          <p:nvPr/>
+        </p:nvSpPr>
+        <p:spPr>
+          <a:xfrm>
+            <a:off x="8680693" y="2818255"/>
+            <a:ext cx="169643" cy="78114"/>
+          </a:xfrm>
+          <a:prstGeom prst="rect">
+            <a:avLst/>
+          </a:prstGeom>
+          <a:ln>
+            <a:solidFill>
+              <a:schemeClr val="tx1"/>
+            </a:solidFill>
+          </a:ln>
+        </p:spPr>
+        <p:style>
+          <a:lnRef idx="2">
+            <a:schemeClr val="accent1">
+              <a:shade val="50000"/>
+            </a:schemeClr>
+          </a:lnRef>
+          <a:fillRef idx="1">
+            <a:schemeClr val="accent1"/>
+          </a:fillRef>
+          <a:effectRef idx="0">
+            <a:schemeClr val="accent1"/>
+          </a:effectRef>
+          <a:fontRef idx="minor">
+            <a:schemeClr val="lt1"/>
+          </a:fontRef>
+        </p:style>
+        <p:txBody>
+          <a:bodyPr rtlCol="0" anchor="ctr"/>
+          <a:lstStyle/>
+          <a:p>
+            <a:pPr algn="ctr"/>
+            <a:endParaRPr lang="zh-CN" altLang="en-US"/>
+          </a:p>
+        </p:txBody>
+      </p:sp>
+      <p:sp>
+        <p:nvSpPr>
+          <p:cNvPr id="34" name="矩形 33">
+            <a:extLst>
+              <a:ext uri="{FF2B5EF4-FFF2-40B4-BE49-F238E27FC236}">
+                <a16:creationId xmlns:a16="http://schemas.microsoft.com/office/drawing/2014/main" id="{99E4EA39-3301-456C-9524-3575B421825D}"/>
+              </a:ext>
+            </a:extLst>
+          </p:cNvPr>
+          <p:cNvSpPr/>
+          <p:nvPr/>
+        </p:nvSpPr>
+        <p:spPr>
+          <a:xfrm>
+            <a:off x="9948913" y="2941555"/>
+            <a:ext cx="169643" cy="78114"/>
+          </a:xfrm>
+          <a:prstGeom prst="rect">
+            <a:avLst/>
+          </a:prstGeom>
+          <a:ln>
+            <a:solidFill>
+              <a:schemeClr val="tx1"/>
+            </a:solidFill>
+          </a:ln>
+        </p:spPr>
+        <p:style>
+          <a:lnRef idx="2">
+            <a:schemeClr val="accent1">
+              <a:shade val="50000"/>
+            </a:schemeClr>
+          </a:lnRef>
+          <a:fillRef idx="1">
+            <a:schemeClr val="accent1"/>
+          </a:fillRef>
+          <a:effectRef idx="0">
+            <a:schemeClr val="accent1"/>
+          </a:effectRef>
+          <a:fontRef idx="minor">
+            <a:schemeClr val="lt1"/>
+          </a:fontRef>
+        </p:style>
+        <p:txBody>
+          <a:bodyPr rtlCol="0" anchor="ctr"/>
+          <a:lstStyle/>
+          <a:p>
+            <a:pPr algn="ctr"/>
+            <a:endParaRPr lang="zh-CN" altLang="en-US"/>
+          </a:p>
+        </p:txBody>
+      </p:sp>
+      <p:sp>
+        <p:nvSpPr>
+          <p:cNvPr id="35" name="矩形 34">
+            <a:extLst>
+              <a:ext uri="{FF2B5EF4-FFF2-40B4-BE49-F238E27FC236}">
+                <a16:creationId xmlns:a16="http://schemas.microsoft.com/office/drawing/2014/main" id="{FDB3F7DF-1CA4-4E34-9327-14364F5EEE62}"/>
+              </a:ext>
+            </a:extLst>
+          </p:cNvPr>
+          <p:cNvSpPr/>
+          <p:nvPr/>
+        </p:nvSpPr>
+        <p:spPr>
+          <a:xfrm>
+            <a:off x="9948913" y="3066385"/>
+            <a:ext cx="169643" cy="78114"/>
+          </a:xfrm>
+          <a:prstGeom prst="rect">
+            <a:avLst/>
+          </a:prstGeom>
+          <a:ln>
+            <a:solidFill>
+              <a:schemeClr val="tx1"/>
+            </a:solidFill>
+          </a:ln>
+        </p:spPr>
+        <p:style>
+          <a:lnRef idx="2">
+            <a:schemeClr val="accent1">
+              <a:shade val="50000"/>
+            </a:schemeClr>
+          </a:lnRef>
+          <a:fillRef idx="1">
+            <a:schemeClr val="accent1"/>
+          </a:fillRef>
+          <a:effectRef idx="0">
+            <a:schemeClr val="accent1"/>
+          </a:effectRef>
+          <a:fontRef idx="minor">
+            <a:schemeClr val="lt1"/>
+          </a:fontRef>
+        </p:style>
+        <p:txBody>
+          <a:bodyPr rtlCol="0" anchor="ctr"/>
+          <a:lstStyle/>
+          <a:p>
+            <a:pPr algn="ctr"/>
+            <a:endParaRPr lang="zh-CN" altLang="en-US"/>
+          </a:p>
+        </p:txBody>
+      </p:sp>
+      <p:cxnSp>
+        <p:nvCxnSpPr>
+          <p:cNvPr id="11" name="直接箭头连接符 10">
+            <a:extLst>
+              <a:ext uri="{FF2B5EF4-FFF2-40B4-BE49-F238E27FC236}">
+                <a16:creationId xmlns:a16="http://schemas.microsoft.com/office/drawing/2014/main" id="{5780D0A7-F368-490F-9EB6-5CC0811BF70A}"/>
+              </a:ext>
+            </a:extLst>
+          </p:cNvPr>
+          <p:cNvCxnSpPr>
+            <a:stCxn id="9" idx="3"/>
+            <a:endCxn id="28" idx="1"/>
+          </p:cNvCxnSpPr>
+          <p:nvPr/>
+        </p:nvCxnSpPr>
+        <p:spPr>
+          <a:xfrm>
+            <a:off x="5077076" y="1913807"/>
+            <a:ext cx="1090152" cy="225920"/>
+          </a:xfrm>
+          <a:prstGeom prst="straightConnector1">
+            <a:avLst/>
+          </a:prstGeom>
+          <a:ln w="12700">
+            <a:solidFill>
+              <a:schemeClr val="tx1"/>
+            </a:solidFill>
+            <a:tailEnd type="arrow"/>
+          </a:ln>
+        </p:spPr>
+        <p:style>
+          <a:lnRef idx="1">
+            <a:schemeClr val="accent1"/>
+          </a:lnRef>
+          <a:fillRef idx="0">
+            <a:schemeClr val="accent1"/>
+          </a:fillRef>
+          <a:effectRef idx="0">
+            <a:schemeClr val="accent1"/>
+          </a:effectRef>
+          <a:fontRef idx="minor">
+            <a:schemeClr val="tx1"/>
+          </a:fontRef>
+        </p:style>
+      </p:cxnSp>
+      <p:cxnSp>
+        <p:nvCxnSpPr>
+          <p:cNvPr id="36" name="直接箭头连接符 35">
+            <a:extLst>
+              <a:ext uri="{FF2B5EF4-FFF2-40B4-BE49-F238E27FC236}">
+                <a16:creationId xmlns:a16="http://schemas.microsoft.com/office/drawing/2014/main" id="{0DEB0A17-DFE5-40E2-9BBA-1AE3E531E48C}"/>
+              </a:ext>
+            </a:extLst>
+          </p:cNvPr>
+          <p:cNvCxnSpPr/>
+          <p:nvPr/>
+        </p:nvCxnSpPr>
+        <p:spPr>
+          <a:xfrm>
+            <a:off x="5064056" y="2038637"/>
+            <a:ext cx="1090152" cy="225920"/>
+          </a:xfrm>
+          <a:prstGeom prst="straightConnector1">
+            <a:avLst/>
+          </a:prstGeom>
+          <a:ln w="12700">
+            <a:solidFill>
+              <a:schemeClr val="tx1"/>
+            </a:solidFill>
+            <a:tailEnd type="arrow"/>
+          </a:ln>
+        </p:spPr>
+        <p:style>
+          <a:lnRef idx="1">
+            <a:schemeClr val="accent1"/>
+          </a:lnRef>
+          <a:fillRef idx="0">
+            <a:schemeClr val="accent1"/>
+          </a:fillRef>
+          <a:effectRef idx="0">
+            <a:schemeClr val="accent1"/>
+          </a:effectRef>
+          <a:fontRef idx="minor">
+            <a:schemeClr val="tx1"/>
+          </a:fontRef>
+        </p:style>
+      </p:cxnSp>
+      <p:cxnSp>
+        <p:nvCxnSpPr>
+          <p:cNvPr id="37" name="直接箭头连接符 36">
+            <a:extLst>
+              <a:ext uri="{FF2B5EF4-FFF2-40B4-BE49-F238E27FC236}">
+                <a16:creationId xmlns:a16="http://schemas.microsoft.com/office/drawing/2014/main" id="{5F6C543B-0CF9-4180-A95E-82223C8B4247}"/>
+              </a:ext>
+            </a:extLst>
+          </p:cNvPr>
+          <p:cNvCxnSpPr>
+            <a:cxnSpLocks/>
+            <a:stCxn id="28" idx="3"/>
+            <a:endCxn id="30" idx="1"/>
+          </p:cNvCxnSpPr>
+          <p:nvPr/>
+        </p:nvCxnSpPr>
+        <p:spPr>
+          <a:xfrm>
+            <a:off x="6336871" y="2139727"/>
+            <a:ext cx="1093982" cy="289485"/>
+          </a:xfrm>
+          <a:prstGeom prst="straightConnector1">
+            <a:avLst/>
+          </a:prstGeom>
+          <a:ln w="12700">
+            <a:solidFill>
+              <a:schemeClr val="tx1"/>
+            </a:solidFill>
+            <a:tailEnd type="arrow"/>
+          </a:ln>
+        </p:spPr>
+        <p:style>
+          <a:lnRef idx="1">
+            <a:schemeClr val="accent1"/>
+          </a:lnRef>
+          <a:fillRef idx="0">
+            <a:schemeClr val="accent1"/>
+          </a:fillRef>
+          <a:effectRef idx="0">
+            <a:schemeClr val="accent1"/>
+          </a:effectRef>
+          <a:fontRef idx="minor">
+            <a:schemeClr val="tx1"/>
+          </a:fontRef>
+        </p:style>
+      </p:cxnSp>
+      <p:cxnSp>
+        <p:nvCxnSpPr>
+          <p:cNvPr id="38" name="直接箭头连接符 37">
+            <a:extLst>
+              <a:ext uri="{FF2B5EF4-FFF2-40B4-BE49-F238E27FC236}">
+                <a16:creationId xmlns:a16="http://schemas.microsoft.com/office/drawing/2014/main" id="{231FA4A7-CADC-4AFD-AEE5-310E0509BAF9}"/>
+              </a:ext>
+            </a:extLst>
+          </p:cNvPr>
+          <p:cNvCxnSpPr>
+            <a:cxnSpLocks/>
+            <a:endCxn id="31" idx="1"/>
+          </p:cNvCxnSpPr>
+          <p:nvPr/>
+        </p:nvCxnSpPr>
+        <p:spPr>
+          <a:xfrm>
+            <a:off x="6336871" y="2264557"/>
+            <a:ext cx="1093982" cy="289485"/>
+          </a:xfrm>
+          <a:prstGeom prst="straightConnector1">
+            <a:avLst/>
+          </a:prstGeom>
+          <a:ln w="12700">
+            <a:solidFill>
+              <a:schemeClr val="tx1"/>
+            </a:solidFill>
+            <a:tailEnd type="arrow"/>
+          </a:ln>
+        </p:spPr>
+        <p:style>
+          <a:lnRef idx="1">
+            <a:schemeClr val="accent1"/>
+          </a:lnRef>
+          <a:fillRef idx="0">
+            <a:schemeClr val="accent1"/>
+          </a:fillRef>
+          <a:effectRef idx="0">
+            <a:schemeClr val="accent1"/>
+          </a:effectRef>
+          <a:fontRef idx="minor">
+            <a:schemeClr val="tx1"/>
+          </a:fontRef>
+        </p:style>
+      </p:cxnSp>
+      <p:cxnSp>
+        <p:nvCxnSpPr>
+          <p:cNvPr id="41" name="直接箭头连接符 40">
+            <a:extLst>
+              <a:ext uri="{FF2B5EF4-FFF2-40B4-BE49-F238E27FC236}">
+                <a16:creationId xmlns:a16="http://schemas.microsoft.com/office/drawing/2014/main" id="{2E376186-8B3B-4D09-BF6D-D4D883706C64}"/>
+              </a:ext>
+            </a:extLst>
+          </p:cNvPr>
+          <p:cNvCxnSpPr>
+            <a:cxnSpLocks/>
+            <a:stCxn id="30" idx="3"/>
+            <a:endCxn id="32" idx="1"/>
+          </p:cNvCxnSpPr>
+          <p:nvPr/>
+        </p:nvCxnSpPr>
+        <p:spPr>
+          <a:xfrm>
+            <a:off x="7600496" y="2429212"/>
+            <a:ext cx="1080197" cy="303270"/>
+          </a:xfrm>
+          <a:prstGeom prst="straightConnector1">
+            <a:avLst/>
+          </a:prstGeom>
+          <a:ln w="12700">
+            <a:solidFill>
+              <a:schemeClr val="tx1"/>
+            </a:solidFill>
+            <a:tailEnd type="arrow"/>
+          </a:ln>
+        </p:spPr>
+        <p:style>
+          <a:lnRef idx="1">
+            <a:schemeClr val="accent1"/>
+          </a:lnRef>
+          <a:fillRef idx="0">
+            <a:schemeClr val="accent1"/>
+          </a:fillRef>
+          <a:effectRef idx="0">
+            <a:schemeClr val="accent1"/>
+          </a:effectRef>
+          <a:fontRef idx="minor">
+            <a:schemeClr val="tx1"/>
+          </a:fontRef>
+        </p:style>
+      </p:cxnSp>
+      <p:cxnSp>
+        <p:nvCxnSpPr>
+          <p:cNvPr id="44" name="直接箭头连接符 43">
+            <a:extLst>
+              <a:ext uri="{FF2B5EF4-FFF2-40B4-BE49-F238E27FC236}">
+                <a16:creationId xmlns:a16="http://schemas.microsoft.com/office/drawing/2014/main" id="{334FB75C-B9C4-4ACC-84AA-F95880637EE0}"/>
+              </a:ext>
+            </a:extLst>
+          </p:cNvPr>
+          <p:cNvCxnSpPr>
+            <a:cxnSpLocks/>
+            <a:stCxn id="31" idx="3"/>
+            <a:endCxn id="33" idx="1"/>
+          </p:cNvCxnSpPr>
+          <p:nvPr/>
+        </p:nvCxnSpPr>
+        <p:spPr>
+          <a:xfrm>
+            <a:off x="7600496" y="2554042"/>
+            <a:ext cx="1080197" cy="303270"/>
+          </a:xfrm>
+          <a:prstGeom prst="straightConnector1">
+            <a:avLst/>
+          </a:prstGeom>
+          <a:ln w="12700">
+            <a:solidFill>
+              <a:schemeClr val="tx1"/>
+            </a:solidFill>
+            <a:tailEnd type="arrow"/>
+          </a:ln>
+        </p:spPr>
+        <p:style>
+          <a:lnRef idx="1">
+            <a:schemeClr val="accent1"/>
+          </a:lnRef>
+          <a:fillRef idx="0">
+            <a:schemeClr val="accent1"/>
+          </a:fillRef>
+          <a:effectRef idx="0">
+            <a:schemeClr val="accent1"/>
+          </a:effectRef>
+          <a:fontRef idx="minor">
+            <a:schemeClr val="tx1"/>
+          </a:fontRef>
+        </p:style>
+      </p:cxnSp>
+      <p:cxnSp>
+        <p:nvCxnSpPr>
+          <p:cNvPr id="47" name="直接箭头连接符 46">
+            <a:extLst>
+              <a:ext uri="{FF2B5EF4-FFF2-40B4-BE49-F238E27FC236}">
+                <a16:creationId xmlns:a16="http://schemas.microsoft.com/office/drawing/2014/main" id="{06F4DEA3-5135-44AB-A97A-4316D2BC7379}"/>
+              </a:ext>
+            </a:extLst>
+          </p:cNvPr>
+          <p:cNvCxnSpPr>
+            <a:cxnSpLocks/>
+            <a:stCxn id="32" idx="3"/>
+            <a:endCxn id="34" idx="1"/>
+          </p:cNvCxnSpPr>
+          <p:nvPr/>
+        </p:nvCxnSpPr>
+        <p:spPr>
+          <a:xfrm>
+            <a:off x="8850336" y="2732482"/>
+            <a:ext cx="1098577" cy="248130"/>
+          </a:xfrm>
+          <a:prstGeom prst="straightConnector1">
+            <a:avLst/>
+          </a:prstGeom>
+          <a:ln w="12700">
+            <a:solidFill>
+              <a:schemeClr val="tx1"/>
+            </a:solidFill>
+            <a:tailEnd type="arrow"/>
+          </a:ln>
+        </p:spPr>
+        <p:style>
+          <a:lnRef idx="1">
+            <a:schemeClr val="accent1"/>
+          </a:lnRef>
+          <a:fillRef idx="0">
+            <a:schemeClr val="accent1"/>
+          </a:fillRef>
+          <a:effectRef idx="0">
+            <a:schemeClr val="accent1"/>
+          </a:effectRef>
+          <a:fontRef idx="minor">
+            <a:schemeClr val="tx1"/>
+          </a:fontRef>
+        </p:style>
+      </p:cxnSp>
+      <p:cxnSp>
+        <p:nvCxnSpPr>
+          <p:cNvPr id="50" name="直接箭头连接符 49">
+            <a:extLst>
+              <a:ext uri="{FF2B5EF4-FFF2-40B4-BE49-F238E27FC236}">
+                <a16:creationId xmlns:a16="http://schemas.microsoft.com/office/drawing/2014/main" id="{BCEE22F1-653F-4794-8F9E-925931B23ACC}"/>
+              </a:ext>
+            </a:extLst>
+          </p:cNvPr>
+          <p:cNvCxnSpPr>
+            <a:cxnSpLocks/>
+            <a:stCxn id="33" idx="3"/>
+            <a:endCxn id="35" idx="1"/>
+          </p:cNvCxnSpPr>
+          <p:nvPr/>
+        </p:nvCxnSpPr>
+        <p:spPr>
+          <a:xfrm>
+            <a:off x="8850336" y="2857312"/>
+            <a:ext cx="1098577" cy="248130"/>
+          </a:xfrm>
+          <a:prstGeom prst="straightConnector1">
+            <a:avLst/>
+          </a:prstGeom>
+          <a:ln w="12700">
+            <a:solidFill>
+              <a:schemeClr val="tx1"/>
+            </a:solidFill>
+            <a:tailEnd type="arrow"/>
+          </a:ln>
+        </p:spPr>
+        <p:style>
+          <a:lnRef idx="1">
+            <a:schemeClr val="accent1"/>
+          </a:lnRef>
+          <a:fillRef idx="0">
+            <a:schemeClr val="accent1"/>
+          </a:fillRef>
+          <a:effectRef idx="0">
+            <a:schemeClr val="accent1"/>
+          </a:effectRef>
+          <a:fontRef idx="minor">
+            <a:schemeClr val="tx1"/>
+          </a:fontRef>
+        </p:style>
+      </p:cxnSp>
+      <p:sp>
+        <p:nvSpPr>
+          <p:cNvPr id="53" name="矩形 52">
+            <a:extLst>
+              <a:ext uri="{FF2B5EF4-FFF2-40B4-BE49-F238E27FC236}">
+                <a16:creationId xmlns:a16="http://schemas.microsoft.com/office/drawing/2014/main" id="{00B4D5ED-FDF2-440C-B1ED-B36A5C5AFC07}"/>
+              </a:ext>
+            </a:extLst>
+          </p:cNvPr>
+          <p:cNvSpPr/>
+          <p:nvPr/>
+        </p:nvSpPr>
+        <p:spPr>
+          <a:xfrm>
+            <a:off x="4912028" y="3139485"/>
+            <a:ext cx="169643" cy="78114"/>
+          </a:xfrm>
+          <a:prstGeom prst="rect">
+            <a:avLst/>
+          </a:prstGeom>
+          <a:ln>
+            <a:solidFill>
+              <a:schemeClr val="tx1"/>
+            </a:solidFill>
+          </a:ln>
+        </p:spPr>
+        <p:style>
+          <a:lnRef idx="2">
+            <a:schemeClr val="accent1">
+              <a:shade val="50000"/>
+            </a:schemeClr>
+          </a:lnRef>
+          <a:fillRef idx="1">
+            <a:schemeClr val="accent1"/>
+          </a:fillRef>
+          <a:effectRef idx="0">
+            <a:schemeClr val="accent1"/>
+          </a:effectRef>
+          <a:fontRef idx="minor">
+            <a:schemeClr val="lt1"/>
+          </a:fontRef>
+        </p:style>
+        <p:txBody>
+          <a:bodyPr rtlCol="0" anchor="ctr"/>
+          <a:lstStyle/>
+          <a:p>
+            <a:pPr algn="ctr"/>
+            <a:endParaRPr lang="zh-CN" altLang="en-US"/>
+          </a:p>
+        </p:txBody>
+      </p:sp>
+      <p:sp>
+        <p:nvSpPr>
+          <p:cNvPr id="54" name="矩形 53">
+            <a:extLst>
+              <a:ext uri="{FF2B5EF4-FFF2-40B4-BE49-F238E27FC236}">
+                <a16:creationId xmlns:a16="http://schemas.microsoft.com/office/drawing/2014/main" id="{15093742-95E8-40D6-BE18-D8341A97BE90}"/>
+              </a:ext>
+            </a:extLst>
+          </p:cNvPr>
+          <p:cNvSpPr/>
+          <p:nvPr/>
+        </p:nvSpPr>
+        <p:spPr>
+          <a:xfrm>
+            <a:off x="6171823" y="3199640"/>
+            <a:ext cx="169643" cy="78114"/>
+          </a:xfrm>
+          <a:prstGeom prst="rect">
+            <a:avLst/>
+          </a:prstGeom>
+          <a:ln>
+            <a:solidFill>
+              <a:schemeClr val="tx1"/>
+            </a:solidFill>
+          </a:ln>
+        </p:spPr>
+        <p:style>
+          <a:lnRef idx="2">
+            <a:schemeClr val="accent1">
+              <a:shade val="50000"/>
+            </a:schemeClr>
+          </a:lnRef>
+          <a:fillRef idx="1">
+            <a:schemeClr val="accent1"/>
+          </a:fillRef>
+          <a:effectRef idx="0">
+            <a:schemeClr val="accent1"/>
+          </a:effectRef>
+          <a:fontRef idx="minor">
+            <a:schemeClr val="lt1"/>
+          </a:fontRef>
+        </p:style>
+        <p:txBody>
+          <a:bodyPr rtlCol="0" anchor="ctr"/>
+          <a:lstStyle/>
+          <a:p>
+            <a:pPr algn="ctr"/>
+            <a:endParaRPr lang="zh-CN" altLang="en-US"/>
+          </a:p>
+        </p:txBody>
+      </p:sp>
+      <p:cxnSp>
+        <p:nvCxnSpPr>
+          <p:cNvPr id="55" name="直接箭头连接符 54">
+            <a:extLst>
+              <a:ext uri="{FF2B5EF4-FFF2-40B4-BE49-F238E27FC236}">
+                <a16:creationId xmlns:a16="http://schemas.microsoft.com/office/drawing/2014/main" id="{FEC16A35-40C2-4A06-9BD0-CF8DBFB8718C}"/>
+              </a:ext>
+            </a:extLst>
+          </p:cNvPr>
+          <p:cNvCxnSpPr>
+            <a:cxnSpLocks/>
+            <a:stCxn id="35" idx="1"/>
+          </p:cNvCxnSpPr>
+          <p:nvPr/>
+        </p:nvCxnSpPr>
+        <p:spPr>
+          <a:xfrm flipH="1">
+            <a:off x="5098802" y="3105442"/>
+            <a:ext cx="4850111" cy="73100"/>
+          </a:xfrm>
+          <a:prstGeom prst="straightConnector1">
+            <a:avLst/>
+          </a:prstGeom>
+          <a:ln w="12700">
+            <a:solidFill>
+              <a:schemeClr val="tx1"/>
+            </a:solidFill>
+            <a:tailEnd type="arrow"/>
+          </a:ln>
+        </p:spPr>
+        <p:style>
+          <a:lnRef idx="1">
+            <a:schemeClr val="accent1"/>
+          </a:lnRef>
+          <a:fillRef idx="0">
+            <a:schemeClr val="accent1"/>
+          </a:fillRef>
+          <a:effectRef idx="0">
+            <a:schemeClr val="accent1"/>
+          </a:effectRef>
+          <a:fontRef idx="minor">
+            <a:schemeClr val="tx1"/>
+          </a:fontRef>
+        </p:style>
+      </p:cxnSp>
+      <p:cxnSp>
+        <p:nvCxnSpPr>
+          <p:cNvPr id="58" name="直接箭头连接符 57">
+            <a:extLst>
+              <a:ext uri="{FF2B5EF4-FFF2-40B4-BE49-F238E27FC236}">
+                <a16:creationId xmlns:a16="http://schemas.microsoft.com/office/drawing/2014/main" id="{8CF173F0-6CD2-4695-9398-6F4D94F41D73}"/>
+              </a:ext>
+            </a:extLst>
+          </p:cNvPr>
+          <p:cNvCxnSpPr>
+            <a:cxnSpLocks/>
+            <a:stCxn id="53" idx="3"/>
+            <a:endCxn id="54" idx="1"/>
+          </p:cNvCxnSpPr>
+          <p:nvPr/>
+        </p:nvCxnSpPr>
+        <p:spPr>
+          <a:xfrm>
+            <a:off x="5081671" y="3178542"/>
+            <a:ext cx="1090152" cy="60155"/>
+          </a:xfrm>
+          <a:prstGeom prst="straightConnector1">
+            <a:avLst/>
+          </a:prstGeom>
+          <a:ln w="12700">
+            <a:solidFill>
+              <a:schemeClr val="tx1"/>
+            </a:solidFill>
+            <a:tailEnd type="arrow"/>
+          </a:ln>
+        </p:spPr>
+        <p:style>
+          <a:lnRef idx="1">
+            <a:schemeClr val="accent1"/>
+          </a:lnRef>
+          <a:fillRef idx="0">
+            <a:schemeClr val="accent1"/>
+          </a:fillRef>
+          <a:effectRef idx="0">
+            <a:schemeClr val="accent1"/>
+          </a:effectRef>
+          <a:fontRef idx="minor">
+            <a:schemeClr val="tx1"/>
+          </a:fontRef>
+        </p:style>
+      </p:cxnSp>
+      <p:sp>
+        <p:nvSpPr>
+          <p:cNvPr id="61" name="矩形 60">
+            <a:extLst>
+              <a:ext uri="{FF2B5EF4-FFF2-40B4-BE49-F238E27FC236}">
+                <a16:creationId xmlns:a16="http://schemas.microsoft.com/office/drawing/2014/main" id="{8CA08E89-AED8-41F8-8E1A-52D75E0DA2C7}"/>
+              </a:ext>
+            </a:extLst>
+          </p:cNvPr>
+          <p:cNvSpPr/>
+          <p:nvPr/>
+        </p:nvSpPr>
+        <p:spPr>
+          <a:xfrm>
+            <a:off x="11218152" y="1871274"/>
+            <a:ext cx="169643" cy="78114"/>
+          </a:xfrm>
+          <a:prstGeom prst="rect">
+            <a:avLst/>
+          </a:prstGeom>
+          <a:ln>
+            <a:solidFill>
+              <a:schemeClr val="tx1"/>
+            </a:solidFill>
+          </a:ln>
+        </p:spPr>
+        <p:style>
+          <a:lnRef idx="2">
+            <a:schemeClr val="accent1">
+              <a:shade val="50000"/>
+            </a:schemeClr>
+          </a:lnRef>
+          <a:fillRef idx="1">
+            <a:schemeClr val="accent1"/>
+          </a:fillRef>
+          <a:effectRef idx="0">
+            <a:schemeClr val="accent1"/>
+          </a:effectRef>
+          <a:fontRef idx="minor">
+            <a:schemeClr val="lt1"/>
+          </a:fontRef>
+        </p:style>
+        <p:txBody>
+          <a:bodyPr rtlCol="0" anchor="ctr"/>
+          <a:lstStyle/>
+          <a:p>
+            <a:pPr algn="ctr"/>
+            <a:endParaRPr lang="zh-CN" altLang="en-US"/>
+          </a:p>
+        </p:txBody>
+      </p:sp>
+      <p:sp>
+        <p:nvSpPr>
+          <p:cNvPr id="62" name="矩形 61">
+            <a:extLst>
+              <a:ext uri="{FF2B5EF4-FFF2-40B4-BE49-F238E27FC236}">
+                <a16:creationId xmlns:a16="http://schemas.microsoft.com/office/drawing/2014/main" id="{55E2E110-9BE0-4B26-87CD-D54A2F781DDB}"/>
+              </a:ext>
+            </a:extLst>
+          </p:cNvPr>
+          <p:cNvSpPr/>
+          <p:nvPr/>
+        </p:nvSpPr>
+        <p:spPr>
+          <a:xfrm>
+            <a:off x="11218152" y="2104712"/>
+            <a:ext cx="169643" cy="78114"/>
+          </a:xfrm>
+          <a:prstGeom prst="rect">
+            <a:avLst/>
+          </a:prstGeom>
+          <a:ln>
+            <a:solidFill>
+              <a:schemeClr val="tx1"/>
+            </a:solidFill>
+          </a:ln>
+        </p:spPr>
+        <p:style>
+          <a:lnRef idx="2">
+            <a:schemeClr val="accent1">
+              <a:shade val="50000"/>
+            </a:schemeClr>
+          </a:lnRef>
+          <a:fillRef idx="1">
+            <a:schemeClr val="accent1"/>
+          </a:fillRef>
+          <a:effectRef idx="0">
+            <a:schemeClr val="accent1"/>
+          </a:effectRef>
+          <a:fontRef idx="minor">
+            <a:schemeClr val="lt1"/>
+          </a:fontRef>
+        </p:style>
+        <p:txBody>
+          <a:bodyPr rtlCol="0" anchor="ctr"/>
+          <a:lstStyle/>
+          <a:p>
+            <a:pPr algn="ctr"/>
+            <a:endParaRPr lang="zh-CN" altLang="en-US"/>
+          </a:p>
+        </p:txBody>
+      </p:sp>
+      <p:sp>
+        <p:nvSpPr>
+          <p:cNvPr id="63" name="矩形 62">
+            <a:extLst>
+              <a:ext uri="{FF2B5EF4-FFF2-40B4-BE49-F238E27FC236}">
+                <a16:creationId xmlns:a16="http://schemas.microsoft.com/office/drawing/2014/main" id="{55966FD4-5ED8-4944-9C72-66118E76A29C}"/>
+              </a:ext>
+            </a:extLst>
+          </p:cNvPr>
+          <p:cNvSpPr/>
+          <p:nvPr/>
+        </p:nvSpPr>
+        <p:spPr>
+          <a:xfrm>
+            <a:off x="11218152" y="2805026"/>
+            <a:ext cx="169643" cy="78114"/>
+          </a:xfrm>
+          <a:prstGeom prst="rect">
+            <a:avLst/>
+          </a:prstGeom>
+          <a:ln>
+            <a:solidFill>
+              <a:schemeClr val="tx1"/>
+            </a:solidFill>
+          </a:ln>
+        </p:spPr>
+        <p:style>
+          <a:lnRef idx="2">
+            <a:schemeClr val="accent1">
+              <a:shade val="50000"/>
+            </a:schemeClr>
+          </a:lnRef>
+          <a:fillRef idx="1">
+            <a:schemeClr val="accent1"/>
+          </a:fillRef>
+          <a:effectRef idx="0">
+            <a:schemeClr val="accent1"/>
+          </a:effectRef>
+          <a:fontRef idx="minor">
+            <a:schemeClr val="lt1"/>
+          </a:fontRef>
+        </p:style>
+        <p:txBody>
+          <a:bodyPr rtlCol="0" anchor="ctr"/>
+          <a:lstStyle/>
+          <a:p>
+            <a:pPr algn="ctr"/>
+            <a:endParaRPr lang="zh-CN" altLang="en-US"/>
+          </a:p>
+        </p:txBody>
+      </p:sp>
+      <p:sp>
+        <p:nvSpPr>
+          <p:cNvPr id="64" name="矩形 63">
+            <a:extLst>
+              <a:ext uri="{FF2B5EF4-FFF2-40B4-BE49-F238E27FC236}">
+                <a16:creationId xmlns:a16="http://schemas.microsoft.com/office/drawing/2014/main" id="{E9A93B61-B5D5-4275-9EC2-1546EF1129FA}"/>
+              </a:ext>
+            </a:extLst>
+          </p:cNvPr>
+          <p:cNvSpPr/>
+          <p:nvPr/>
+        </p:nvSpPr>
+        <p:spPr>
+          <a:xfrm>
+            <a:off x="11218152" y="2338150"/>
+            <a:ext cx="169643" cy="78114"/>
+          </a:xfrm>
+          <a:prstGeom prst="rect">
+            <a:avLst/>
+          </a:prstGeom>
+          <a:ln>
+            <a:solidFill>
+              <a:schemeClr val="tx1"/>
+            </a:solidFill>
+          </a:ln>
+        </p:spPr>
+        <p:style>
+          <a:lnRef idx="2">
+            <a:schemeClr val="accent1">
+              <a:shade val="50000"/>
+            </a:schemeClr>
+          </a:lnRef>
+          <a:fillRef idx="1">
+            <a:schemeClr val="accent1"/>
+          </a:fillRef>
+          <a:effectRef idx="0">
+            <a:schemeClr val="accent1"/>
+          </a:effectRef>
+          <a:fontRef idx="minor">
+            <a:schemeClr val="lt1"/>
+          </a:fontRef>
+        </p:style>
+        <p:txBody>
+          <a:bodyPr rtlCol="0" anchor="ctr"/>
+          <a:lstStyle/>
+          <a:p>
+            <a:pPr algn="ctr"/>
+            <a:endParaRPr lang="zh-CN" altLang="en-US"/>
+          </a:p>
+        </p:txBody>
+      </p:sp>
+      <p:sp>
+        <p:nvSpPr>
+          <p:cNvPr id="65" name="矩形 64">
+            <a:extLst>
+              <a:ext uri="{FF2B5EF4-FFF2-40B4-BE49-F238E27FC236}">
+                <a16:creationId xmlns:a16="http://schemas.microsoft.com/office/drawing/2014/main" id="{9BB95E1D-E6A7-4028-8B78-ACDF9A0E0B50}"/>
+              </a:ext>
+            </a:extLst>
+          </p:cNvPr>
+          <p:cNvSpPr/>
+          <p:nvPr/>
+        </p:nvSpPr>
+        <p:spPr>
+          <a:xfrm>
+            <a:off x="11218152" y="2571588"/>
+            <a:ext cx="169643" cy="78114"/>
+          </a:xfrm>
+          <a:prstGeom prst="rect">
+            <a:avLst/>
+          </a:prstGeom>
+          <a:ln>
+            <a:solidFill>
+              <a:schemeClr val="tx1"/>
+            </a:solidFill>
+          </a:ln>
+        </p:spPr>
+        <p:style>
+          <a:lnRef idx="2">
+            <a:schemeClr val="accent1">
+              <a:shade val="50000"/>
+            </a:schemeClr>
+          </a:lnRef>
+          <a:fillRef idx="1">
+            <a:schemeClr val="accent1"/>
+          </a:fillRef>
+          <a:effectRef idx="0">
+            <a:schemeClr val="accent1"/>
+          </a:effectRef>
+          <a:fontRef idx="minor">
+            <a:schemeClr val="lt1"/>
+          </a:fontRef>
+        </p:style>
+        <p:txBody>
+          <a:bodyPr rtlCol="0" anchor="ctr"/>
+          <a:lstStyle/>
+          <a:p>
+            <a:pPr algn="ctr"/>
+            <a:endParaRPr lang="zh-CN" altLang="en-US"/>
+          </a:p>
+        </p:txBody>
+      </p:sp>
+      <p:sp>
+        <p:nvSpPr>
+          <p:cNvPr id="66" name="矩形 65">
+            <a:extLst>
+              <a:ext uri="{FF2B5EF4-FFF2-40B4-BE49-F238E27FC236}">
+                <a16:creationId xmlns:a16="http://schemas.microsoft.com/office/drawing/2014/main" id="{CC6E5DCF-3B80-4792-8D87-863D99ECA5E5}"/>
+              </a:ext>
+            </a:extLst>
+          </p:cNvPr>
+          <p:cNvSpPr/>
+          <p:nvPr/>
+        </p:nvSpPr>
+        <p:spPr>
+          <a:xfrm>
+            <a:off x="11218152" y="3038464"/>
+            <a:ext cx="169643" cy="78114"/>
+          </a:xfrm>
+          <a:prstGeom prst="rect">
+            <a:avLst/>
+          </a:prstGeom>
+          <a:ln>
+            <a:solidFill>
+              <a:schemeClr val="tx1"/>
+            </a:solidFill>
+          </a:ln>
+        </p:spPr>
+        <p:style>
+          <a:lnRef idx="2">
+            <a:schemeClr val="accent1">
+              <a:shade val="50000"/>
+            </a:schemeClr>
+          </a:lnRef>
+          <a:fillRef idx="1">
+            <a:schemeClr val="accent1"/>
+          </a:fillRef>
+          <a:effectRef idx="0">
+            <a:schemeClr val="accent1"/>
+          </a:effectRef>
+          <a:fontRef idx="minor">
+            <a:schemeClr val="lt1"/>
+          </a:fontRef>
+        </p:style>
+        <p:txBody>
+          <a:bodyPr rtlCol="0" anchor="ctr"/>
+          <a:lstStyle/>
+          <a:p>
+            <a:pPr algn="ctr"/>
+            <a:endParaRPr lang="zh-CN" altLang="en-US"/>
+          </a:p>
+        </p:txBody>
+      </p:sp>
+      <p:sp>
+        <p:nvSpPr>
+          <p:cNvPr id="67" name="矩形 66">
+            <a:extLst>
+              <a:ext uri="{FF2B5EF4-FFF2-40B4-BE49-F238E27FC236}">
+                <a16:creationId xmlns:a16="http://schemas.microsoft.com/office/drawing/2014/main" id="{F3704804-B6F7-47A3-86C9-CDF048C090C9}"/>
+              </a:ext>
+            </a:extLst>
+          </p:cNvPr>
+          <p:cNvSpPr/>
+          <p:nvPr/>
+        </p:nvSpPr>
+        <p:spPr>
+          <a:xfrm>
+            <a:off x="11218152" y="3271902"/>
+            <a:ext cx="169643" cy="78114"/>
+          </a:xfrm>
+          <a:prstGeom prst="rect">
+            <a:avLst/>
+          </a:prstGeom>
+          <a:ln>
+            <a:solidFill>
+              <a:schemeClr val="tx1"/>
+            </a:solidFill>
+          </a:ln>
+        </p:spPr>
+        <p:style>
+          <a:lnRef idx="2">
+            <a:schemeClr val="accent1">
+              <a:shade val="50000"/>
+            </a:schemeClr>
+          </a:lnRef>
+          <a:fillRef idx="1">
+            <a:schemeClr val="accent1"/>
+          </a:fillRef>
+          <a:effectRef idx="0">
+            <a:schemeClr val="accent1"/>
+          </a:effectRef>
+          <a:fontRef idx="minor">
+            <a:schemeClr val="lt1"/>
+          </a:fontRef>
+        </p:style>
+        <p:txBody>
+          <a:bodyPr rtlCol="0" anchor="ctr"/>
+          <a:lstStyle/>
+          <a:p>
+            <a:pPr algn="ctr"/>
+            <a:endParaRPr lang="zh-CN" altLang="en-US"/>
+          </a:p>
+        </p:txBody>
+      </p:sp>
+      <p:cxnSp>
+        <p:nvCxnSpPr>
+          <p:cNvPr id="72" name="连接符: 肘形 71">
+            <a:extLst>
+              <a:ext uri="{FF2B5EF4-FFF2-40B4-BE49-F238E27FC236}">
+                <a16:creationId xmlns:a16="http://schemas.microsoft.com/office/drawing/2014/main" id="{D152026A-8648-4C20-AB63-26495BF450EB}"/>
+              </a:ext>
+            </a:extLst>
+          </p:cNvPr>
+          <p:cNvCxnSpPr>
+            <a:cxnSpLocks/>
+            <a:stCxn id="61" idx="1"/>
+            <a:endCxn id="67" idx="1"/>
+          </p:cNvCxnSpPr>
+          <p:nvPr/>
+        </p:nvCxnSpPr>
+        <p:spPr>
+          <a:xfrm rot="10800000" flipV="1">
+            <a:off x="11218152" y="1910331"/>
+            <a:ext cx="12700" cy="1400628"/>
+          </a:xfrm>
+          <a:prstGeom prst="bentConnector3">
+            <a:avLst>
+              <a:gd name="adj1" fmla="val 1800000"/>
+            </a:avLst>
+          </a:prstGeom>
+          <a:ln w="12700">
+            <a:solidFill>
+              <a:schemeClr val="tx1"/>
+            </a:solidFill>
+            <a:tailEnd type="arrow"/>
+          </a:ln>
+        </p:spPr>
+        <p:style>
+          <a:lnRef idx="1">
+            <a:schemeClr val="accent1"/>
+          </a:lnRef>
+          <a:fillRef idx="0">
+            <a:schemeClr val="accent1"/>
+          </a:fillRef>
+          <a:effectRef idx="0">
+            <a:schemeClr val="accent1"/>
+          </a:effectRef>
+          <a:fontRef idx="minor">
+            <a:schemeClr val="tx1"/>
+          </a:fontRef>
+        </p:style>
+      </p:cxnSp>
+      <p:sp>
+        <p:nvSpPr>
+          <p:cNvPr id="75" name="矩形: 圆角 74">
+            <a:extLst>
+              <a:ext uri="{FF2B5EF4-FFF2-40B4-BE49-F238E27FC236}">
+                <a16:creationId xmlns:a16="http://schemas.microsoft.com/office/drawing/2014/main" id="{CAF9854B-CBCF-445A-8DBC-7EB3EDB87141}"/>
+              </a:ext>
+            </a:extLst>
+          </p:cNvPr>
+          <p:cNvSpPr/>
+          <p:nvPr/>
+        </p:nvSpPr>
+        <p:spPr>
+          <a:xfrm>
+            <a:off x="4338012" y="3812526"/>
+            <a:ext cx="7636188" cy="2383281"/>
           </a:xfrm>
           <a:prstGeom prst="roundRect">
             <a:avLst>
-              <a:gd name="adj" fmla="val 2536"/>
+              <a:gd name="adj" fmla="val 1605"/>
             </a:avLst>
           </a:prstGeom>
           <a:solidFill>
@@ -16156,16 +18326,494 @@
           <a:lstStyle/>
           <a:p>
             <a:pPr algn="ctr"/>
+            <a:endParaRPr lang="zh-CN" altLang="en-US"/>
+          </a:p>
+        </p:txBody>
+      </p:sp>
+      <p:sp>
+        <p:nvSpPr>
+          <p:cNvPr id="76" name="矩形: 圆角 75">
+            <a:extLst>
+              <a:ext uri="{FF2B5EF4-FFF2-40B4-BE49-F238E27FC236}">
+                <a16:creationId xmlns:a16="http://schemas.microsoft.com/office/drawing/2014/main" id="{319A4FF0-9D75-4501-9625-69CFE7A45508}"/>
+              </a:ext>
+            </a:extLst>
+          </p:cNvPr>
+          <p:cNvSpPr/>
+          <p:nvPr/>
+        </p:nvSpPr>
+        <p:spPr>
+          <a:xfrm>
+            <a:off x="4454215" y="3964926"/>
+            <a:ext cx="7377311" cy="989775"/>
+          </a:xfrm>
+          <a:prstGeom prst="roundRect">
+            <a:avLst>
+              <a:gd name="adj" fmla="val 1605"/>
+            </a:avLst>
+          </a:prstGeom>
+          <a:solidFill>
+            <a:schemeClr val="accent5">
+              <a:lumMod val="20000"/>
+              <a:lumOff val="80000"/>
+            </a:schemeClr>
+          </a:solidFill>
+          <a:ln>
+            <a:solidFill>
+              <a:schemeClr val="tx1"/>
+            </a:solidFill>
+          </a:ln>
+        </p:spPr>
+        <p:style>
+          <a:lnRef idx="2">
+            <a:schemeClr val="accent1">
+              <a:shade val="50000"/>
+            </a:schemeClr>
+          </a:lnRef>
+          <a:fillRef idx="1">
+            <a:schemeClr val="accent1"/>
+          </a:fillRef>
+          <a:effectRef idx="0">
+            <a:schemeClr val="accent1"/>
+          </a:effectRef>
+          <a:fontRef idx="minor">
+            <a:schemeClr val="lt1"/>
+          </a:fontRef>
+        </p:style>
+        <p:txBody>
+          <a:bodyPr rtlCol="0" anchor="ctr"/>
+          <a:lstStyle/>
+          <a:p>
+            <a:pPr algn="ctr"/>
             <a:endParaRPr lang="zh-CN" altLang="en-US" dirty="0"/>
           </a:p>
         </p:txBody>
       </p:sp>
       <p:sp>
         <p:nvSpPr>
-          <p:cNvPr id="18" name="文本框 17">
-            <a:extLst>
-              <a:ext uri="{FF2B5EF4-FFF2-40B4-BE49-F238E27FC236}">
-                <a16:creationId xmlns:a16="http://schemas.microsoft.com/office/drawing/2014/main" id="{4C38D50C-0588-4879-BF1B-AE40A5249D27}"/>
+          <p:cNvPr id="77" name="矩形: 圆角 76">
+            <a:extLst>
+              <a:ext uri="{FF2B5EF4-FFF2-40B4-BE49-F238E27FC236}">
+                <a16:creationId xmlns:a16="http://schemas.microsoft.com/office/drawing/2014/main" id="{7D6279CF-8459-4CE6-8573-482FD9581F22}"/>
+              </a:ext>
+            </a:extLst>
+          </p:cNvPr>
+          <p:cNvSpPr/>
+          <p:nvPr/>
+        </p:nvSpPr>
+        <p:spPr>
+          <a:xfrm>
+            <a:off x="4451937" y="5083706"/>
+            <a:ext cx="7377311" cy="983096"/>
+          </a:xfrm>
+          <a:prstGeom prst="roundRect">
+            <a:avLst>
+              <a:gd name="adj" fmla="val 1605"/>
+            </a:avLst>
+          </a:prstGeom>
+          <a:solidFill>
+            <a:schemeClr val="accent6">
+              <a:lumMod val="20000"/>
+              <a:lumOff val="80000"/>
+            </a:schemeClr>
+          </a:solidFill>
+          <a:ln>
+            <a:solidFill>
+              <a:schemeClr val="tx1"/>
+            </a:solidFill>
+          </a:ln>
+        </p:spPr>
+        <p:style>
+          <a:lnRef idx="2">
+            <a:schemeClr val="accent1">
+              <a:shade val="50000"/>
+            </a:schemeClr>
+          </a:lnRef>
+          <a:fillRef idx="1">
+            <a:schemeClr val="accent1"/>
+          </a:fillRef>
+          <a:effectRef idx="0">
+            <a:schemeClr val="accent1"/>
+          </a:effectRef>
+          <a:fontRef idx="minor">
+            <a:schemeClr val="lt1"/>
+          </a:fontRef>
+        </p:style>
+        <p:txBody>
+          <a:bodyPr rtlCol="0" anchor="ctr"/>
+          <a:lstStyle/>
+          <a:p>
+            <a:pPr algn="ctr"/>
+            <a:endParaRPr lang="zh-CN" altLang="en-US"/>
+          </a:p>
+        </p:txBody>
+      </p:sp>
+      <p:sp>
+        <p:nvSpPr>
+          <p:cNvPr id="78" name="矩形: 圆角 77">
+            <a:extLst>
+              <a:ext uri="{FF2B5EF4-FFF2-40B4-BE49-F238E27FC236}">
+                <a16:creationId xmlns:a16="http://schemas.microsoft.com/office/drawing/2014/main" id="{659CD713-3602-4FBE-97CF-56B2673F800D}"/>
+              </a:ext>
+            </a:extLst>
+          </p:cNvPr>
+          <p:cNvSpPr/>
+          <p:nvPr/>
+        </p:nvSpPr>
+        <p:spPr>
+          <a:xfrm>
+            <a:off x="10486571" y="4090453"/>
+            <a:ext cx="1164173" cy="738720"/>
+          </a:xfrm>
+          <a:prstGeom prst="roundRect">
+            <a:avLst>
+              <a:gd name="adj" fmla="val 5602"/>
+            </a:avLst>
+          </a:prstGeom>
+          <a:solidFill>
+            <a:schemeClr val="bg1"/>
+          </a:solidFill>
+          <a:ln>
+            <a:solidFill>
+              <a:schemeClr val="tx1"/>
+            </a:solidFill>
+          </a:ln>
+        </p:spPr>
+        <p:style>
+          <a:lnRef idx="2">
+            <a:schemeClr val="accent1">
+              <a:shade val="50000"/>
+            </a:schemeClr>
+          </a:lnRef>
+          <a:fillRef idx="1">
+            <a:schemeClr val="accent1"/>
+          </a:fillRef>
+          <a:effectRef idx="0">
+            <a:schemeClr val="accent1"/>
+          </a:effectRef>
+          <a:fontRef idx="minor">
+            <a:schemeClr val="lt1"/>
+          </a:fontRef>
+        </p:style>
+        <p:txBody>
+          <a:bodyPr rtlCol="0" anchor="ctr"/>
+          <a:lstStyle/>
+          <a:p>
+            <a:pPr algn="ctr"/>
+            <a:r>
+              <a:rPr lang="en-US" altLang="zh-CN" dirty="0">
+                <a:solidFill>
+                  <a:schemeClr val="tx1"/>
+                </a:solidFill>
+                <a:latin typeface="Times New Roman" panose="02020603050405020304" pitchFamily="18" charset="0"/>
+                <a:cs typeface="Times New Roman" panose="02020603050405020304" pitchFamily="18" charset="0"/>
+              </a:rPr>
+              <a:t>GPU Controller</a:t>
+            </a:r>
+            <a:endParaRPr lang="zh-CN" altLang="en-US" dirty="0">
+              <a:solidFill>
+                <a:schemeClr val="tx1"/>
+              </a:solidFill>
+              <a:latin typeface="Times New Roman" panose="02020603050405020304" pitchFamily="18" charset="0"/>
+              <a:cs typeface="Times New Roman" panose="02020603050405020304" pitchFamily="18" charset="0"/>
+            </a:endParaRPr>
+          </a:p>
+        </p:txBody>
+      </p:sp>
+      <p:sp>
+        <p:nvSpPr>
+          <p:cNvPr id="79" name="矩形: 圆角 78">
+            <a:extLst>
+              <a:ext uri="{FF2B5EF4-FFF2-40B4-BE49-F238E27FC236}">
+                <a16:creationId xmlns:a16="http://schemas.microsoft.com/office/drawing/2014/main" id="{E28AF14F-590E-4EA6-90E8-3E1BC090F88A}"/>
+              </a:ext>
+            </a:extLst>
+          </p:cNvPr>
+          <p:cNvSpPr/>
+          <p:nvPr/>
+        </p:nvSpPr>
+        <p:spPr>
+          <a:xfrm>
+            <a:off x="8519337" y="5264182"/>
+            <a:ext cx="1147179" cy="622145"/>
+          </a:xfrm>
+          <a:prstGeom prst="roundRect">
+            <a:avLst>
+              <a:gd name="adj" fmla="val 5602"/>
+            </a:avLst>
+          </a:prstGeom>
+          <a:solidFill>
+            <a:schemeClr val="bg1"/>
+          </a:solidFill>
+          <a:ln>
+            <a:solidFill>
+              <a:schemeClr val="tx1"/>
+            </a:solidFill>
+          </a:ln>
+        </p:spPr>
+        <p:style>
+          <a:lnRef idx="2">
+            <a:schemeClr val="accent1">
+              <a:shade val="50000"/>
+            </a:schemeClr>
+          </a:lnRef>
+          <a:fillRef idx="1">
+            <a:schemeClr val="accent1"/>
+          </a:fillRef>
+          <a:effectRef idx="0">
+            <a:schemeClr val="accent1"/>
+          </a:effectRef>
+          <a:fontRef idx="minor">
+            <a:schemeClr val="lt1"/>
+          </a:fontRef>
+        </p:style>
+        <p:txBody>
+          <a:bodyPr rtlCol="0" anchor="ctr"/>
+          <a:lstStyle/>
+          <a:p>
+            <a:pPr algn="ctr"/>
+            <a:r>
+              <a:rPr lang="en-US" altLang="zh-CN" dirty="0">
+                <a:solidFill>
+                  <a:schemeClr val="tx1"/>
+                </a:solidFill>
+                <a:latin typeface="Times New Roman" panose="02020603050405020304" pitchFamily="18" charset="0"/>
+                <a:cs typeface="Times New Roman" panose="02020603050405020304" pitchFamily="18" charset="0"/>
+              </a:rPr>
+              <a:t>Thread pool</a:t>
+            </a:r>
+            <a:endParaRPr lang="zh-CN" altLang="en-US" dirty="0">
+              <a:solidFill>
+                <a:schemeClr val="tx1"/>
+              </a:solidFill>
+              <a:latin typeface="Times New Roman" panose="02020603050405020304" pitchFamily="18" charset="0"/>
+              <a:cs typeface="Times New Roman" panose="02020603050405020304" pitchFamily="18" charset="0"/>
+            </a:endParaRPr>
+          </a:p>
+        </p:txBody>
+      </p:sp>
+      <p:sp>
+        <p:nvSpPr>
+          <p:cNvPr id="80" name="矩形: 圆角 79">
+            <a:extLst>
+              <a:ext uri="{FF2B5EF4-FFF2-40B4-BE49-F238E27FC236}">
+                <a16:creationId xmlns:a16="http://schemas.microsoft.com/office/drawing/2014/main" id="{C09A6317-A3E4-47FF-81EE-D42D765C2549}"/>
+              </a:ext>
+            </a:extLst>
+          </p:cNvPr>
+          <p:cNvSpPr/>
+          <p:nvPr/>
+        </p:nvSpPr>
+        <p:spPr>
+          <a:xfrm>
+            <a:off x="6989078" y="5264182"/>
+            <a:ext cx="625727" cy="622145"/>
+          </a:xfrm>
+          <a:prstGeom prst="roundRect">
+            <a:avLst>
+              <a:gd name="adj" fmla="val 5602"/>
+            </a:avLst>
+          </a:prstGeom>
+          <a:solidFill>
+            <a:schemeClr val="bg1"/>
+          </a:solidFill>
+          <a:ln>
+            <a:solidFill>
+              <a:schemeClr val="tx1"/>
+            </a:solidFill>
+          </a:ln>
+        </p:spPr>
+        <p:style>
+          <a:lnRef idx="2">
+            <a:schemeClr val="accent1">
+              <a:shade val="50000"/>
+            </a:schemeClr>
+          </a:lnRef>
+          <a:fillRef idx="1">
+            <a:schemeClr val="accent1"/>
+          </a:fillRef>
+          <a:effectRef idx="0">
+            <a:schemeClr val="accent1"/>
+          </a:effectRef>
+          <a:fontRef idx="minor">
+            <a:schemeClr val="lt1"/>
+          </a:fontRef>
+        </p:style>
+        <p:txBody>
+          <a:bodyPr rtlCol="0" anchor="ctr"/>
+          <a:lstStyle/>
+          <a:p>
+            <a:pPr algn="ctr"/>
+            <a:r>
+              <a:rPr lang="en-US" altLang="zh-CN" dirty="0">
+                <a:solidFill>
+                  <a:schemeClr val="tx1"/>
+                </a:solidFill>
+                <a:latin typeface="Times New Roman" panose="02020603050405020304" pitchFamily="18" charset="0"/>
+                <a:cs typeface="Times New Roman" panose="02020603050405020304" pitchFamily="18" charset="0"/>
+              </a:rPr>
+              <a:t>SM</a:t>
+            </a:r>
+            <a:endParaRPr lang="zh-CN" altLang="en-US" dirty="0">
+              <a:solidFill>
+                <a:schemeClr val="tx1"/>
+              </a:solidFill>
+              <a:latin typeface="Times New Roman" panose="02020603050405020304" pitchFamily="18" charset="0"/>
+              <a:cs typeface="Times New Roman" panose="02020603050405020304" pitchFamily="18" charset="0"/>
+            </a:endParaRPr>
+          </a:p>
+        </p:txBody>
+      </p:sp>
+      <p:sp>
+        <p:nvSpPr>
+          <p:cNvPr id="82" name="矩形: 圆角 81">
+            <a:extLst>
+              <a:ext uri="{FF2B5EF4-FFF2-40B4-BE49-F238E27FC236}">
+                <a16:creationId xmlns:a16="http://schemas.microsoft.com/office/drawing/2014/main" id="{AF5822C6-3E08-4A98-BF09-03E6F84FD81C}"/>
+              </a:ext>
+            </a:extLst>
+          </p:cNvPr>
+          <p:cNvSpPr/>
+          <p:nvPr/>
+        </p:nvSpPr>
+        <p:spPr>
+          <a:xfrm>
+            <a:off x="5079358" y="5264182"/>
+            <a:ext cx="625727" cy="622145"/>
+          </a:xfrm>
+          <a:prstGeom prst="roundRect">
+            <a:avLst>
+              <a:gd name="adj" fmla="val 5602"/>
+            </a:avLst>
+          </a:prstGeom>
+          <a:solidFill>
+            <a:schemeClr val="bg1"/>
+          </a:solidFill>
+          <a:ln>
+            <a:solidFill>
+              <a:schemeClr val="tx1"/>
+            </a:solidFill>
+          </a:ln>
+        </p:spPr>
+        <p:style>
+          <a:lnRef idx="2">
+            <a:schemeClr val="accent1">
+              <a:shade val="50000"/>
+            </a:schemeClr>
+          </a:lnRef>
+          <a:fillRef idx="1">
+            <a:schemeClr val="accent1"/>
+          </a:fillRef>
+          <a:effectRef idx="0">
+            <a:schemeClr val="accent1"/>
+          </a:effectRef>
+          <a:fontRef idx="minor">
+            <a:schemeClr val="lt1"/>
+          </a:fontRef>
+        </p:style>
+        <p:txBody>
+          <a:bodyPr rtlCol="0" anchor="ctr"/>
+          <a:lstStyle/>
+          <a:p>
+            <a:pPr algn="ctr"/>
+            <a:r>
+              <a:rPr lang="en-US" altLang="zh-CN" dirty="0">
+                <a:solidFill>
+                  <a:schemeClr val="tx1"/>
+                </a:solidFill>
+                <a:latin typeface="Times New Roman" panose="02020603050405020304" pitchFamily="18" charset="0"/>
+                <a:cs typeface="Times New Roman" panose="02020603050405020304" pitchFamily="18" charset="0"/>
+              </a:rPr>
+              <a:t>SM</a:t>
+            </a:r>
+            <a:endParaRPr lang="zh-CN" altLang="en-US" dirty="0">
+              <a:solidFill>
+                <a:schemeClr val="tx1"/>
+              </a:solidFill>
+              <a:latin typeface="Times New Roman" panose="02020603050405020304" pitchFamily="18" charset="0"/>
+              <a:cs typeface="Times New Roman" panose="02020603050405020304" pitchFamily="18" charset="0"/>
+            </a:endParaRPr>
+          </a:p>
+        </p:txBody>
+      </p:sp>
+      <p:sp>
+        <p:nvSpPr>
+          <p:cNvPr id="83" name="矩形: 圆角 82">
+            <a:extLst>
+              <a:ext uri="{FF2B5EF4-FFF2-40B4-BE49-F238E27FC236}">
+                <a16:creationId xmlns:a16="http://schemas.microsoft.com/office/drawing/2014/main" id="{72F58D87-ACF7-442A-A5E8-F1516AEF34F5}"/>
+              </a:ext>
+            </a:extLst>
+          </p:cNvPr>
+          <p:cNvSpPr/>
+          <p:nvPr/>
+        </p:nvSpPr>
+        <p:spPr>
+          <a:xfrm>
+            <a:off x="6219947" y="5264182"/>
+            <a:ext cx="625727" cy="622145"/>
+          </a:xfrm>
+          <a:prstGeom prst="roundRect">
+            <a:avLst>
+              <a:gd name="adj" fmla="val 5602"/>
+            </a:avLst>
+          </a:prstGeom>
+          <a:solidFill>
+            <a:schemeClr val="bg1"/>
+          </a:solidFill>
+          <a:ln>
+            <a:solidFill>
+              <a:schemeClr val="tx1"/>
+            </a:solidFill>
+          </a:ln>
+        </p:spPr>
+        <p:style>
+          <a:lnRef idx="2">
+            <a:schemeClr val="accent1">
+              <a:shade val="50000"/>
+            </a:schemeClr>
+          </a:lnRef>
+          <a:fillRef idx="1">
+            <a:schemeClr val="accent1"/>
+          </a:fillRef>
+          <a:effectRef idx="0">
+            <a:schemeClr val="accent1"/>
+          </a:effectRef>
+          <a:fontRef idx="minor">
+            <a:schemeClr val="lt1"/>
+          </a:fontRef>
+        </p:style>
+        <p:txBody>
+          <a:bodyPr rtlCol="0" anchor="ctr"/>
+          <a:lstStyle/>
+          <a:p>
+            <a:pPr algn="ctr"/>
+            <a:r>
+              <a:rPr lang="en-US" altLang="zh-CN" dirty="0">
+                <a:solidFill>
+                  <a:schemeClr val="tx1"/>
+                </a:solidFill>
+                <a:latin typeface="Times New Roman" panose="02020603050405020304" pitchFamily="18" charset="0"/>
+                <a:cs typeface="Times New Roman" panose="02020603050405020304" pitchFamily="18" charset="0"/>
+              </a:rPr>
+              <a:t>SM</a:t>
+            </a:r>
+            <a:endParaRPr lang="zh-CN" altLang="en-US" dirty="0">
+              <a:solidFill>
+                <a:schemeClr val="tx1"/>
+              </a:solidFill>
+              <a:latin typeface="Times New Roman" panose="02020603050405020304" pitchFamily="18" charset="0"/>
+              <a:cs typeface="Times New Roman" panose="02020603050405020304" pitchFamily="18" charset="0"/>
+            </a:endParaRPr>
+          </a:p>
+        </p:txBody>
+      </p:sp>
+      <p:sp>
+        <p:nvSpPr>
+          <p:cNvPr id="84" name="文本框 83">
+            <a:extLst>
+              <a:ext uri="{FF2B5EF4-FFF2-40B4-BE49-F238E27FC236}">
+                <a16:creationId xmlns:a16="http://schemas.microsoft.com/office/drawing/2014/main" id="{ED91DA1D-0814-4347-A1BC-9A93062D64D0}"/>
               </a:ext>
             </a:extLst>
           </p:cNvPr>
@@ -16174,8 +18822,8 @@
         </p:nvSpPr>
         <p:spPr>
           <a:xfrm>
-            <a:off x="5117677" y="3345949"/>
-            <a:ext cx="646227" cy="369332"/>
+            <a:off x="5662720" y="5171298"/>
+            <a:ext cx="532695" cy="584775"/>
           </a:xfrm>
           <a:prstGeom prst="rect">
             <a:avLst/>
@@ -16189,13 +18837,824 @@
           <a:lstStyle/>
           <a:p>
             <a:r>
+              <a:rPr lang="en-US" altLang="zh-CN" sz="3200" dirty="0">
+                <a:latin typeface="Times New Roman" panose="02020603050405020304" pitchFamily="18" charset="0"/>
+                <a:cs typeface="Times New Roman" panose="02020603050405020304" pitchFamily="18" charset="0"/>
+              </a:rPr>
+              <a:t>…</a:t>
+            </a:r>
+            <a:endParaRPr lang="zh-CN" altLang="en-US" sz="3200" dirty="0">
+              <a:latin typeface="Times New Roman" panose="02020603050405020304" pitchFamily="18" charset="0"/>
+              <a:cs typeface="Times New Roman" panose="02020603050405020304" pitchFamily="18" charset="0"/>
+            </a:endParaRPr>
+          </a:p>
+        </p:txBody>
+      </p:sp>
+      <p:cxnSp>
+        <p:nvCxnSpPr>
+          <p:cNvPr id="86" name="直接箭头连接符 85">
+            <a:extLst>
+              <a:ext uri="{FF2B5EF4-FFF2-40B4-BE49-F238E27FC236}">
+                <a16:creationId xmlns:a16="http://schemas.microsoft.com/office/drawing/2014/main" id="{80DA92A3-598C-4A6A-A8FE-75DEA64CEB36}"/>
+              </a:ext>
+            </a:extLst>
+          </p:cNvPr>
+          <p:cNvCxnSpPr>
+            <a:cxnSpLocks/>
+            <a:stCxn id="79" idx="1"/>
+          </p:cNvCxnSpPr>
+          <p:nvPr/>
+        </p:nvCxnSpPr>
+        <p:spPr>
+          <a:xfrm flipH="1">
+            <a:off x="7614805" y="5575255"/>
+            <a:ext cx="904532" cy="0"/>
+          </a:xfrm>
+          <a:prstGeom prst="straightConnector1">
+            <a:avLst/>
+          </a:prstGeom>
+          <a:ln w="12700">
+            <a:solidFill>
+              <a:schemeClr val="tx1"/>
+            </a:solidFill>
+            <a:tailEnd type="triangle"/>
+          </a:ln>
+        </p:spPr>
+        <p:style>
+          <a:lnRef idx="1">
+            <a:schemeClr val="accent1"/>
+          </a:lnRef>
+          <a:fillRef idx="0">
+            <a:schemeClr val="accent1"/>
+          </a:fillRef>
+          <a:effectRef idx="0">
+            <a:schemeClr val="accent1"/>
+          </a:effectRef>
+          <a:fontRef idx="minor">
+            <a:schemeClr val="tx1"/>
+          </a:fontRef>
+        </p:style>
+      </p:cxnSp>
+      <p:sp>
+        <p:nvSpPr>
+          <p:cNvPr id="89" name="文本框 88">
+            <a:extLst>
+              <a:ext uri="{FF2B5EF4-FFF2-40B4-BE49-F238E27FC236}">
+                <a16:creationId xmlns:a16="http://schemas.microsoft.com/office/drawing/2014/main" id="{172174CD-62A4-4BD5-8483-F0C659808CB3}"/>
+              </a:ext>
+            </a:extLst>
+          </p:cNvPr>
+          <p:cNvSpPr txBox="1"/>
+          <p:nvPr/>
+        </p:nvSpPr>
+        <p:spPr>
+          <a:xfrm>
+            <a:off x="7683703" y="5203756"/>
+            <a:ext cx="1082278" cy="369332"/>
+          </a:xfrm>
+          <a:prstGeom prst="rect">
+            <a:avLst/>
+          </a:prstGeom>
+          <a:noFill/>
+        </p:spPr>
+        <p:txBody>
+          <a:bodyPr wrap="square" rtlCol="0">
+            <a:spAutoFit/>
+          </a:bodyPr>
+          <a:lstStyle/>
+          <a:p>
+            <a:r>
               <a:rPr lang="en-US" altLang="zh-CN" dirty="0">
                 <a:latin typeface="Times New Roman" panose="02020603050405020304" pitchFamily="18" charset="0"/>
                 <a:cs typeface="Times New Roman" panose="02020603050405020304" pitchFamily="18" charset="0"/>
               </a:rPr>
+              <a:t>Deploy</a:t>
+            </a:r>
+            <a:endParaRPr lang="zh-CN" altLang="en-US" dirty="0">
+              <a:latin typeface="Times New Roman" panose="02020603050405020304" pitchFamily="18" charset="0"/>
+              <a:cs typeface="Times New Roman" panose="02020603050405020304" pitchFamily="18" charset="0"/>
+            </a:endParaRPr>
+          </a:p>
+        </p:txBody>
+      </p:sp>
+      <p:sp>
+        <p:nvSpPr>
+          <p:cNvPr id="90" name="矩形: 圆角 89">
+            <a:extLst>
+              <a:ext uri="{FF2B5EF4-FFF2-40B4-BE49-F238E27FC236}">
+                <a16:creationId xmlns:a16="http://schemas.microsoft.com/office/drawing/2014/main" id="{54DA0069-7C1B-4615-98E4-23846944F373}"/>
+              </a:ext>
+            </a:extLst>
+          </p:cNvPr>
+          <p:cNvSpPr/>
+          <p:nvPr/>
+        </p:nvSpPr>
+        <p:spPr>
+          <a:xfrm>
+            <a:off x="10514007" y="5143437"/>
+            <a:ext cx="1101091" cy="356430"/>
+          </a:xfrm>
+          <a:prstGeom prst="roundRect">
+            <a:avLst>
+              <a:gd name="adj" fmla="val 5602"/>
+            </a:avLst>
+          </a:prstGeom>
+          <a:solidFill>
+            <a:schemeClr val="bg1"/>
+          </a:solidFill>
+          <a:ln>
+            <a:solidFill>
+              <a:schemeClr val="tx1"/>
+            </a:solidFill>
+          </a:ln>
+        </p:spPr>
+        <p:style>
+          <a:lnRef idx="2">
+            <a:schemeClr val="accent1">
+              <a:shade val="50000"/>
+            </a:schemeClr>
+          </a:lnRef>
+          <a:fillRef idx="1">
+            <a:schemeClr val="accent1"/>
+          </a:fillRef>
+          <a:effectRef idx="0">
+            <a:schemeClr val="accent1"/>
+          </a:effectRef>
+          <a:fontRef idx="minor">
+            <a:schemeClr val="lt1"/>
+          </a:fontRef>
+        </p:style>
+        <p:txBody>
+          <a:bodyPr rtlCol="0" anchor="ctr"/>
+          <a:lstStyle/>
+          <a:p>
+            <a:pPr algn="ctr"/>
+            <a:r>
+              <a:rPr lang="en-US" altLang="zh-CN" dirty="0">
+                <a:solidFill>
+                  <a:schemeClr val="tx1"/>
+                </a:solidFill>
+                <a:latin typeface="Times New Roman" panose="02020603050405020304" pitchFamily="18" charset="0"/>
+                <a:cs typeface="Times New Roman" panose="02020603050405020304" pitchFamily="18" charset="0"/>
+              </a:rPr>
+              <a:t>Agent 1</a:t>
+            </a:r>
+            <a:endParaRPr lang="zh-CN" altLang="en-US" dirty="0">
+              <a:solidFill>
+                <a:schemeClr val="tx1"/>
+              </a:solidFill>
+              <a:latin typeface="Times New Roman" panose="02020603050405020304" pitchFamily="18" charset="0"/>
+              <a:cs typeface="Times New Roman" panose="02020603050405020304" pitchFamily="18" charset="0"/>
+            </a:endParaRPr>
+          </a:p>
+        </p:txBody>
+      </p:sp>
+      <p:sp>
+        <p:nvSpPr>
+          <p:cNvPr id="91" name="矩形: 圆角 90">
+            <a:extLst>
+              <a:ext uri="{FF2B5EF4-FFF2-40B4-BE49-F238E27FC236}">
+                <a16:creationId xmlns:a16="http://schemas.microsoft.com/office/drawing/2014/main" id="{A8D5F4EF-4809-4136-B49E-43FCF7097DB6}"/>
+              </a:ext>
+            </a:extLst>
+          </p:cNvPr>
+          <p:cNvSpPr/>
+          <p:nvPr/>
+        </p:nvSpPr>
+        <p:spPr>
+          <a:xfrm>
+            <a:off x="10514007" y="5556407"/>
+            <a:ext cx="1101091" cy="356430"/>
+          </a:xfrm>
+          <a:prstGeom prst="roundRect">
+            <a:avLst>
+              <a:gd name="adj" fmla="val 5602"/>
+            </a:avLst>
+          </a:prstGeom>
+          <a:solidFill>
+            <a:schemeClr val="bg1"/>
+          </a:solidFill>
+          <a:ln>
+            <a:solidFill>
+              <a:schemeClr val="tx1"/>
+            </a:solidFill>
+          </a:ln>
+        </p:spPr>
+        <p:style>
+          <a:lnRef idx="2">
+            <a:schemeClr val="accent1">
+              <a:shade val="50000"/>
+            </a:schemeClr>
+          </a:lnRef>
+          <a:fillRef idx="1">
+            <a:schemeClr val="accent1"/>
+          </a:fillRef>
+          <a:effectRef idx="0">
+            <a:schemeClr val="accent1"/>
+          </a:effectRef>
+          <a:fontRef idx="minor">
+            <a:schemeClr val="lt1"/>
+          </a:fontRef>
+        </p:style>
+        <p:txBody>
+          <a:bodyPr rtlCol="0" anchor="ctr"/>
+          <a:lstStyle/>
+          <a:p>
+            <a:pPr algn="ctr"/>
+            <a:r>
+              <a:rPr lang="en-US" altLang="zh-CN" dirty="0">
+                <a:solidFill>
+                  <a:schemeClr val="tx1"/>
+                </a:solidFill>
+                <a:latin typeface="Times New Roman" panose="02020603050405020304" pitchFamily="18" charset="0"/>
+                <a:cs typeface="Times New Roman" panose="02020603050405020304" pitchFamily="18" charset="0"/>
+              </a:rPr>
+              <a:t>Agent 2</a:t>
+            </a:r>
+            <a:endParaRPr lang="zh-CN" altLang="en-US" dirty="0">
+              <a:solidFill>
+                <a:schemeClr val="tx1"/>
+              </a:solidFill>
+              <a:latin typeface="Times New Roman" panose="02020603050405020304" pitchFamily="18" charset="0"/>
+              <a:cs typeface="Times New Roman" panose="02020603050405020304" pitchFamily="18" charset="0"/>
+            </a:endParaRPr>
+          </a:p>
+        </p:txBody>
+      </p:sp>
+      <p:sp>
+        <p:nvSpPr>
+          <p:cNvPr id="92" name="文本框 91">
+            <a:extLst>
+              <a:ext uri="{FF2B5EF4-FFF2-40B4-BE49-F238E27FC236}">
+                <a16:creationId xmlns:a16="http://schemas.microsoft.com/office/drawing/2014/main" id="{1E064F2D-89FF-49BE-BC89-32164B0F8A51}"/>
+              </a:ext>
+            </a:extLst>
+          </p:cNvPr>
+          <p:cNvSpPr txBox="1"/>
+          <p:nvPr/>
+        </p:nvSpPr>
+        <p:spPr>
+          <a:xfrm>
+            <a:off x="10777306" y="5573088"/>
+            <a:ext cx="532695" cy="584775"/>
+          </a:xfrm>
+          <a:prstGeom prst="rect">
+            <a:avLst/>
+          </a:prstGeom>
+          <a:noFill/>
+        </p:spPr>
+        <p:txBody>
+          <a:bodyPr wrap="square" rtlCol="0">
+            <a:spAutoFit/>
+          </a:bodyPr>
+          <a:lstStyle/>
+          <a:p>
+            <a:r>
+              <a:rPr lang="en-US" altLang="zh-CN" sz="3200" dirty="0">
+                <a:latin typeface="Times New Roman" panose="02020603050405020304" pitchFamily="18" charset="0"/>
+                <a:cs typeface="Times New Roman" panose="02020603050405020304" pitchFamily="18" charset="0"/>
+              </a:rPr>
+              <a:t>…</a:t>
+            </a:r>
+            <a:endParaRPr lang="zh-CN" altLang="en-US" sz="3200" dirty="0">
+              <a:latin typeface="Times New Roman" panose="02020603050405020304" pitchFamily="18" charset="0"/>
+              <a:cs typeface="Times New Roman" panose="02020603050405020304" pitchFamily="18" charset="0"/>
+            </a:endParaRPr>
+          </a:p>
+        </p:txBody>
+      </p:sp>
+      <p:cxnSp>
+        <p:nvCxnSpPr>
+          <p:cNvPr id="93" name="直接箭头连接符 92">
+            <a:extLst>
+              <a:ext uri="{FF2B5EF4-FFF2-40B4-BE49-F238E27FC236}">
+                <a16:creationId xmlns:a16="http://schemas.microsoft.com/office/drawing/2014/main" id="{6D0153D4-6A0D-45E6-8D87-56A36840BC33}"/>
+              </a:ext>
+            </a:extLst>
+          </p:cNvPr>
+          <p:cNvCxnSpPr>
+            <a:cxnSpLocks/>
+          </p:cNvCxnSpPr>
+          <p:nvPr/>
+        </p:nvCxnSpPr>
+        <p:spPr>
+          <a:xfrm flipH="1">
+            <a:off x="9666516" y="5575255"/>
+            <a:ext cx="847491" cy="7855"/>
+          </a:xfrm>
+          <a:prstGeom prst="straightConnector1">
+            <a:avLst/>
+          </a:prstGeom>
+          <a:ln w="12700">
+            <a:solidFill>
+              <a:schemeClr val="tx1"/>
+            </a:solidFill>
+            <a:tailEnd type="triangle"/>
+          </a:ln>
+        </p:spPr>
+        <p:style>
+          <a:lnRef idx="1">
+            <a:schemeClr val="accent1"/>
+          </a:lnRef>
+          <a:fillRef idx="0">
+            <a:schemeClr val="accent1"/>
+          </a:fillRef>
+          <a:effectRef idx="0">
+            <a:schemeClr val="accent1"/>
+          </a:effectRef>
+          <a:fontRef idx="minor">
+            <a:schemeClr val="tx1"/>
+          </a:fontRef>
+        </p:style>
+      </p:cxnSp>
+      <p:sp>
+        <p:nvSpPr>
+          <p:cNvPr id="96" name="文本框 95">
+            <a:extLst>
+              <a:ext uri="{FF2B5EF4-FFF2-40B4-BE49-F238E27FC236}">
+                <a16:creationId xmlns:a16="http://schemas.microsoft.com/office/drawing/2014/main" id="{F0DE2FAC-F429-47CB-90B9-97CA875A89DA}"/>
+              </a:ext>
+            </a:extLst>
+          </p:cNvPr>
+          <p:cNvSpPr txBox="1"/>
+          <p:nvPr/>
+        </p:nvSpPr>
+        <p:spPr>
+          <a:xfrm>
+            <a:off x="9588751" y="5254364"/>
+            <a:ext cx="1082278" cy="369332"/>
+          </a:xfrm>
+          <a:prstGeom prst="rect">
+            <a:avLst/>
+          </a:prstGeom>
+          <a:noFill/>
+        </p:spPr>
+        <p:txBody>
+          <a:bodyPr wrap="square" rtlCol="0">
+            <a:spAutoFit/>
+          </a:bodyPr>
+          <a:lstStyle/>
+          <a:p>
+            <a:r>
+              <a:rPr lang="en-US" altLang="zh-CN" dirty="0">
+                <a:latin typeface="Times New Roman" panose="02020603050405020304" pitchFamily="18" charset="0"/>
+                <a:cs typeface="Times New Roman" panose="02020603050405020304" pitchFamily="18" charset="0"/>
+              </a:rPr>
+              <a:t>Schedule</a:t>
+            </a:r>
+            <a:endParaRPr lang="zh-CN" altLang="en-US" dirty="0">
+              <a:latin typeface="Times New Roman" panose="02020603050405020304" pitchFamily="18" charset="0"/>
+              <a:cs typeface="Times New Roman" panose="02020603050405020304" pitchFamily="18" charset="0"/>
+            </a:endParaRPr>
+          </a:p>
+        </p:txBody>
+      </p:sp>
+      <p:cxnSp>
+        <p:nvCxnSpPr>
+          <p:cNvPr id="99" name="直接箭头连接符 98">
+            <a:extLst>
+              <a:ext uri="{FF2B5EF4-FFF2-40B4-BE49-F238E27FC236}">
+                <a16:creationId xmlns:a16="http://schemas.microsoft.com/office/drawing/2014/main" id="{9102AF58-2C3F-47C7-9F2B-E484E6B4228F}"/>
+              </a:ext>
+            </a:extLst>
+          </p:cNvPr>
+          <p:cNvCxnSpPr>
+            <a:cxnSpLocks/>
+            <a:stCxn id="78" idx="2"/>
+            <a:endCxn id="90" idx="0"/>
+          </p:cNvCxnSpPr>
+          <p:nvPr/>
+        </p:nvCxnSpPr>
+        <p:spPr>
+          <a:xfrm flipH="1">
+            <a:off x="11064553" y="4829173"/>
+            <a:ext cx="4105" cy="314264"/>
+          </a:xfrm>
+          <a:prstGeom prst="straightConnector1">
+            <a:avLst/>
+          </a:prstGeom>
+          <a:ln w="12700">
+            <a:solidFill>
+              <a:schemeClr val="tx1"/>
+            </a:solidFill>
+            <a:tailEnd type="triangle"/>
+          </a:ln>
+        </p:spPr>
+        <p:style>
+          <a:lnRef idx="1">
+            <a:schemeClr val="accent1"/>
+          </a:lnRef>
+          <a:fillRef idx="0">
+            <a:schemeClr val="accent1"/>
+          </a:fillRef>
+          <a:effectRef idx="0">
+            <a:schemeClr val="accent1"/>
+          </a:effectRef>
+          <a:fontRef idx="minor">
+            <a:schemeClr val="tx1"/>
+          </a:fontRef>
+        </p:style>
+      </p:cxnSp>
+      <p:sp>
+        <p:nvSpPr>
+          <p:cNvPr id="102" name="矩形: 圆角 101">
+            <a:extLst>
+              <a:ext uri="{FF2B5EF4-FFF2-40B4-BE49-F238E27FC236}">
+                <a16:creationId xmlns:a16="http://schemas.microsoft.com/office/drawing/2014/main" id="{923A90EF-2627-4EDF-91A2-51D65797EE4C}"/>
+              </a:ext>
+            </a:extLst>
+          </p:cNvPr>
+          <p:cNvSpPr/>
+          <p:nvPr/>
+        </p:nvSpPr>
+        <p:spPr>
+          <a:xfrm>
+            <a:off x="8095568" y="4090453"/>
+            <a:ext cx="1164173" cy="738720"/>
+          </a:xfrm>
+          <a:prstGeom prst="roundRect">
+            <a:avLst>
+              <a:gd name="adj" fmla="val 5602"/>
+            </a:avLst>
+          </a:prstGeom>
+          <a:solidFill>
+            <a:schemeClr val="bg1"/>
+          </a:solidFill>
+          <a:ln>
+            <a:solidFill>
+              <a:schemeClr val="tx1"/>
+            </a:solidFill>
+          </a:ln>
+        </p:spPr>
+        <p:style>
+          <a:lnRef idx="2">
+            <a:schemeClr val="accent1">
+              <a:shade val="50000"/>
+            </a:schemeClr>
+          </a:lnRef>
+          <a:fillRef idx="1">
+            <a:schemeClr val="accent1"/>
+          </a:fillRef>
+          <a:effectRef idx="0">
+            <a:schemeClr val="accent1"/>
+          </a:effectRef>
+          <a:fontRef idx="minor">
+            <a:schemeClr val="lt1"/>
+          </a:fontRef>
+        </p:style>
+        <p:txBody>
+          <a:bodyPr rtlCol="0" anchor="ctr"/>
+          <a:lstStyle/>
+          <a:p>
+            <a:pPr algn="ctr"/>
+            <a:r>
+              <a:rPr lang="en-US" altLang="zh-CN" dirty="0">
+                <a:solidFill>
+                  <a:schemeClr val="tx1"/>
+                </a:solidFill>
+                <a:latin typeface="Times New Roman" panose="02020603050405020304" pitchFamily="18" charset="0"/>
+                <a:cs typeface="Times New Roman" panose="02020603050405020304" pitchFamily="18" charset="0"/>
+              </a:rPr>
+              <a:t>Systems</a:t>
+            </a:r>
+            <a:endParaRPr lang="zh-CN" altLang="en-US" dirty="0">
+              <a:solidFill>
+                <a:schemeClr val="tx1"/>
+              </a:solidFill>
+              <a:latin typeface="Times New Roman" panose="02020603050405020304" pitchFamily="18" charset="0"/>
+              <a:cs typeface="Times New Roman" panose="02020603050405020304" pitchFamily="18" charset="0"/>
+            </a:endParaRPr>
+          </a:p>
+        </p:txBody>
+      </p:sp>
+      <p:sp>
+        <p:nvSpPr>
+          <p:cNvPr id="103" name="文本框 102">
+            <a:extLst>
+              <a:ext uri="{FF2B5EF4-FFF2-40B4-BE49-F238E27FC236}">
+                <a16:creationId xmlns:a16="http://schemas.microsoft.com/office/drawing/2014/main" id="{0C2E7AE2-C462-4179-8E36-A82F03A76D93}"/>
+              </a:ext>
+            </a:extLst>
+          </p:cNvPr>
+          <p:cNvSpPr txBox="1"/>
+          <p:nvPr/>
+        </p:nvSpPr>
+        <p:spPr>
+          <a:xfrm>
+            <a:off x="4411212" y="5706312"/>
+            <a:ext cx="765336" cy="369332"/>
+          </a:xfrm>
+          <a:prstGeom prst="rect">
+            <a:avLst/>
+          </a:prstGeom>
+          <a:noFill/>
+        </p:spPr>
+        <p:txBody>
+          <a:bodyPr wrap="square" rtlCol="0">
+            <a:spAutoFit/>
+          </a:bodyPr>
+          <a:lstStyle/>
+          <a:p>
+            <a:r>
+              <a:rPr lang="en-US" altLang="zh-CN" dirty="0">
+                <a:latin typeface="Times New Roman" panose="02020603050405020304" pitchFamily="18" charset="0"/>
+                <a:cs typeface="Times New Roman" panose="02020603050405020304" pitchFamily="18" charset="0"/>
+              </a:rPr>
               <a:t>GPU</a:t>
             </a:r>
             <a:endParaRPr lang="zh-CN" altLang="en-US" dirty="0">
+              <a:latin typeface="Times New Roman" panose="02020603050405020304" pitchFamily="18" charset="0"/>
+              <a:cs typeface="Times New Roman" panose="02020603050405020304" pitchFamily="18" charset="0"/>
+            </a:endParaRPr>
+          </a:p>
+        </p:txBody>
+      </p:sp>
+      <p:sp>
+        <p:nvSpPr>
+          <p:cNvPr id="105" name="文本框 104">
+            <a:extLst>
+              <a:ext uri="{FF2B5EF4-FFF2-40B4-BE49-F238E27FC236}">
+                <a16:creationId xmlns:a16="http://schemas.microsoft.com/office/drawing/2014/main" id="{978969CA-3677-4646-96D6-2B1D3FBF3703}"/>
+              </a:ext>
+            </a:extLst>
+          </p:cNvPr>
+          <p:cNvSpPr txBox="1"/>
+          <p:nvPr/>
+        </p:nvSpPr>
+        <p:spPr>
+          <a:xfrm>
+            <a:off x="4405378" y="4618390"/>
+            <a:ext cx="1514550" cy="369332"/>
+          </a:xfrm>
+          <a:prstGeom prst="rect">
+            <a:avLst/>
+          </a:prstGeom>
+          <a:noFill/>
+        </p:spPr>
+        <p:txBody>
+          <a:bodyPr wrap="square" rtlCol="0">
+            <a:spAutoFit/>
+          </a:bodyPr>
+          <a:lstStyle/>
+          <a:p>
+            <a:r>
+              <a:rPr lang="en-US" altLang="zh-CN" dirty="0">
+                <a:latin typeface="Times New Roman" panose="02020603050405020304" pitchFamily="18" charset="0"/>
+                <a:cs typeface="Times New Roman" panose="02020603050405020304" pitchFamily="18" charset="0"/>
+              </a:rPr>
+              <a:t>Main Progress</a:t>
+            </a:r>
+            <a:endParaRPr lang="zh-CN" altLang="en-US" dirty="0">
+              <a:latin typeface="Times New Roman" panose="02020603050405020304" pitchFamily="18" charset="0"/>
+              <a:cs typeface="Times New Roman" panose="02020603050405020304" pitchFamily="18" charset="0"/>
+            </a:endParaRPr>
+          </a:p>
+        </p:txBody>
+      </p:sp>
+      <p:sp>
+        <p:nvSpPr>
+          <p:cNvPr id="107" name="矩形: 圆角 106">
+            <a:extLst>
+              <a:ext uri="{FF2B5EF4-FFF2-40B4-BE49-F238E27FC236}">
+                <a16:creationId xmlns:a16="http://schemas.microsoft.com/office/drawing/2014/main" id="{CCF32485-5497-405A-A2FD-35ED072B9666}"/>
+              </a:ext>
+            </a:extLst>
+          </p:cNvPr>
+          <p:cNvSpPr/>
+          <p:nvPr/>
+        </p:nvSpPr>
+        <p:spPr>
+          <a:xfrm>
+            <a:off x="5970447" y="4090453"/>
+            <a:ext cx="1252838" cy="738720"/>
+          </a:xfrm>
+          <a:prstGeom prst="roundRect">
+            <a:avLst>
+              <a:gd name="adj" fmla="val 5602"/>
+            </a:avLst>
+          </a:prstGeom>
+          <a:solidFill>
+            <a:schemeClr val="bg1"/>
+          </a:solidFill>
+          <a:ln>
+            <a:solidFill>
+              <a:schemeClr val="tx1"/>
+            </a:solidFill>
+          </a:ln>
+        </p:spPr>
+        <p:style>
+          <a:lnRef idx="2">
+            <a:schemeClr val="accent1">
+              <a:shade val="50000"/>
+            </a:schemeClr>
+          </a:lnRef>
+          <a:fillRef idx="1">
+            <a:schemeClr val="accent1"/>
+          </a:fillRef>
+          <a:effectRef idx="0">
+            <a:schemeClr val="accent1"/>
+          </a:effectRef>
+          <a:fontRef idx="minor">
+            <a:schemeClr val="lt1"/>
+          </a:fontRef>
+        </p:style>
+        <p:txBody>
+          <a:bodyPr rtlCol="0" anchor="ctr"/>
+          <a:lstStyle/>
+          <a:p>
+            <a:pPr algn="ctr"/>
+            <a:r>
+              <a:rPr lang="en-US" altLang="zh-CN" dirty="0">
+                <a:solidFill>
+                  <a:schemeClr val="tx1"/>
+                </a:solidFill>
+                <a:latin typeface="Times New Roman" panose="02020603050405020304" pitchFamily="18" charset="0"/>
+                <a:cs typeface="Times New Roman" panose="02020603050405020304" pitchFamily="18" charset="0"/>
+              </a:rPr>
+              <a:t>Simulation plan</a:t>
+            </a:r>
+            <a:endParaRPr lang="zh-CN" altLang="en-US" dirty="0">
+              <a:solidFill>
+                <a:schemeClr val="tx1"/>
+              </a:solidFill>
+              <a:latin typeface="Times New Roman" panose="02020603050405020304" pitchFamily="18" charset="0"/>
+              <a:cs typeface="Times New Roman" panose="02020603050405020304" pitchFamily="18" charset="0"/>
+            </a:endParaRPr>
+          </a:p>
+        </p:txBody>
+      </p:sp>
+      <p:cxnSp>
+        <p:nvCxnSpPr>
+          <p:cNvPr id="108" name="直接箭头连接符 107">
+            <a:extLst>
+              <a:ext uri="{FF2B5EF4-FFF2-40B4-BE49-F238E27FC236}">
+                <a16:creationId xmlns:a16="http://schemas.microsoft.com/office/drawing/2014/main" id="{0F93B2F8-FAEA-4B50-926A-4F2336248F3F}"/>
+              </a:ext>
+            </a:extLst>
+          </p:cNvPr>
+          <p:cNvCxnSpPr>
+            <a:cxnSpLocks/>
+            <a:stCxn id="102" idx="1"/>
+            <a:endCxn id="107" idx="3"/>
+          </p:cNvCxnSpPr>
+          <p:nvPr/>
+        </p:nvCxnSpPr>
+        <p:spPr>
+          <a:xfrm flipH="1">
+            <a:off x="7223285" y="4459813"/>
+            <a:ext cx="872283" cy="0"/>
+          </a:xfrm>
+          <a:prstGeom prst="straightConnector1">
+            <a:avLst/>
+          </a:prstGeom>
+          <a:ln w="12700">
+            <a:solidFill>
+              <a:schemeClr val="tx1"/>
+            </a:solidFill>
+            <a:tailEnd type="triangle"/>
+          </a:ln>
+        </p:spPr>
+        <p:style>
+          <a:lnRef idx="1">
+            <a:schemeClr val="accent1"/>
+          </a:lnRef>
+          <a:fillRef idx="0">
+            <a:schemeClr val="accent1"/>
+          </a:fillRef>
+          <a:effectRef idx="0">
+            <a:schemeClr val="accent1"/>
+          </a:effectRef>
+          <a:fontRef idx="minor">
+            <a:schemeClr val="tx1"/>
+          </a:fontRef>
+        </p:style>
+      </p:cxnSp>
+      <p:cxnSp>
+        <p:nvCxnSpPr>
+          <p:cNvPr id="109" name="直接箭头连接符 108">
+            <a:extLst>
+              <a:ext uri="{FF2B5EF4-FFF2-40B4-BE49-F238E27FC236}">
+                <a16:creationId xmlns:a16="http://schemas.microsoft.com/office/drawing/2014/main" id="{7B678D8C-5CE8-49B3-9509-6D614908E6AA}"/>
+              </a:ext>
+            </a:extLst>
+          </p:cNvPr>
+          <p:cNvCxnSpPr>
+            <a:cxnSpLocks/>
+            <a:stCxn id="102" idx="3"/>
+            <a:endCxn id="78" idx="1"/>
+          </p:cNvCxnSpPr>
+          <p:nvPr/>
+        </p:nvCxnSpPr>
+        <p:spPr>
+          <a:xfrm>
+            <a:off x="9259741" y="4459813"/>
+            <a:ext cx="1226830" cy="0"/>
+          </a:xfrm>
+          <a:prstGeom prst="straightConnector1">
+            <a:avLst/>
+          </a:prstGeom>
+          <a:ln w="12700">
+            <a:solidFill>
+              <a:schemeClr val="tx1"/>
+            </a:solidFill>
+            <a:tailEnd type="triangle"/>
+          </a:ln>
+        </p:spPr>
+        <p:style>
+          <a:lnRef idx="1">
+            <a:schemeClr val="accent1"/>
+          </a:lnRef>
+          <a:fillRef idx="0">
+            <a:schemeClr val="accent1"/>
+          </a:fillRef>
+          <a:effectRef idx="0">
+            <a:schemeClr val="accent1"/>
+          </a:effectRef>
+          <a:fontRef idx="minor">
+            <a:schemeClr val="tx1"/>
+          </a:fontRef>
+        </p:style>
+      </p:cxnSp>
+      <p:sp>
+        <p:nvSpPr>
+          <p:cNvPr id="118" name="文本框 117">
+            <a:extLst>
+              <a:ext uri="{FF2B5EF4-FFF2-40B4-BE49-F238E27FC236}">
+                <a16:creationId xmlns:a16="http://schemas.microsoft.com/office/drawing/2014/main" id="{B720AC22-AD2F-496F-90AB-A8B6ED0393E0}"/>
+              </a:ext>
+            </a:extLst>
+          </p:cNvPr>
+          <p:cNvSpPr txBox="1"/>
+          <p:nvPr/>
+        </p:nvSpPr>
+        <p:spPr>
+          <a:xfrm>
+            <a:off x="9383847" y="3890659"/>
+            <a:ext cx="1138063" cy="584775"/>
+          </a:xfrm>
+          <a:prstGeom prst="rect">
+            <a:avLst/>
+          </a:prstGeom>
+          <a:noFill/>
+        </p:spPr>
+        <p:txBody>
+          <a:bodyPr wrap="square" rtlCol="0">
+            <a:spAutoFit/>
+          </a:bodyPr>
+          <a:lstStyle/>
+          <a:p>
+            <a:pPr algn="ctr"/>
+            <a:r>
+              <a:rPr lang="en-US" altLang="zh-CN" sz="1600" dirty="0">
+                <a:latin typeface="Times New Roman" panose="02020603050405020304" pitchFamily="18" charset="0"/>
+                <a:cs typeface="Times New Roman" panose="02020603050405020304" pitchFamily="18" charset="0"/>
+              </a:rPr>
+              <a:t>Repetitive Tasks</a:t>
+            </a:r>
+            <a:endParaRPr lang="zh-CN" altLang="en-US" sz="1600" dirty="0">
+              <a:latin typeface="Times New Roman" panose="02020603050405020304" pitchFamily="18" charset="0"/>
+              <a:cs typeface="Times New Roman" panose="02020603050405020304" pitchFamily="18" charset="0"/>
+            </a:endParaRPr>
+          </a:p>
+        </p:txBody>
+      </p:sp>
+      <p:sp>
+        <p:nvSpPr>
+          <p:cNvPr id="120" name="文本框 119">
+            <a:extLst>
+              <a:ext uri="{FF2B5EF4-FFF2-40B4-BE49-F238E27FC236}">
+                <a16:creationId xmlns:a16="http://schemas.microsoft.com/office/drawing/2014/main" id="{F49C7A1C-2B7F-4E5E-A921-855174127741}"/>
+              </a:ext>
+            </a:extLst>
+          </p:cNvPr>
+          <p:cNvSpPr txBox="1"/>
+          <p:nvPr/>
+        </p:nvSpPr>
+        <p:spPr>
+          <a:xfrm>
+            <a:off x="7114671" y="4164253"/>
+            <a:ext cx="1138063" cy="338554"/>
+          </a:xfrm>
+          <a:prstGeom prst="rect">
+            <a:avLst/>
+          </a:prstGeom>
+          <a:noFill/>
+        </p:spPr>
+        <p:txBody>
+          <a:bodyPr wrap="square" rtlCol="0">
+            <a:spAutoFit/>
+          </a:bodyPr>
+          <a:lstStyle/>
+          <a:p>
+            <a:pPr algn="ctr"/>
+            <a:r>
+              <a:rPr lang="en-US" altLang="zh-CN" sz="1600" dirty="0">
+                <a:latin typeface="Times New Roman" panose="02020603050405020304" pitchFamily="18" charset="0"/>
+                <a:cs typeface="Times New Roman" panose="02020603050405020304" pitchFamily="18" charset="0"/>
+              </a:rPr>
+              <a:t>Formulate</a:t>
+            </a:r>
+            <a:endParaRPr lang="zh-CN" altLang="en-US" sz="1600" dirty="0">
               <a:latin typeface="Times New Roman" panose="02020603050405020304" pitchFamily="18" charset="0"/>
               <a:cs typeface="Times New Roman" panose="02020603050405020304" pitchFamily="18" charset="0"/>
             </a:endParaRPr>

</xml_diff>

<commit_message>
vault backup: 2023-09-18 09:19:41
</commit_message>
<xml_diff>
--- a/OS/DONS/FES.pptx
+++ b/OS/DONS/FES.pptx
@@ -205,7 +205,7 @@
           <a:p>
             <a:fld id="{DC8DF830-0B68-4DA1-B7F1-3F604F3412E2}" type="datetimeFigureOut">
               <a:rPr lang="zh-CN" altLang="en-US" smtClean="0"/>
-              <a:t>2023/9/17</a:t>
+              <a:t>2023/9/18</a:t>
             </a:fld>
             <a:endParaRPr lang="zh-CN" altLang="en-US"/>
           </a:p>
@@ -521,60 +521,6 @@
           <a:bodyPr/>
           <a:lstStyle/>
           <a:p>
-            <a:r>
-              <a:rPr kumimoji="1" lang="zh-CN" altLang="en-US" dirty="0"/>
-              <a:t>十四五规划：</a:t>
-            </a:r>
-            <a:r>
-              <a:rPr lang="zh-CN" altLang="en-US" dirty="0">
-                <a:solidFill>
-                  <a:srgbClr val="000000"/>
-                </a:solidFill>
-                <a:latin typeface="Microsoft YaHei" panose="020B0503020204020204" pitchFamily="34" charset="-122"/>
-                <a:ea typeface="Microsoft YaHei" panose="020B0503020204020204" pitchFamily="34" charset="-122"/>
-              </a:rPr>
-              <a:t>专栏</a:t>
-            </a:r>
-            <a:r>
-              <a:rPr lang="en-US" altLang="zh-CN" dirty="0">
-                <a:solidFill>
-                  <a:srgbClr val="000000"/>
-                </a:solidFill>
-                <a:latin typeface="Microsoft YaHei" panose="020B0503020204020204" pitchFamily="34" charset="-122"/>
-                <a:ea typeface="Microsoft YaHei" panose="020B0503020204020204" pitchFamily="34" charset="-122"/>
-              </a:rPr>
-              <a:t>8</a:t>
-            </a:r>
-            <a:r>
-              <a:rPr lang="zh-CN" altLang="en-US" dirty="0">
-                <a:solidFill>
-                  <a:srgbClr val="000000"/>
-                </a:solidFill>
-                <a:latin typeface="Microsoft YaHei" panose="020B0503020204020204" pitchFamily="34" charset="-122"/>
-                <a:ea typeface="Microsoft YaHei" panose="020B0503020204020204" pitchFamily="34" charset="-122"/>
-              </a:rPr>
-              <a:t>：数字经济重点产业，专栏</a:t>
-            </a:r>
-            <a:r>
-              <a:rPr lang="en-US" altLang="zh-CN" dirty="0">
-                <a:solidFill>
-                  <a:srgbClr val="000000"/>
-                </a:solidFill>
-                <a:latin typeface="Microsoft YaHei" panose="020B0503020204020204" pitchFamily="34" charset="-122"/>
-                <a:ea typeface="Microsoft YaHei" panose="020B0503020204020204" pitchFamily="34" charset="-122"/>
-              </a:rPr>
-              <a:t>9</a:t>
-            </a:r>
-            <a:r>
-              <a:rPr lang="zh-CN" altLang="en-US" dirty="0">
-                <a:solidFill>
-                  <a:srgbClr val="000000"/>
-                </a:solidFill>
-                <a:latin typeface="Microsoft YaHei" panose="020B0503020204020204" pitchFamily="34" charset="-122"/>
-                <a:ea typeface="Microsoft YaHei" panose="020B0503020204020204" pitchFamily="34" charset="-122"/>
-              </a:rPr>
-              <a:t>：数字化应用场景</a:t>
-            </a:r>
             <a:endParaRPr lang="zh-CN" altLang="en-US" dirty="0"/>
           </a:p>
         </p:txBody>
@@ -666,60 +612,29 @@
           <a:lstStyle/>
           <a:p>
             <a:r>
-              <a:rPr kumimoji="1" lang="zh-CN" altLang="en-US" dirty="0"/>
-              <a:t>十四五规划：</a:t>
-            </a:r>
-            <a:r>
-              <a:rPr lang="zh-CN" altLang="en-US" dirty="0">
-                <a:solidFill>
-                  <a:srgbClr val="000000"/>
-                </a:solidFill>
-                <a:latin typeface="Microsoft YaHei" panose="020B0503020204020204" pitchFamily="34" charset="-122"/>
-                <a:ea typeface="Microsoft YaHei" panose="020B0503020204020204" pitchFamily="34" charset="-122"/>
-              </a:rPr>
-              <a:t>专栏</a:t>
-            </a:r>
-            <a:r>
-              <a:rPr lang="en-US" altLang="zh-CN" dirty="0">
-                <a:solidFill>
-                  <a:srgbClr val="000000"/>
-                </a:solidFill>
-                <a:latin typeface="Microsoft YaHei" panose="020B0503020204020204" pitchFamily="34" charset="-122"/>
-                <a:ea typeface="Microsoft YaHei" panose="020B0503020204020204" pitchFamily="34" charset="-122"/>
-              </a:rPr>
-              <a:t>8</a:t>
-            </a:r>
-            <a:r>
-              <a:rPr lang="zh-CN" altLang="en-US" dirty="0">
-                <a:solidFill>
-                  <a:srgbClr val="000000"/>
-                </a:solidFill>
-                <a:latin typeface="Microsoft YaHei" panose="020B0503020204020204" pitchFamily="34" charset="-122"/>
-                <a:ea typeface="Microsoft YaHei" panose="020B0503020204020204" pitchFamily="34" charset="-122"/>
-              </a:rPr>
-              <a:t>：数字经济重点产业，专栏</a:t>
-            </a:r>
-            <a:r>
-              <a:rPr lang="en-US" altLang="zh-CN" dirty="0">
-                <a:solidFill>
-                  <a:srgbClr val="000000"/>
-                </a:solidFill>
-                <a:latin typeface="Microsoft YaHei" panose="020B0503020204020204" pitchFamily="34" charset="-122"/>
-                <a:ea typeface="Microsoft YaHei" panose="020B0503020204020204" pitchFamily="34" charset="-122"/>
-              </a:rPr>
-              <a:t>9</a:t>
-            </a:r>
-            <a:r>
-              <a:rPr lang="zh-CN" altLang="en-US" dirty="0">
-                <a:solidFill>
-                  <a:srgbClr val="000000"/>
-                </a:solidFill>
-                <a:latin typeface="Microsoft YaHei" panose="020B0503020204020204" pitchFamily="34" charset="-122"/>
-                <a:ea typeface="Microsoft YaHei" panose="020B0503020204020204" pitchFamily="34" charset="-122"/>
-              </a:rPr>
-              <a:t>：数字化应用场景</a:t>
-            </a:r>
-            <a:endParaRPr lang="zh-CN" altLang="en-US" dirty="0"/>
+              <a:rPr lang="en-US" altLang="zh-CN" dirty="0"/>
+              <a:t>1)</a:t>
+            </a:r>
+            <a:r>
+              <a:rPr lang="zh-CN" altLang="en-US" dirty="0"/>
+              <a:t>串行执行 </a:t>
+            </a:r>
+            <a:r>
+              <a:rPr lang="en-US" altLang="zh-CN" dirty="0"/>
+              <a:t>2</a:t>
+            </a:r>
+            <a:r>
+              <a:rPr lang="zh-CN" altLang="en-US" dirty="0"/>
+              <a:t>）面向对象设计 </a:t>
+            </a:r>
+            <a:r>
+              <a:rPr lang="en-US" altLang="zh-CN" dirty="0"/>
+              <a:t>3</a:t>
+            </a:r>
+            <a:r>
+              <a:rPr lang="zh-CN" altLang="en-US" dirty="0"/>
+              <a:t>）划分子网，每个逻辑进程模拟一个子网</a:t>
+            </a:r>
           </a:p>
         </p:txBody>
       </p:sp>
@@ -810,60 +725,56 @@
           <a:lstStyle/>
           <a:p>
             <a:r>
-              <a:rPr kumimoji="1" lang="zh-CN" altLang="en-US" dirty="0"/>
-              <a:t>十四五规划：</a:t>
-            </a:r>
-            <a:r>
-              <a:rPr lang="zh-CN" altLang="en-US" dirty="0">
-                <a:solidFill>
-                  <a:srgbClr val="000000"/>
-                </a:solidFill>
-                <a:latin typeface="Microsoft YaHei" panose="020B0503020204020204" pitchFamily="34" charset="-122"/>
-                <a:ea typeface="Microsoft YaHei" panose="020B0503020204020204" pitchFamily="34" charset="-122"/>
-              </a:rPr>
-              <a:t>专栏</a:t>
-            </a:r>
-            <a:r>
-              <a:rPr lang="en-US" altLang="zh-CN" dirty="0">
-                <a:solidFill>
-                  <a:srgbClr val="000000"/>
-                </a:solidFill>
-                <a:latin typeface="Microsoft YaHei" panose="020B0503020204020204" pitchFamily="34" charset="-122"/>
-                <a:ea typeface="Microsoft YaHei" panose="020B0503020204020204" pitchFamily="34" charset="-122"/>
-              </a:rPr>
-              <a:t>8</a:t>
-            </a:r>
-            <a:r>
-              <a:rPr lang="zh-CN" altLang="en-US" dirty="0">
-                <a:solidFill>
-                  <a:srgbClr val="000000"/>
-                </a:solidFill>
-                <a:latin typeface="Microsoft YaHei" panose="020B0503020204020204" pitchFamily="34" charset="-122"/>
-                <a:ea typeface="Microsoft YaHei" panose="020B0503020204020204" pitchFamily="34" charset="-122"/>
-              </a:rPr>
-              <a:t>：数字经济重点产业，专栏</a:t>
-            </a:r>
-            <a:r>
-              <a:rPr lang="en-US" altLang="zh-CN" dirty="0">
-                <a:solidFill>
-                  <a:srgbClr val="000000"/>
-                </a:solidFill>
-                <a:latin typeface="Microsoft YaHei" panose="020B0503020204020204" pitchFamily="34" charset="-122"/>
-                <a:ea typeface="Microsoft YaHei" panose="020B0503020204020204" pitchFamily="34" charset="-122"/>
-              </a:rPr>
-              <a:t>9</a:t>
-            </a:r>
-            <a:r>
-              <a:rPr lang="zh-CN" altLang="en-US" dirty="0">
-                <a:solidFill>
-                  <a:srgbClr val="000000"/>
-                </a:solidFill>
-                <a:latin typeface="Microsoft YaHei" panose="020B0503020204020204" pitchFamily="34" charset="-122"/>
-                <a:ea typeface="Microsoft YaHei" panose="020B0503020204020204" pitchFamily="34" charset="-122"/>
-              </a:rPr>
-              <a:t>：数字化应用场景</a:t>
-            </a:r>
-            <a:endParaRPr lang="zh-CN" altLang="en-US" dirty="0"/>
+              <a:rPr lang="en-US" altLang="zh-CN" dirty="0"/>
+              <a:t>1</a:t>
+            </a:r>
+            <a:r>
+              <a:rPr lang="zh-CN" altLang="en-US" dirty="0"/>
+              <a:t>）</a:t>
+            </a:r>
+            <a:r>
+              <a:rPr lang="en-US" altLang="zh-CN" dirty="0"/>
+              <a:t>DES</a:t>
+            </a:r>
+            <a:r>
+              <a:rPr lang="zh-CN" altLang="en-US" dirty="0"/>
+              <a:t> </a:t>
+            </a:r>
+            <a:r>
+              <a:rPr lang="en-US" altLang="zh-CN" dirty="0"/>
+              <a:t>simulator</a:t>
+            </a:r>
+            <a:r>
+              <a:rPr lang="zh-CN" altLang="en-US" dirty="0"/>
+              <a:t>采用单进程单线程的实现，这意味着他只能调度到一个</a:t>
+            </a:r>
+            <a:r>
+              <a:rPr lang="en-US" altLang="zh-CN" dirty="0"/>
+              <a:t>CPU</a:t>
+            </a:r>
+            <a:r>
+              <a:rPr lang="zh-CN" altLang="en-US" dirty="0"/>
+              <a:t>核上</a:t>
+            </a:r>
+            <a:endParaRPr lang="en-US" altLang="zh-CN" dirty="0"/>
+          </a:p>
+          <a:p>
+            <a:r>
+              <a:rPr lang="en-US" altLang="zh-CN" dirty="0"/>
+              <a:t>2</a:t>
+            </a:r>
+            <a:r>
+              <a:rPr lang="zh-CN" altLang="en-US" dirty="0"/>
+              <a:t>）面向对象的设计降低了</a:t>
+            </a:r>
+            <a:r>
+              <a:rPr lang="en-US" altLang="zh-CN" dirty="0"/>
+              <a:t>cache</a:t>
+            </a:r>
+            <a:r>
+              <a:rPr lang="zh-CN" altLang="en-US" dirty="0"/>
+              <a:t>的命中率，两方面原因，一方面同类型的数据分散存储在内存中，另一方面在封装的内存的只有部分信息是有用的</a:t>
+            </a:r>
           </a:p>
         </p:txBody>
       </p:sp>
@@ -954,60 +865,40 @@
           <a:lstStyle/>
           <a:p>
             <a:r>
-              <a:rPr kumimoji="1" lang="zh-CN" altLang="en-US" dirty="0"/>
-              <a:t>十四五规划：</a:t>
-            </a:r>
-            <a:r>
-              <a:rPr lang="zh-CN" altLang="en-US" dirty="0">
-                <a:solidFill>
-                  <a:srgbClr val="000000"/>
-                </a:solidFill>
-                <a:latin typeface="Microsoft YaHei" panose="020B0503020204020204" pitchFamily="34" charset="-122"/>
-                <a:ea typeface="Microsoft YaHei" panose="020B0503020204020204" pitchFamily="34" charset="-122"/>
-              </a:rPr>
-              <a:t>专栏</a:t>
-            </a:r>
-            <a:r>
-              <a:rPr lang="en-US" altLang="zh-CN" dirty="0">
-                <a:solidFill>
-                  <a:srgbClr val="000000"/>
-                </a:solidFill>
-                <a:latin typeface="Microsoft YaHei" panose="020B0503020204020204" pitchFamily="34" charset="-122"/>
-                <a:ea typeface="Microsoft YaHei" panose="020B0503020204020204" pitchFamily="34" charset="-122"/>
-              </a:rPr>
-              <a:t>8</a:t>
-            </a:r>
-            <a:r>
-              <a:rPr lang="zh-CN" altLang="en-US" dirty="0">
-                <a:solidFill>
-                  <a:srgbClr val="000000"/>
-                </a:solidFill>
-                <a:latin typeface="Microsoft YaHei" panose="020B0503020204020204" pitchFamily="34" charset="-122"/>
-                <a:ea typeface="Microsoft YaHei" panose="020B0503020204020204" pitchFamily="34" charset="-122"/>
-              </a:rPr>
-              <a:t>：数字经济重点产业，专栏</a:t>
-            </a:r>
-            <a:r>
-              <a:rPr lang="en-US" altLang="zh-CN" dirty="0">
-                <a:solidFill>
-                  <a:srgbClr val="000000"/>
-                </a:solidFill>
-                <a:latin typeface="Microsoft YaHei" panose="020B0503020204020204" pitchFamily="34" charset="-122"/>
-                <a:ea typeface="Microsoft YaHei" panose="020B0503020204020204" pitchFamily="34" charset="-122"/>
-              </a:rPr>
-              <a:t>9</a:t>
-            </a:r>
-            <a:r>
-              <a:rPr lang="zh-CN" altLang="en-US" dirty="0">
-                <a:solidFill>
-                  <a:srgbClr val="000000"/>
-                </a:solidFill>
-                <a:latin typeface="Microsoft YaHei" panose="020B0503020204020204" pitchFamily="34" charset="-122"/>
-                <a:ea typeface="Microsoft YaHei" panose="020B0503020204020204" pitchFamily="34" charset="-122"/>
-              </a:rPr>
-              <a:t>：数字化应用场景</a:t>
-            </a:r>
-            <a:endParaRPr lang="zh-CN" altLang="en-US" dirty="0"/>
+              <a:rPr lang="en-US" altLang="zh-CN" dirty="0"/>
+              <a:t>1</a:t>
+            </a:r>
+            <a:r>
+              <a:rPr lang="zh-CN" altLang="en-US" dirty="0"/>
+              <a:t>）每个</a:t>
+            </a:r>
+            <a:r>
+              <a:rPr lang="en-US" altLang="zh-CN" dirty="0"/>
+              <a:t>LP</a:t>
+            </a:r>
+            <a:r>
+              <a:rPr lang="zh-CN" altLang="en-US" dirty="0"/>
+              <a:t>都有整个网络的数据拷贝</a:t>
+            </a:r>
+            <a:endParaRPr lang="en-US" altLang="zh-CN" dirty="0"/>
+          </a:p>
+          <a:p>
+            <a:r>
+              <a:rPr lang="en-US" altLang="zh-CN" dirty="0"/>
+              <a:t>2</a:t>
+            </a:r>
+            <a:r>
+              <a:rPr lang="zh-CN" altLang="en-US" dirty="0"/>
+              <a:t>）大量开销用于</a:t>
+            </a:r>
+            <a:r>
+              <a:rPr lang="en-US" altLang="zh-CN" dirty="0"/>
+              <a:t>LP</a:t>
+            </a:r>
+            <a:r>
+              <a:rPr lang="zh-CN" altLang="en-US" dirty="0"/>
+              <a:t>之间的时间同步和数据同步</a:t>
+            </a:r>
           </a:p>
         </p:txBody>
       </p:sp>
@@ -1098,60 +989,32 @@
           <a:lstStyle/>
           <a:p>
             <a:r>
-              <a:rPr kumimoji="1" lang="zh-CN" altLang="en-US" dirty="0"/>
-              <a:t>十四五规划：</a:t>
-            </a:r>
-            <a:r>
-              <a:rPr lang="zh-CN" altLang="en-US" dirty="0">
-                <a:solidFill>
-                  <a:srgbClr val="000000"/>
-                </a:solidFill>
-                <a:latin typeface="Microsoft YaHei" panose="020B0503020204020204" pitchFamily="34" charset="-122"/>
-                <a:ea typeface="Microsoft YaHei" panose="020B0503020204020204" pitchFamily="34" charset="-122"/>
-              </a:rPr>
-              <a:t>专栏</a:t>
-            </a:r>
-            <a:r>
-              <a:rPr lang="en-US" altLang="zh-CN" dirty="0">
-                <a:solidFill>
-                  <a:srgbClr val="000000"/>
-                </a:solidFill>
-                <a:latin typeface="Microsoft YaHei" panose="020B0503020204020204" pitchFamily="34" charset="-122"/>
-                <a:ea typeface="Microsoft YaHei" panose="020B0503020204020204" pitchFamily="34" charset="-122"/>
-              </a:rPr>
-              <a:t>8</a:t>
-            </a:r>
-            <a:r>
-              <a:rPr lang="zh-CN" altLang="en-US" dirty="0">
-                <a:solidFill>
-                  <a:srgbClr val="000000"/>
-                </a:solidFill>
-                <a:latin typeface="Microsoft YaHei" panose="020B0503020204020204" pitchFamily="34" charset="-122"/>
-                <a:ea typeface="Microsoft YaHei" panose="020B0503020204020204" pitchFamily="34" charset="-122"/>
-              </a:rPr>
-              <a:t>：数字经济重点产业，专栏</a:t>
-            </a:r>
-            <a:r>
-              <a:rPr lang="en-US" altLang="zh-CN" dirty="0">
-                <a:solidFill>
-                  <a:srgbClr val="000000"/>
-                </a:solidFill>
-                <a:latin typeface="Microsoft YaHei" panose="020B0503020204020204" pitchFamily="34" charset="-122"/>
-                <a:ea typeface="Microsoft YaHei" panose="020B0503020204020204" pitchFamily="34" charset="-122"/>
-              </a:rPr>
-              <a:t>9</a:t>
-            </a:r>
-            <a:r>
-              <a:rPr lang="zh-CN" altLang="en-US" dirty="0">
-                <a:solidFill>
-                  <a:srgbClr val="000000"/>
-                </a:solidFill>
-                <a:latin typeface="Microsoft YaHei" panose="020B0503020204020204" pitchFamily="34" charset="-122"/>
-                <a:ea typeface="Microsoft YaHei" panose="020B0503020204020204" pitchFamily="34" charset="-122"/>
-              </a:rPr>
-              <a:t>：数字化应用场景</a:t>
-            </a:r>
-            <a:endParaRPr lang="zh-CN" altLang="en-US" dirty="0"/>
+              <a:rPr lang="en-US" altLang="zh-CN" dirty="0"/>
+              <a:t>1</a:t>
+            </a:r>
+            <a:r>
+              <a:rPr lang="zh-CN" altLang="en-US" dirty="0"/>
+              <a:t>）面向数据流的设计，核心观点是将同类型的数据放在一起</a:t>
+            </a:r>
+            <a:endParaRPr lang="en-US" altLang="zh-CN" dirty="0"/>
+          </a:p>
+          <a:p>
+            <a:r>
+              <a:rPr lang="en-US" altLang="zh-CN" dirty="0"/>
+              <a:t>2</a:t>
+            </a:r>
+            <a:r>
+              <a:rPr lang="zh-CN" altLang="en-US" dirty="0"/>
+              <a:t>）基于线程池的并行，根据网络行为将离散事件分为</a:t>
+            </a:r>
+            <a:r>
+              <a:rPr lang="en-US" altLang="zh-CN" dirty="0"/>
+              <a:t>4</a:t>
+            </a:r>
+            <a:r>
+              <a:rPr lang="zh-CN" altLang="en-US" dirty="0"/>
+              <a:t>类，然后将每类事件分割为可并行的独立集，独立集内部可并行执行</a:t>
+            </a:r>
           </a:p>
         </p:txBody>
       </p:sp>
@@ -1771,7 +1634,7 @@
           <a:p>
             <a:fld id="{5C67483F-86B4-4181-AEB3-1074CE197F11}" type="datetimeFigureOut">
               <a:rPr lang="zh-CN" altLang="en-US" smtClean="0"/>
-              <a:t>2023/9/17</a:t>
+              <a:t>2023/9/18</a:t>
             </a:fld>
             <a:endParaRPr lang="zh-CN" altLang="en-US"/>
           </a:p>
@@ -1969,7 +1832,7 @@
           <a:p>
             <a:fld id="{5C67483F-86B4-4181-AEB3-1074CE197F11}" type="datetimeFigureOut">
               <a:rPr lang="zh-CN" altLang="en-US" smtClean="0"/>
-              <a:t>2023/9/17</a:t>
+              <a:t>2023/9/18</a:t>
             </a:fld>
             <a:endParaRPr lang="zh-CN" altLang="en-US"/>
           </a:p>
@@ -2177,7 +2040,7 @@
           <a:p>
             <a:fld id="{5C67483F-86B4-4181-AEB3-1074CE197F11}" type="datetimeFigureOut">
               <a:rPr lang="zh-CN" altLang="en-US" smtClean="0"/>
-              <a:t>2023/9/17</a:t>
+              <a:t>2023/9/18</a:t>
             </a:fld>
             <a:endParaRPr lang="zh-CN" altLang="en-US"/>
           </a:p>
@@ -2326,7 +2189,7 @@
             <a:fld id="{DB494AA1-4C1D-4C99-92BC-CE5686F06754}" type="datetime1">
               <a:rPr lang="zh-CN" altLang="en-US" smtClean="0"/>
               <a:pPr/>
-              <a:t>2023/9/17</a:t>
+              <a:t>2023/9/18</a:t>
             </a:fld>
             <a:endParaRPr lang="zh-CN" altLang="en-US"/>
           </a:p>
@@ -2668,7 +2531,7 @@
           <a:p>
             <a:fld id="{5C67483F-86B4-4181-AEB3-1074CE197F11}" type="datetimeFigureOut">
               <a:rPr lang="zh-CN" altLang="en-US" smtClean="0"/>
-              <a:t>2023/9/17</a:t>
+              <a:t>2023/9/18</a:t>
             </a:fld>
             <a:endParaRPr lang="zh-CN" altLang="en-US"/>
           </a:p>
@@ -2943,7 +2806,7 @@
           <a:p>
             <a:fld id="{5C67483F-86B4-4181-AEB3-1074CE197F11}" type="datetimeFigureOut">
               <a:rPr lang="zh-CN" altLang="en-US" smtClean="0"/>
-              <a:t>2023/9/17</a:t>
+              <a:t>2023/9/18</a:t>
             </a:fld>
             <a:endParaRPr lang="zh-CN" altLang="en-US"/>
           </a:p>
@@ -3208,7 +3071,7 @@
           <a:p>
             <a:fld id="{5C67483F-86B4-4181-AEB3-1074CE197F11}" type="datetimeFigureOut">
               <a:rPr lang="zh-CN" altLang="en-US" smtClean="0"/>
-              <a:t>2023/9/17</a:t>
+              <a:t>2023/9/18</a:t>
             </a:fld>
             <a:endParaRPr lang="zh-CN" altLang="en-US"/>
           </a:p>
@@ -3620,7 +3483,7 @@
           <a:p>
             <a:fld id="{5C67483F-86B4-4181-AEB3-1074CE197F11}" type="datetimeFigureOut">
               <a:rPr lang="zh-CN" altLang="en-US" smtClean="0"/>
-              <a:t>2023/9/17</a:t>
+              <a:t>2023/9/18</a:t>
             </a:fld>
             <a:endParaRPr lang="zh-CN" altLang="en-US"/>
           </a:p>
@@ -3761,7 +3624,7 @@
           <a:p>
             <a:fld id="{5C67483F-86B4-4181-AEB3-1074CE197F11}" type="datetimeFigureOut">
               <a:rPr lang="zh-CN" altLang="en-US" smtClean="0"/>
-              <a:t>2023/9/17</a:t>
+              <a:t>2023/9/18</a:t>
             </a:fld>
             <a:endParaRPr lang="zh-CN" altLang="en-US"/>
           </a:p>
@@ -3874,7 +3737,7 @@
           <a:p>
             <a:fld id="{5C67483F-86B4-4181-AEB3-1074CE197F11}" type="datetimeFigureOut">
               <a:rPr lang="zh-CN" altLang="en-US" smtClean="0"/>
-              <a:t>2023/9/17</a:t>
+              <a:t>2023/9/18</a:t>
             </a:fld>
             <a:endParaRPr lang="zh-CN" altLang="en-US"/>
           </a:p>
@@ -4185,7 +4048,7 @@
           <a:p>
             <a:fld id="{5C67483F-86B4-4181-AEB3-1074CE197F11}" type="datetimeFigureOut">
               <a:rPr lang="zh-CN" altLang="en-US" smtClean="0"/>
-              <a:t>2023/9/17</a:t>
+              <a:t>2023/9/18</a:t>
             </a:fld>
             <a:endParaRPr lang="zh-CN" altLang="en-US"/>
           </a:p>
@@ -4473,7 +4336,7 @@
           <a:p>
             <a:fld id="{5C67483F-86B4-4181-AEB3-1074CE197F11}" type="datetimeFigureOut">
               <a:rPr lang="zh-CN" altLang="en-US" smtClean="0"/>
-              <a:t>2023/9/17</a:t>
+              <a:t>2023/9/18</a:t>
             </a:fld>
             <a:endParaRPr lang="zh-CN" altLang="en-US"/>
           </a:p>
@@ -4714,7 +4577,7 @@
           <a:p>
             <a:fld id="{5C67483F-86B4-4181-AEB3-1074CE197F11}" type="datetimeFigureOut">
               <a:rPr lang="zh-CN" altLang="en-US" smtClean="0"/>
-              <a:t>2023/9/17</a:t>
+              <a:t>2023/9/18</a:t>
             </a:fld>
             <a:endParaRPr lang="zh-CN" altLang="en-US"/>
           </a:p>
@@ -5920,7 +5783,7 @@
                 <a:latin typeface="Times New Roman" panose="02020603050405020304" pitchFamily="18" charset="0"/>
                 <a:cs typeface="Times New Roman" panose="02020603050405020304" pitchFamily="18" charset="0"/>
               </a:rPr>
-              <a:t>What is a discrete network simulator(DES)?</a:t>
+              <a:t>What is a discrete event simulator(DES)?</a:t>
             </a:r>
             <a:endParaRPr lang="zh-CN" altLang="en-US" sz="2800" dirty="0">
               <a:latin typeface="Times New Roman" panose="02020603050405020304" pitchFamily="18" charset="0"/>
@@ -12705,7 +12568,7 @@
                 <a:latin typeface="Times New Roman" panose="02020603050405020304" pitchFamily="18" charset="0"/>
                 <a:cs typeface="Times New Roman" panose="02020603050405020304" pitchFamily="18" charset="0"/>
               </a:rPr>
-              <a:t>Striking improve multi-core efficiency</a:t>
+              <a:t>Strikingly improve multi-core efficiency</a:t>
             </a:r>
           </a:p>
           <a:p>

</xml_diff>

<commit_message>
vault backup: 2023-09-18 10:20:08
</commit_message>
<xml_diff>
--- a/OS/DONS/FES.pptx
+++ b/OS/DONS/FES.pptx
@@ -1105,60 +1105,51 @@
           <a:lstStyle/>
           <a:p>
             <a:r>
-              <a:rPr kumimoji="1" lang="zh-CN" altLang="en-US" dirty="0"/>
-              <a:t>十四五规划：</a:t>
-            </a:r>
-            <a:r>
-              <a:rPr lang="zh-CN" altLang="en-US" dirty="0">
-                <a:solidFill>
-                  <a:srgbClr val="000000"/>
-                </a:solidFill>
-                <a:latin typeface="Microsoft YaHei" panose="020B0503020204020204" pitchFamily="34" charset="-122"/>
-                <a:ea typeface="Microsoft YaHei" panose="020B0503020204020204" pitchFamily="34" charset="-122"/>
-              </a:rPr>
-              <a:t>专栏</a:t>
-            </a:r>
-            <a:r>
-              <a:rPr lang="en-US" altLang="zh-CN" dirty="0">
-                <a:solidFill>
-                  <a:srgbClr val="000000"/>
-                </a:solidFill>
-                <a:latin typeface="Microsoft YaHei" panose="020B0503020204020204" pitchFamily="34" charset="-122"/>
-                <a:ea typeface="Microsoft YaHei" panose="020B0503020204020204" pitchFamily="34" charset="-122"/>
-              </a:rPr>
-              <a:t>8</a:t>
-            </a:r>
-            <a:r>
-              <a:rPr lang="zh-CN" altLang="en-US" dirty="0">
-                <a:solidFill>
-                  <a:srgbClr val="000000"/>
-                </a:solidFill>
-                <a:latin typeface="Microsoft YaHei" panose="020B0503020204020204" pitchFamily="34" charset="-122"/>
-                <a:ea typeface="Microsoft YaHei" panose="020B0503020204020204" pitchFamily="34" charset="-122"/>
-              </a:rPr>
-              <a:t>：数字经济重点产业，专栏</a:t>
-            </a:r>
-            <a:r>
-              <a:rPr lang="en-US" altLang="zh-CN" dirty="0">
-                <a:solidFill>
-                  <a:srgbClr val="000000"/>
-                </a:solidFill>
-                <a:latin typeface="Microsoft YaHei" panose="020B0503020204020204" pitchFamily="34" charset="-122"/>
-                <a:ea typeface="Microsoft YaHei" panose="020B0503020204020204" pitchFamily="34" charset="-122"/>
-              </a:rPr>
-              <a:t>9</a:t>
-            </a:r>
-            <a:r>
-              <a:rPr lang="zh-CN" altLang="en-US" dirty="0">
-                <a:solidFill>
-                  <a:srgbClr val="000000"/>
-                </a:solidFill>
-                <a:latin typeface="Microsoft YaHei" panose="020B0503020204020204" pitchFamily="34" charset="-122"/>
-                <a:ea typeface="Microsoft YaHei" panose="020B0503020204020204" pitchFamily="34" charset="-122"/>
-              </a:rPr>
-              <a:t>：数字化应用场景</a:t>
-            </a:r>
-            <a:endParaRPr lang="zh-CN" altLang="en-US" dirty="0"/>
+              <a:rPr lang="en-US" altLang="zh-CN" dirty="0"/>
+              <a:t>1)</a:t>
+            </a:r>
+            <a:r>
+              <a:rPr lang="zh-CN" altLang="en-US" dirty="0"/>
+              <a:t>确实解决了效率问题</a:t>
+            </a:r>
+            <a:endParaRPr lang="en-US" altLang="zh-CN" dirty="0"/>
+          </a:p>
+          <a:p>
+            <a:r>
+              <a:rPr lang="en-US" altLang="zh-CN" dirty="0"/>
+              <a:t>2</a:t>
+            </a:r>
+            <a:r>
+              <a:rPr lang="zh-CN" altLang="en-US" dirty="0"/>
+              <a:t>）功能性缺失：信道、移动模型、协议栈、</a:t>
+            </a:r>
+            <a:r>
+              <a:rPr lang="en-US" altLang="zh-CN" dirty="0"/>
+              <a:t>simulator</a:t>
+            </a:r>
+            <a:r>
+              <a:rPr lang="zh-CN" altLang="en-US" dirty="0"/>
+              <a:t>实现、物理机交互</a:t>
+            </a:r>
+            <a:endParaRPr lang="en-US" altLang="zh-CN" dirty="0"/>
+          </a:p>
+          <a:p>
+            <a:r>
+              <a:rPr lang="en-US" altLang="zh-CN" dirty="0"/>
+              <a:t>3</a:t>
+            </a:r>
+            <a:r>
+              <a:rPr lang="zh-CN" altLang="en-US" dirty="0"/>
+              <a:t>）性能方面：线程竞争导致伪共享问题，忽略了</a:t>
+            </a:r>
+            <a:r>
+              <a:rPr lang="en-US" altLang="zh-CN" dirty="0"/>
+              <a:t>GPU</a:t>
+            </a:r>
+            <a:r>
+              <a:rPr lang="zh-CN" altLang="en-US" dirty="0"/>
+              <a:t>的存在</a:t>
+            </a:r>
           </a:p>
         </p:txBody>
       </p:sp>
@@ -1248,60 +1239,6 @@
           <a:bodyPr/>
           <a:lstStyle/>
           <a:p>
-            <a:r>
-              <a:rPr kumimoji="1" lang="zh-CN" altLang="en-US" dirty="0"/>
-              <a:t>十四五规划：</a:t>
-            </a:r>
-            <a:r>
-              <a:rPr lang="zh-CN" altLang="en-US" dirty="0">
-                <a:solidFill>
-                  <a:srgbClr val="000000"/>
-                </a:solidFill>
-                <a:latin typeface="Microsoft YaHei" panose="020B0503020204020204" pitchFamily="34" charset="-122"/>
-                <a:ea typeface="Microsoft YaHei" panose="020B0503020204020204" pitchFamily="34" charset="-122"/>
-              </a:rPr>
-              <a:t>专栏</a:t>
-            </a:r>
-            <a:r>
-              <a:rPr lang="en-US" altLang="zh-CN" dirty="0">
-                <a:solidFill>
-                  <a:srgbClr val="000000"/>
-                </a:solidFill>
-                <a:latin typeface="Microsoft YaHei" panose="020B0503020204020204" pitchFamily="34" charset="-122"/>
-                <a:ea typeface="Microsoft YaHei" panose="020B0503020204020204" pitchFamily="34" charset="-122"/>
-              </a:rPr>
-              <a:t>8</a:t>
-            </a:r>
-            <a:r>
-              <a:rPr lang="zh-CN" altLang="en-US" dirty="0">
-                <a:solidFill>
-                  <a:srgbClr val="000000"/>
-                </a:solidFill>
-                <a:latin typeface="Microsoft YaHei" panose="020B0503020204020204" pitchFamily="34" charset="-122"/>
-                <a:ea typeface="Microsoft YaHei" panose="020B0503020204020204" pitchFamily="34" charset="-122"/>
-              </a:rPr>
-              <a:t>：数字经济重点产业，专栏</a:t>
-            </a:r>
-            <a:r>
-              <a:rPr lang="en-US" altLang="zh-CN" dirty="0">
-                <a:solidFill>
-                  <a:srgbClr val="000000"/>
-                </a:solidFill>
-                <a:latin typeface="Microsoft YaHei" panose="020B0503020204020204" pitchFamily="34" charset="-122"/>
-                <a:ea typeface="Microsoft YaHei" panose="020B0503020204020204" pitchFamily="34" charset="-122"/>
-              </a:rPr>
-              <a:t>9</a:t>
-            </a:r>
-            <a:r>
-              <a:rPr lang="zh-CN" altLang="en-US" dirty="0">
-                <a:solidFill>
-                  <a:srgbClr val="000000"/>
-                </a:solidFill>
-                <a:latin typeface="Microsoft YaHei" panose="020B0503020204020204" pitchFamily="34" charset="-122"/>
-                <a:ea typeface="Microsoft YaHei" panose="020B0503020204020204" pitchFamily="34" charset="-122"/>
-              </a:rPr>
-              <a:t>：数字化应用场景</a:t>
-            </a:r>
             <a:endParaRPr lang="zh-CN" altLang="en-US" dirty="0"/>
           </a:p>
         </p:txBody>
@@ -1393,60 +1330,94 @@
           <a:lstStyle/>
           <a:p>
             <a:r>
-              <a:rPr kumimoji="1" lang="zh-CN" altLang="en-US" dirty="0"/>
-              <a:t>十四五规划：</a:t>
-            </a:r>
-            <a:r>
-              <a:rPr lang="zh-CN" altLang="en-US" dirty="0">
-                <a:solidFill>
-                  <a:srgbClr val="000000"/>
-                </a:solidFill>
-                <a:latin typeface="Microsoft YaHei" panose="020B0503020204020204" pitchFamily="34" charset="-122"/>
-                <a:ea typeface="Microsoft YaHei" panose="020B0503020204020204" pitchFamily="34" charset="-122"/>
-              </a:rPr>
-              <a:t>专栏</a:t>
-            </a:r>
-            <a:r>
-              <a:rPr lang="en-US" altLang="zh-CN" dirty="0">
-                <a:solidFill>
-                  <a:srgbClr val="000000"/>
-                </a:solidFill>
-                <a:latin typeface="Microsoft YaHei" panose="020B0503020204020204" pitchFamily="34" charset="-122"/>
-                <a:ea typeface="Microsoft YaHei" panose="020B0503020204020204" pitchFamily="34" charset="-122"/>
-              </a:rPr>
-              <a:t>8</a:t>
-            </a:r>
-            <a:r>
-              <a:rPr lang="zh-CN" altLang="en-US" dirty="0">
-                <a:solidFill>
-                  <a:srgbClr val="000000"/>
-                </a:solidFill>
-                <a:latin typeface="Microsoft YaHei" panose="020B0503020204020204" pitchFamily="34" charset="-122"/>
-                <a:ea typeface="Microsoft YaHei" panose="020B0503020204020204" pitchFamily="34" charset="-122"/>
-              </a:rPr>
-              <a:t>：数字经济重点产业，专栏</a:t>
-            </a:r>
-            <a:r>
-              <a:rPr lang="en-US" altLang="zh-CN" dirty="0">
-                <a:solidFill>
-                  <a:srgbClr val="000000"/>
-                </a:solidFill>
-                <a:latin typeface="Microsoft YaHei" panose="020B0503020204020204" pitchFamily="34" charset="-122"/>
-                <a:ea typeface="Microsoft YaHei" panose="020B0503020204020204" pitchFamily="34" charset="-122"/>
-              </a:rPr>
-              <a:t>9</a:t>
-            </a:r>
-            <a:r>
-              <a:rPr lang="zh-CN" altLang="en-US" dirty="0">
-                <a:solidFill>
-                  <a:srgbClr val="000000"/>
-                </a:solidFill>
-                <a:latin typeface="Microsoft YaHei" panose="020B0503020204020204" pitchFamily="34" charset="-122"/>
-                <a:ea typeface="Microsoft YaHei" panose="020B0503020204020204" pitchFamily="34" charset="-122"/>
-              </a:rPr>
-              <a:t>：数字化应用场景</a:t>
-            </a:r>
-            <a:endParaRPr lang="zh-CN" altLang="en-US" dirty="0"/>
+              <a:rPr lang="en-US" altLang="zh-CN" dirty="0"/>
+              <a:t>1)</a:t>
+            </a:r>
+            <a:r>
+              <a:rPr lang="zh-CN" altLang="en-US" dirty="0"/>
+              <a:t>分离控制逻辑和计算分离，将计算任务卸载到</a:t>
+            </a:r>
+            <a:r>
+              <a:rPr lang="en-US" altLang="zh-CN" dirty="0"/>
+              <a:t>GPU</a:t>
+            </a:r>
+            <a:r>
+              <a:rPr lang="zh-CN" altLang="en-US" dirty="0"/>
+              <a:t>；</a:t>
+            </a:r>
+            <a:endParaRPr lang="en-US" altLang="zh-CN" dirty="0"/>
+          </a:p>
+          <a:p>
+            <a:r>
+              <a:rPr lang="en-US" altLang="zh-CN" dirty="0"/>
+              <a:t>2)</a:t>
+            </a:r>
+            <a:r>
+              <a:rPr lang="zh-CN" altLang="en-US" dirty="0"/>
+              <a:t>阶段性卸载任务到</a:t>
+            </a:r>
+            <a:r>
+              <a:rPr lang="en-US" altLang="zh-CN" dirty="0"/>
+              <a:t>GPU</a:t>
+            </a:r>
+            <a:r>
+              <a:rPr lang="zh-CN" altLang="en-US" dirty="0"/>
+              <a:t>，然后</a:t>
+            </a:r>
+            <a:r>
+              <a:rPr lang="en-US" altLang="zh-CN" dirty="0"/>
+              <a:t>GPU</a:t>
+            </a:r>
+            <a:r>
+              <a:rPr lang="zh-CN" altLang="en-US" dirty="0"/>
+              <a:t>离线执行任务；</a:t>
+            </a:r>
+            <a:endParaRPr lang="en-US" altLang="zh-CN" dirty="0"/>
+          </a:p>
+          <a:p>
+            <a:r>
+              <a:rPr lang="en-US" altLang="zh-CN" dirty="0"/>
+              <a:t>3</a:t>
+            </a:r>
+            <a:r>
+              <a:rPr lang="zh-CN" altLang="en-US" dirty="0"/>
+              <a:t>）</a:t>
+            </a:r>
+            <a:r>
+              <a:rPr lang="en-US" altLang="zh-CN" dirty="0"/>
+              <a:t>kernel</a:t>
+            </a:r>
+            <a:r>
+              <a:rPr lang="zh-CN" altLang="en-US" dirty="0"/>
+              <a:t>函数减少分支，</a:t>
+            </a:r>
+            <a:r>
+              <a:rPr lang="en-US" altLang="zh-CN" dirty="0"/>
+              <a:t>GPU</a:t>
+            </a:r>
+            <a:r>
+              <a:rPr lang="zh-CN" altLang="en-US" dirty="0"/>
+              <a:t>对于不执行的分支的处理是空转等待</a:t>
+            </a:r>
+            <a:endParaRPr lang="en-US" altLang="zh-CN" dirty="0"/>
+          </a:p>
+          <a:p>
+            <a:r>
+              <a:rPr lang="en-US" altLang="zh-CN" dirty="0"/>
+              <a:t>4</a:t>
+            </a:r>
+            <a:r>
+              <a:rPr lang="zh-CN" altLang="en-US" dirty="0"/>
+              <a:t>）性能优化：缓存优化（解决</a:t>
+            </a:r>
+            <a:r>
+              <a:rPr lang="zh-CN" altLang="en-US"/>
+              <a:t>伪共享问题）、</a:t>
+            </a:r>
+            <a:r>
+              <a:rPr lang="zh-CN" altLang="en-US" dirty="0"/>
+              <a:t>数据交换、少用第三方库</a:t>
+            </a:r>
           </a:p>
         </p:txBody>
       </p:sp>
@@ -14174,7 +14145,7 @@
           <p:nvPr>
             <p:extLst>
               <p:ext uri="{D42A27DB-BD31-4B8C-83A1-F6EECF244321}">
-                <p14:modId xmlns:p14="http://schemas.microsoft.com/office/powerpoint/2010/main" val="1504981646"/>
+                <p14:modId xmlns:p14="http://schemas.microsoft.com/office/powerpoint/2010/main" val="3622770711"/>
               </p:ext>
             </p:extLst>
           </p:nvPr>
@@ -14293,7 +14264,7 @@
                           <a:latin typeface="Times New Roman" panose="02020603050405020304" pitchFamily="18" charset="0"/>
                           <a:cs typeface="Times New Roman" panose="02020603050405020304" pitchFamily="18" charset="0"/>
                         </a:rPr>
-                        <a:t>Divide independent set</a:t>
+                        <a:t>Divide independent sets</a:t>
                       </a:r>
                       <a:endParaRPr lang="zh-CN" altLang="en-US" b="0" dirty="0">
                         <a:solidFill>

</xml_diff>